<commit_message>
updated with different data types
</commit_message>
<xml_diff>
--- a/graphics/Workflow.pptx
+++ b/graphics/Workflow.pptx
@@ -5122,6 +5122,13 @@
         </dgm:presLayoutVars>
       </dgm:prSet>
       <dgm:spPr/>
+      <dgm:t>
+        <a:bodyPr/>
+        <a:lstStyle/>
+        <a:p>
+          <a:endParaRPr lang="en-US"/>
+        </a:p>
+      </dgm:t>
     </dgm:pt>
     <dgm:pt modelId="{4D46CCB9-E0D7-49E4-8700-7CE19FB27C88}" type="pres">
       <dgm:prSet presAssocID="{15A2342C-342E-4AF1-ABFE-6D641BAF41A1}" presName="composite" presStyleCnt="0"/>
@@ -5135,6 +5142,13 @@
         </dgm:presLayoutVars>
       </dgm:prSet>
       <dgm:spPr/>
+      <dgm:t>
+        <a:bodyPr/>
+        <a:lstStyle/>
+        <a:p>
+          <a:endParaRPr lang="en-US"/>
+        </a:p>
+      </dgm:t>
     </dgm:pt>
     <dgm:pt modelId="{5FDFAD45-BE3A-42C7-96F9-147D175477B9}" type="pres">
       <dgm:prSet presAssocID="{15A2342C-342E-4AF1-ABFE-6D641BAF41A1}" presName="descendantText" presStyleLbl="alignAcc1" presStyleIdx="0" presStyleCnt="3">
@@ -5143,6 +5157,13 @@
         </dgm:presLayoutVars>
       </dgm:prSet>
       <dgm:spPr/>
+      <dgm:t>
+        <a:bodyPr/>
+        <a:lstStyle/>
+        <a:p>
+          <a:endParaRPr lang="en-US"/>
+        </a:p>
+      </dgm:t>
     </dgm:pt>
     <dgm:pt modelId="{0B93D529-6A78-4555-B1DB-9F922703E6C7}" type="pres">
       <dgm:prSet presAssocID="{3091C5B6-412E-4FA9-921C-1CCBB20FB078}" presName="sp" presStyleCnt="0"/>
@@ -5160,6 +5181,13 @@
         </dgm:presLayoutVars>
       </dgm:prSet>
       <dgm:spPr/>
+      <dgm:t>
+        <a:bodyPr/>
+        <a:lstStyle/>
+        <a:p>
+          <a:endParaRPr lang="en-US"/>
+        </a:p>
+      </dgm:t>
     </dgm:pt>
     <dgm:pt modelId="{3EE3D444-F1E2-4D81-B343-EEB78C9B7BC2}" type="pres">
       <dgm:prSet presAssocID="{A21E80E9-3E30-4727-979B-CC3F1A7A22C5}" presName="descendantText" presStyleLbl="alignAcc1" presStyleIdx="1" presStyleCnt="3">
@@ -5168,6 +5196,13 @@
         </dgm:presLayoutVars>
       </dgm:prSet>
       <dgm:spPr/>
+      <dgm:t>
+        <a:bodyPr/>
+        <a:lstStyle/>
+        <a:p>
+          <a:endParaRPr lang="en-US"/>
+        </a:p>
+      </dgm:t>
     </dgm:pt>
     <dgm:pt modelId="{56499CC1-1A65-4B3A-8A68-E81F41293563}" type="pres">
       <dgm:prSet presAssocID="{2E128CC8-58D8-49C7-B524-7F998825E08C}" presName="sp" presStyleCnt="0"/>
@@ -5185,6 +5220,13 @@
         </dgm:presLayoutVars>
       </dgm:prSet>
       <dgm:spPr/>
+      <dgm:t>
+        <a:bodyPr/>
+        <a:lstStyle/>
+        <a:p>
+          <a:endParaRPr lang="en-US"/>
+        </a:p>
+      </dgm:t>
     </dgm:pt>
     <dgm:pt modelId="{8FBC2C5D-9E47-4B2D-8CC0-0827ADC6EE57}" type="pres">
       <dgm:prSet presAssocID="{FDFD6E2B-DBAB-4056-BC28-C138724F0441}" presName="descendantText" presStyleLbl="alignAcc1" presStyleIdx="2" presStyleCnt="3">
@@ -5193,30 +5235,37 @@
         </dgm:presLayoutVars>
       </dgm:prSet>
       <dgm:spPr/>
+      <dgm:t>
+        <a:bodyPr/>
+        <a:lstStyle/>
+        <a:p>
+          <a:endParaRPr lang="en-US"/>
+        </a:p>
+      </dgm:t>
     </dgm:pt>
   </dgm:ptLst>
   <dgm:cxnLst>
+    <dgm:cxn modelId="{28F4B55F-1626-4A11-B2A3-6C5FBCF466EE}" type="presOf" srcId="{CBA4680F-B921-4539-96E8-73E248B26438}" destId="{5FDFAD45-BE3A-42C7-96F9-147D175477B9}" srcOrd="0" destOrd="0" presId="urn:microsoft.com/office/officeart/2005/8/layout/chevron2"/>
+    <dgm:cxn modelId="{890C6129-FED3-4F32-A1CE-803923CC13FB}" srcId="{B56C8652-49D2-40A6-9CA3-CE8DCF0946F5}" destId="{A21E80E9-3E30-4727-979B-CC3F1A7A22C5}" srcOrd="1" destOrd="0" parTransId="{5C40DCA5-A5ED-48F4-971B-7B525589E1B6}" sibTransId="{2E128CC8-58D8-49C7-B524-7F998825E08C}"/>
+    <dgm:cxn modelId="{CBE38C60-2AAF-4767-AECB-3298EFA7C80C}" type="presOf" srcId="{15A2342C-342E-4AF1-ABFE-6D641BAF41A1}" destId="{049C38D1-B597-49E9-8B00-78FB12FB25CF}" srcOrd="0" destOrd="0" presId="urn:microsoft.com/office/officeart/2005/8/layout/chevron2"/>
+    <dgm:cxn modelId="{E914BB3B-B500-4A5E-9DB8-004BB6465C45}" type="presOf" srcId="{F13B17A0-86C6-45C8-A1A1-58051CE11C6F}" destId="{5FDFAD45-BE3A-42C7-96F9-147D175477B9}" srcOrd="0" destOrd="2" presId="urn:microsoft.com/office/officeart/2005/8/layout/chevron2"/>
+    <dgm:cxn modelId="{82F94CF7-E0DE-440A-B1D1-883572629C8B}" type="presOf" srcId="{A21E80E9-3E30-4727-979B-CC3F1A7A22C5}" destId="{8EB604FD-2448-4F33-9F96-EAFE912047E9}" srcOrd="0" destOrd="0" presId="urn:microsoft.com/office/officeart/2005/8/layout/chevron2"/>
+    <dgm:cxn modelId="{02A4D1AF-EDD8-439D-A484-025FCC6A980C}" type="presOf" srcId="{8C104665-B997-48CE-83A4-95BF6FDE6B49}" destId="{5FDFAD45-BE3A-42C7-96F9-147D175477B9}" srcOrd="0" destOrd="3" presId="urn:microsoft.com/office/officeart/2005/8/layout/chevron2"/>
+    <dgm:cxn modelId="{98E93161-C30E-43AA-AF6B-299C6C6168AE}" srcId="{A21E80E9-3E30-4727-979B-CC3F1A7A22C5}" destId="{7251001A-0584-4766-A6D7-0E44BBBBDC12}" srcOrd="0" destOrd="0" parTransId="{FE219C25-7519-49A1-80FC-88DBD277BE7B}" sibTransId="{3A3E3377-B627-44C2-A026-04B55D885A13}"/>
+    <dgm:cxn modelId="{C42BD982-C504-4914-9E0C-E8ABC64B4230}" type="presOf" srcId="{C9116064-21A2-4229-B71C-C859A81DBAAF}" destId="{5FDFAD45-BE3A-42C7-96F9-147D175477B9}" srcOrd="0" destOrd="4" presId="urn:microsoft.com/office/officeart/2005/8/layout/chevron2"/>
+    <dgm:cxn modelId="{42A2C57A-441E-40C1-B0DD-ADED530A699C}" type="presOf" srcId="{958DC5F8-13C6-4060-9DA7-572015EE948E}" destId="{5FDFAD45-BE3A-42C7-96F9-147D175477B9}" srcOrd="0" destOrd="1" presId="urn:microsoft.com/office/officeart/2005/8/layout/chevron2"/>
+    <dgm:cxn modelId="{0326A130-63ED-4980-A431-4DB3F63EF895}" srcId="{15A2342C-342E-4AF1-ABFE-6D641BAF41A1}" destId="{958DC5F8-13C6-4060-9DA7-572015EE948E}" srcOrd="1" destOrd="0" parTransId="{92C2B2B2-DF39-4F92-9E36-6142C56C5522}" sibTransId="{BDE7F979-986D-43E2-824A-8A00B1EF1534}"/>
+    <dgm:cxn modelId="{26A054A0-1AB4-43B6-8F58-0FC6C712A2A4}" srcId="{15A2342C-342E-4AF1-ABFE-6D641BAF41A1}" destId="{CBA4680F-B921-4539-96E8-73E248B26438}" srcOrd="0" destOrd="0" parTransId="{CFA20A3C-0F95-4996-A60F-CD8C5D7EA0C8}" sibTransId="{66C95EC4-2BD0-44E1-98AF-5AEB75A287A4}"/>
+    <dgm:cxn modelId="{0AA7C964-F08A-434D-849D-CB60E50F510C}" type="presOf" srcId="{FDFD6E2B-DBAB-4056-BC28-C138724F0441}" destId="{0837024A-932D-4B89-A5B5-1646702B04D6}" srcOrd="0" destOrd="0" presId="urn:microsoft.com/office/officeart/2005/8/layout/chevron2"/>
+    <dgm:cxn modelId="{C1044540-A92A-40C4-BA69-87FED51784FA}" srcId="{15A2342C-342E-4AF1-ABFE-6D641BAF41A1}" destId="{8C104665-B997-48CE-83A4-95BF6FDE6B49}" srcOrd="3" destOrd="0" parTransId="{7736473E-7777-46AD-BAD9-D9CB0C1D99EF}" sibTransId="{840E658A-66F6-4286-8627-B78AF6905D03}"/>
+    <dgm:cxn modelId="{B9F397F0-7A59-4437-81F7-0BEB182623E3}" srcId="{FDFD6E2B-DBAB-4056-BC28-C138724F0441}" destId="{1693A56B-51EB-4EEE-B5A0-2587A76BB504}" srcOrd="0" destOrd="0" parTransId="{71605052-445C-4B49-9A4B-2DCF504AD115}" sibTransId="{84E281FA-B092-4FA8-A2AE-CFCEA05B4214}"/>
     <dgm:cxn modelId="{58890E05-AD91-4C6E-AFAF-1570690574EA}" type="presOf" srcId="{B56C8652-49D2-40A6-9CA3-CE8DCF0946F5}" destId="{142F673A-C255-456D-9E41-60A8F8DECB23}" srcOrd="0" destOrd="0" presId="urn:microsoft.com/office/officeart/2005/8/layout/chevron2"/>
-    <dgm:cxn modelId="{890C6129-FED3-4F32-A1CE-803923CC13FB}" srcId="{B56C8652-49D2-40A6-9CA3-CE8DCF0946F5}" destId="{A21E80E9-3E30-4727-979B-CC3F1A7A22C5}" srcOrd="1" destOrd="0" parTransId="{5C40DCA5-A5ED-48F4-971B-7B525589E1B6}" sibTransId="{2E128CC8-58D8-49C7-B524-7F998825E08C}"/>
-    <dgm:cxn modelId="{0326A130-63ED-4980-A431-4DB3F63EF895}" srcId="{15A2342C-342E-4AF1-ABFE-6D641BAF41A1}" destId="{958DC5F8-13C6-4060-9DA7-572015EE948E}" srcOrd="1" destOrd="0" parTransId="{92C2B2B2-DF39-4F92-9E36-6142C56C5522}" sibTransId="{BDE7F979-986D-43E2-824A-8A00B1EF1534}"/>
-    <dgm:cxn modelId="{E914BB3B-B500-4A5E-9DB8-004BB6465C45}" type="presOf" srcId="{F13B17A0-86C6-45C8-A1A1-58051CE11C6F}" destId="{5FDFAD45-BE3A-42C7-96F9-147D175477B9}" srcOrd="0" destOrd="2" presId="urn:microsoft.com/office/officeart/2005/8/layout/chevron2"/>
-    <dgm:cxn modelId="{C1044540-A92A-40C4-BA69-87FED51784FA}" srcId="{15A2342C-342E-4AF1-ABFE-6D641BAF41A1}" destId="{8C104665-B997-48CE-83A4-95BF6FDE6B49}" srcOrd="3" destOrd="0" parTransId="{7736473E-7777-46AD-BAD9-D9CB0C1D99EF}" sibTransId="{840E658A-66F6-4286-8627-B78AF6905D03}"/>
-    <dgm:cxn modelId="{28F4B55F-1626-4A11-B2A3-6C5FBCF466EE}" type="presOf" srcId="{CBA4680F-B921-4539-96E8-73E248B26438}" destId="{5FDFAD45-BE3A-42C7-96F9-147D175477B9}" srcOrd="0" destOrd="0" presId="urn:microsoft.com/office/officeart/2005/8/layout/chevron2"/>
-    <dgm:cxn modelId="{CBE38C60-2AAF-4767-AECB-3298EFA7C80C}" type="presOf" srcId="{15A2342C-342E-4AF1-ABFE-6D641BAF41A1}" destId="{049C38D1-B597-49E9-8B00-78FB12FB25CF}" srcOrd="0" destOrd="0" presId="urn:microsoft.com/office/officeart/2005/8/layout/chevron2"/>
-    <dgm:cxn modelId="{98E93161-C30E-43AA-AF6B-299C6C6168AE}" srcId="{A21E80E9-3E30-4727-979B-CC3F1A7A22C5}" destId="{7251001A-0584-4766-A6D7-0E44BBBBDC12}" srcOrd="0" destOrd="0" parTransId="{FE219C25-7519-49A1-80FC-88DBD277BE7B}" sibTransId="{3A3E3377-B627-44C2-A026-04B55D885A13}"/>
-    <dgm:cxn modelId="{0AA7C964-F08A-434D-849D-CB60E50F510C}" type="presOf" srcId="{FDFD6E2B-DBAB-4056-BC28-C138724F0441}" destId="{0837024A-932D-4B89-A5B5-1646702B04D6}" srcOrd="0" destOrd="0" presId="urn:microsoft.com/office/officeart/2005/8/layout/chevron2"/>
+    <dgm:cxn modelId="{EAC19F7A-4058-462D-BC2A-CCD988A0C013}" srcId="{15A2342C-342E-4AF1-ABFE-6D641BAF41A1}" destId="{C9116064-21A2-4229-B71C-C859A81DBAAF}" srcOrd="4" destOrd="0" parTransId="{8E91FA9C-B690-418C-9C39-9E36C456564E}" sibTransId="{BCBA8B8F-0B61-49A8-8D63-95CEF6D428EC}"/>
     <dgm:cxn modelId="{331E5267-3B46-40FC-807B-5869C9435943}" srcId="{B56C8652-49D2-40A6-9CA3-CE8DCF0946F5}" destId="{FDFD6E2B-DBAB-4056-BC28-C138724F0441}" srcOrd="2" destOrd="0" parTransId="{A185C7BD-8F3D-48FC-AACD-370FC7051347}" sibTransId="{2EAE1DED-33EB-4BB9-B279-4AEA7E7C396D}"/>
-    <dgm:cxn modelId="{EAC19F7A-4058-462D-BC2A-CCD988A0C013}" srcId="{15A2342C-342E-4AF1-ABFE-6D641BAF41A1}" destId="{C9116064-21A2-4229-B71C-C859A81DBAAF}" srcOrd="4" destOrd="0" parTransId="{8E91FA9C-B690-418C-9C39-9E36C456564E}" sibTransId="{BCBA8B8F-0B61-49A8-8D63-95CEF6D428EC}"/>
-    <dgm:cxn modelId="{42A2C57A-441E-40C1-B0DD-ADED530A699C}" type="presOf" srcId="{958DC5F8-13C6-4060-9DA7-572015EE948E}" destId="{5FDFAD45-BE3A-42C7-96F9-147D175477B9}" srcOrd="0" destOrd="1" presId="urn:microsoft.com/office/officeart/2005/8/layout/chevron2"/>
+    <dgm:cxn modelId="{473431EE-F39C-48EA-A045-B86C38621641}" srcId="{15A2342C-342E-4AF1-ABFE-6D641BAF41A1}" destId="{F13B17A0-86C6-45C8-A1A1-58051CE11C6F}" srcOrd="2" destOrd="0" parTransId="{B2B47FC7-5958-4A44-A4CE-453C0A0BC836}" sibTransId="{82F0F7A3-3707-4B24-8D7E-99D069D182AB}"/>
+    <dgm:cxn modelId="{86D5B1B6-FC3B-40C9-B662-895EFF0C484F}" type="presOf" srcId="{1693A56B-51EB-4EEE-B5A0-2587A76BB504}" destId="{8FBC2C5D-9E47-4B2D-8CC0-0827ADC6EE57}" srcOrd="0" destOrd="0" presId="urn:microsoft.com/office/officeart/2005/8/layout/chevron2"/>
     <dgm:cxn modelId="{FD15FF7D-7615-413A-936D-840A88CEEF81}" type="presOf" srcId="{7251001A-0584-4766-A6D7-0E44BBBBDC12}" destId="{3EE3D444-F1E2-4D81-B343-EEB78C9B7BC2}" srcOrd="0" destOrd="0" presId="urn:microsoft.com/office/officeart/2005/8/layout/chevron2"/>
-    <dgm:cxn modelId="{C42BD982-C504-4914-9E0C-E8ABC64B4230}" type="presOf" srcId="{C9116064-21A2-4229-B71C-C859A81DBAAF}" destId="{5FDFAD45-BE3A-42C7-96F9-147D175477B9}" srcOrd="0" destOrd="4" presId="urn:microsoft.com/office/officeart/2005/8/layout/chevron2"/>
     <dgm:cxn modelId="{2A878A9C-A599-4E25-8F35-179342BC54EF}" srcId="{B56C8652-49D2-40A6-9CA3-CE8DCF0946F5}" destId="{15A2342C-342E-4AF1-ABFE-6D641BAF41A1}" srcOrd="0" destOrd="0" parTransId="{3113E09E-2B5D-47FE-89F9-BC4D9A8CB38B}" sibTransId="{3091C5B6-412E-4FA9-921C-1CCBB20FB078}"/>
-    <dgm:cxn modelId="{26A054A0-1AB4-43B6-8F58-0FC6C712A2A4}" srcId="{15A2342C-342E-4AF1-ABFE-6D641BAF41A1}" destId="{CBA4680F-B921-4539-96E8-73E248B26438}" srcOrd="0" destOrd="0" parTransId="{CFA20A3C-0F95-4996-A60F-CD8C5D7EA0C8}" sibTransId="{66C95EC4-2BD0-44E1-98AF-5AEB75A287A4}"/>
-    <dgm:cxn modelId="{02A4D1AF-EDD8-439D-A484-025FCC6A980C}" type="presOf" srcId="{8C104665-B997-48CE-83A4-95BF6FDE6B49}" destId="{5FDFAD45-BE3A-42C7-96F9-147D175477B9}" srcOrd="0" destOrd="3" presId="urn:microsoft.com/office/officeart/2005/8/layout/chevron2"/>
-    <dgm:cxn modelId="{86D5B1B6-FC3B-40C9-B662-895EFF0C484F}" type="presOf" srcId="{1693A56B-51EB-4EEE-B5A0-2587A76BB504}" destId="{8FBC2C5D-9E47-4B2D-8CC0-0827ADC6EE57}" srcOrd="0" destOrd="0" presId="urn:microsoft.com/office/officeart/2005/8/layout/chevron2"/>
-    <dgm:cxn modelId="{473431EE-F39C-48EA-A045-B86C38621641}" srcId="{15A2342C-342E-4AF1-ABFE-6D641BAF41A1}" destId="{F13B17A0-86C6-45C8-A1A1-58051CE11C6F}" srcOrd="2" destOrd="0" parTransId="{B2B47FC7-5958-4A44-A4CE-453C0A0BC836}" sibTransId="{82F0F7A3-3707-4B24-8D7E-99D069D182AB}"/>
-    <dgm:cxn modelId="{B9F397F0-7A59-4437-81F7-0BEB182623E3}" srcId="{FDFD6E2B-DBAB-4056-BC28-C138724F0441}" destId="{1693A56B-51EB-4EEE-B5A0-2587A76BB504}" srcOrd="0" destOrd="0" parTransId="{71605052-445C-4B49-9A4B-2DCF504AD115}" sibTransId="{84E281FA-B092-4FA8-A2AE-CFCEA05B4214}"/>
-    <dgm:cxn modelId="{82F94CF7-E0DE-440A-B1D1-883572629C8B}" type="presOf" srcId="{A21E80E9-3E30-4727-979B-CC3F1A7A22C5}" destId="{8EB604FD-2448-4F33-9F96-EAFE912047E9}" srcOrd="0" destOrd="0" presId="urn:microsoft.com/office/officeart/2005/8/layout/chevron2"/>
     <dgm:cxn modelId="{13250355-16DD-4CD2-9C12-90DB9DA37F12}" type="presParOf" srcId="{142F673A-C255-456D-9E41-60A8F8DECB23}" destId="{4D46CCB9-E0D7-49E4-8700-7CE19FB27C88}" srcOrd="0" destOrd="0" presId="urn:microsoft.com/office/officeart/2005/8/layout/chevron2"/>
     <dgm:cxn modelId="{817BC056-467A-4A41-A953-E66324C2905D}" type="presParOf" srcId="{4D46CCB9-E0D7-49E4-8700-7CE19FB27C88}" destId="{049C38D1-B597-49E9-8B00-78FB12FB25CF}" srcOrd="0" destOrd="0" presId="urn:microsoft.com/office/officeart/2005/8/layout/chevron2"/>
     <dgm:cxn modelId="{9630092D-D071-4A9D-86C1-D2F2FD525441}" type="presParOf" srcId="{4D46CCB9-E0D7-49E4-8700-7CE19FB27C88}" destId="{5FDFAD45-BE3A-42C7-96F9-147D175477B9}" srcOrd="1" destOrd="0" presId="urn:microsoft.com/office/officeart/2005/8/layout/chevron2"/>
@@ -5950,6 +5999,13 @@
         </dgm:presLayoutVars>
       </dgm:prSet>
       <dgm:spPr/>
+      <dgm:t>
+        <a:bodyPr/>
+        <a:lstStyle/>
+        <a:p>
+          <a:endParaRPr lang="en-US"/>
+        </a:p>
+      </dgm:t>
     </dgm:pt>
     <dgm:pt modelId="{4D46CCB9-E0D7-49E4-8700-7CE19FB27C88}" type="pres">
       <dgm:prSet presAssocID="{15A2342C-342E-4AF1-ABFE-6D641BAF41A1}" presName="composite" presStyleCnt="0"/>
@@ -5963,6 +6019,13 @@
         </dgm:presLayoutVars>
       </dgm:prSet>
       <dgm:spPr/>
+      <dgm:t>
+        <a:bodyPr/>
+        <a:lstStyle/>
+        <a:p>
+          <a:endParaRPr lang="en-US"/>
+        </a:p>
+      </dgm:t>
     </dgm:pt>
     <dgm:pt modelId="{5FDFAD45-BE3A-42C7-96F9-147D175477B9}" type="pres">
       <dgm:prSet presAssocID="{15A2342C-342E-4AF1-ABFE-6D641BAF41A1}" presName="descendantText" presStyleLbl="alignAcc1" presStyleIdx="0" presStyleCnt="3" custScaleY="146752">
@@ -5971,6 +6034,13 @@
         </dgm:presLayoutVars>
       </dgm:prSet>
       <dgm:spPr/>
+      <dgm:t>
+        <a:bodyPr/>
+        <a:lstStyle/>
+        <a:p>
+          <a:endParaRPr lang="en-US"/>
+        </a:p>
+      </dgm:t>
     </dgm:pt>
     <dgm:pt modelId="{0B93D529-6A78-4555-B1DB-9F922703E6C7}" type="pres">
       <dgm:prSet presAssocID="{3091C5B6-412E-4FA9-921C-1CCBB20FB078}" presName="sp" presStyleCnt="0"/>
@@ -5988,6 +6058,13 @@
         </dgm:presLayoutVars>
       </dgm:prSet>
       <dgm:spPr/>
+      <dgm:t>
+        <a:bodyPr/>
+        <a:lstStyle/>
+        <a:p>
+          <a:endParaRPr lang="en-US"/>
+        </a:p>
+      </dgm:t>
     </dgm:pt>
     <dgm:pt modelId="{3EE3D444-F1E2-4D81-B343-EEB78C9B7BC2}" type="pres">
       <dgm:prSet presAssocID="{A21E80E9-3E30-4727-979B-CC3F1A7A22C5}" presName="descendantText" presStyleLbl="alignAcc1" presStyleIdx="1" presStyleCnt="3" custScaleY="62177">
@@ -5996,6 +6073,13 @@
         </dgm:presLayoutVars>
       </dgm:prSet>
       <dgm:spPr/>
+      <dgm:t>
+        <a:bodyPr/>
+        <a:lstStyle/>
+        <a:p>
+          <a:endParaRPr lang="en-US"/>
+        </a:p>
+      </dgm:t>
     </dgm:pt>
     <dgm:pt modelId="{56499CC1-1A65-4B3A-8A68-E81F41293563}" type="pres">
       <dgm:prSet presAssocID="{2E128CC8-58D8-49C7-B524-7F998825E08C}" presName="sp" presStyleCnt="0"/>
@@ -6013,6 +6097,13 @@
         </dgm:presLayoutVars>
       </dgm:prSet>
       <dgm:spPr/>
+      <dgm:t>
+        <a:bodyPr/>
+        <a:lstStyle/>
+        <a:p>
+          <a:endParaRPr lang="en-US"/>
+        </a:p>
+      </dgm:t>
     </dgm:pt>
     <dgm:pt modelId="{8FBC2C5D-9E47-4B2D-8CC0-0827ADC6EE57}" type="pres">
       <dgm:prSet presAssocID="{FDFD6E2B-DBAB-4056-BC28-C138724F0441}" presName="descendantText" presStyleLbl="alignAcc1" presStyleIdx="2" presStyleCnt="3">
@@ -6021,34 +6112,41 @@
         </dgm:presLayoutVars>
       </dgm:prSet>
       <dgm:spPr/>
+      <dgm:t>
+        <a:bodyPr/>
+        <a:lstStyle/>
+        <a:p>
+          <a:endParaRPr lang="en-US"/>
+        </a:p>
+      </dgm:t>
     </dgm:pt>
   </dgm:ptLst>
   <dgm:cxnLst>
-    <dgm:cxn modelId="{54E23B04-EBDA-49FD-A57B-ED784953900B}" type="presOf" srcId="{1B400580-387B-477D-B6CD-F03B562FFDEB}" destId="{5FDFAD45-BE3A-42C7-96F9-147D175477B9}" srcOrd="0" destOrd="4" presId="urn:microsoft.com/office/officeart/2005/8/layout/chevron2"/>
+    <dgm:cxn modelId="{568B338E-C01A-4183-B358-64ABEC2FA744}" srcId="{15A2342C-342E-4AF1-ABFE-6D641BAF41A1}" destId="{159996C0-C186-47AC-929E-A443A05B8EE2}" srcOrd="2" destOrd="0" parTransId="{9F097138-0FA0-4BE1-A055-212832A7FBA8}" sibTransId="{595A0788-22C0-4703-BEB9-875D76F2EC36}"/>
+    <dgm:cxn modelId="{F22C141A-69B6-40DE-A472-6626C4828479}" type="presOf" srcId="{E5914A3E-2FF2-4103-BB73-210968ACD4FF}" destId="{5FDFAD45-BE3A-42C7-96F9-147D175477B9}" srcOrd="0" destOrd="1" presId="urn:microsoft.com/office/officeart/2005/8/layout/chevron2"/>
+    <dgm:cxn modelId="{331E5267-3B46-40FC-807B-5869C9435943}" srcId="{B56C8652-49D2-40A6-9CA3-CE8DCF0946F5}" destId="{FDFD6E2B-DBAB-4056-BC28-C138724F0441}" srcOrd="2" destOrd="0" parTransId="{A185C7BD-8F3D-48FC-AACD-370FC7051347}" sibTransId="{2EAE1DED-33EB-4BB9-B279-4AEA7E7C396D}"/>
+    <dgm:cxn modelId="{98E93161-C30E-43AA-AF6B-299C6C6168AE}" srcId="{A21E80E9-3E30-4727-979B-CC3F1A7A22C5}" destId="{7251001A-0584-4766-A6D7-0E44BBBBDC12}" srcOrd="0" destOrd="0" parTransId="{FE219C25-7519-49A1-80FC-88DBD277BE7B}" sibTransId="{3A3E3377-B627-44C2-A026-04B55D885A13}"/>
+    <dgm:cxn modelId="{A697311E-22B0-4FFC-AF29-057B14ACB750}" srcId="{15A2342C-342E-4AF1-ABFE-6D641BAF41A1}" destId="{8CF37F4E-83B8-4FFC-BD35-CC471D511404}" srcOrd="3" destOrd="0" parTransId="{2F7622B6-0118-4188-B88B-704251D3E0DF}" sibTransId="{59AACFF3-A00E-43E9-B40C-86339226C464}"/>
+    <dgm:cxn modelId="{22CB0B06-577B-44AA-871D-7C89685CB994}" srcId="{FDFD6E2B-DBAB-4056-BC28-C138724F0441}" destId="{ED2CBCA3-C118-4300-8B50-F8AB498C3DE3}" srcOrd="1" destOrd="0" parTransId="{5B6B7A99-CBEC-4341-B419-E72AACBD5EAC}" sibTransId="{E02FD231-FF87-40B8-999F-E2705281C140}"/>
+    <dgm:cxn modelId="{A3194125-723F-473E-9D0F-658E28BBB962}" type="presOf" srcId="{8CF37F4E-83B8-4FFC-BD35-CC471D511404}" destId="{5FDFAD45-BE3A-42C7-96F9-147D175477B9}" srcOrd="0" destOrd="3" presId="urn:microsoft.com/office/officeart/2005/8/layout/chevron2"/>
+    <dgm:cxn modelId="{82F94CF7-E0DE-440A-B1D1-883572629C8B}" type="presOf" srcId="{A21E80E9-3E30-4727-979B-CC3F1A7A22C5}" destId="{8EB604FD-2448-4F33-9F96-EAFE912047E9}" srcOrd="0" destOrd="0" presId="urn:microsoft.com/office/officeart/2005/8/layout/chevron2"/>
+    <dgm:cxn modelId="{86D5B1B6-FC3B-40C9-B662-895EFF0C484F}" type="presOf" srcId="{1693A56B-51EB-4EEE-B5A0-2587A76BB504}" destId="{8FBC2C5D-9E47-4B2D-8CC0-0827ADC6EE57}" srcOrd="0" destOrd="0" presId="urn:microsoft.com/office/officeart/2005/8/layout/chevron2"/>
     <dgm:cxn modelId="{58890E05-AD91-4C6E-AFAF-1570690574EA}" type="presOf" srcId="{B56C8652-49D2-40A6-9CA3-CE8DCF0946F5}" destId="{142F673A-C255-456D-9E41-60A8F8DECB23}" srcOrd="0" destOrd="0" presId="urn:microsoft.com/office/officeart/2005/8/layout/chevron2"/>
-    <dgm:cxn modelId="{22CB0B06-577B-44AA-871D-7C89685CB994}" srcId="{FDFD6E2B-DBAB-4056-BC28-C138724F0441}" destId="{ED2CBCA3-C118-4300-8B50-F8AB498C3DE3}" srcOrd="1" destOrd="0" parTransId="{5B6B7A99-CBEC-4341-B419-E72AACBD5EAC}" sibTransId="{E02FD231-FF87-40B8-999F-E2705281C140}"/>
-    <dgm:cxn modelId="{F22C141A-69B6-40DE-A472-6626C4828479}" type="presOf" srcId="{E5914A3E-2FF2-4103-BB73-210968ACD4FF}" destId="{5FDFAD45-BE3A-42C7-96F9-147D175477B9}" srcOrd="0" destOrd="1" presId="urn:microsoft.com/office/officeart/2005/8/layout/chevron2"/>
-    <dgm:cxn modelId="{A697311E-22B0-4FFC-AF29-057B14ACB750}" srcId="{15A2342C-342E-4AF1-ABFE-6D641BAF41A1}" destId="{8CF37F4E-83B8-4FFC-BD35-CC471D511404}" srcOrd="3" destOrd="0" parTransId="{2F7622B6-0118-4188-B88B-704251D3E0DF}" sibTransId="{59AACFF3-A00E-43E9-B40C-86339226C464}"/>
-    <dgm:cxn modelId="{A3194125-723F-473E-9D0F-658E28BBB962}" type="presOf" srcId="{8CF37F4E-83B8-4FFC-BD35-CC471D511404}" destId="{5FDFAD45-BE3A-42C7-96F9-147D175477B9}" srcOrd="0" destOrd="3" presId="urn:microsoft.com/office/officeart/2005/8/layout/chevron2"/>
+    <dgm:cxn modelId="{B9F397F0-7A59-4437-81F7-0BEB182623E3}" srcId="{FDFD6E2B-DBAB-4056-BC28-C138724F0441}" destId="{1693A56B-51EB-4EEE-B5A0-2587A76BB504}" srcOrd="0" destOrd="0" parTransId="{71605052-445C-4B49-9A4B-2DCF504AD115}" sibTransId="{84E281FA-B092-4FA8-A2AE-CFCEA05B4214}"/>
+    <dgm:cxn modelId="{0AA7C964-F08A-434D-849D-CB60E50F510C}" type="presOf" srcId="{FDFD6E2B-DBAB-4056-BC28-C138724F0441}" destId="{0837024A-932D-4B89-A5B5-1646702B04D6}" srcOrd="0" destOrd="0" presId="urn:microsoft.com/office/officeart/2005/8/layout/chevron2"/>
+    <dgm:cxn modelId="{C16B3C40-8104-4248-9B16-0226FC236EFD}" type="presOf" srcId="{AE734D0A-6694-40AA-8661-A4F047D5E4D9}" destId="{5FDFAD45-BE3A-42C7-96F9-147D175477B9}" srcOrd="0" destOrd="5" presId="urn:microsoft.com/office/officeart/2005/8/layout/chevron2"/>
+    <dgm:cxn modelId="{91728458-F258-4C8F-99ED-30D1F4445A8A}" srcId="{15A2342C-342E-4AF1-ABFE-6D641BAF41A1}" destId="{E5914A3E-2FF2-4103-BB73-210968ACD4FF}" srcOrd="1" destOrd="0" parTransId="{3B473786-671B-4428-9483-DB6860F2E8A7}" sibTransId="{6594EE38-4CAC-4566-8527-BB2F0A086459}"/>
+    <dgm:cxn modelId="{771EF266-2DA7-4E41-A3AB-05E2E82547C1}" srcId="{15A2342C-342E-4AF1-ABFE-6D641BAF41A1}" destId="{1B400580-387B-477D-B6CD-F03B562FFDEB}" srcOrd="4" destOrd="0" parTransId="{5002C619-6CC7-4A97-88F7-753FD20E0C39}" sibTransId="{1F350EBD-C646-4C85-AAB7-6D20FDA364C5}"/>
+    <dgm:cxn modelId="{864443B7-827D-40CA-9151-FBD8FCDA144A}" srcId="{15A2342C-342E-4AF1-ABFE-6D641BAF41A1}" destId="{AE734D0A-6694-40AA-8661-A4F047D5E4D9}" srcOrd="5" destOrd="0" parTransId="{CCB97636-127D-4739-A837-C723B7836880}" sibTransId="{158A9BB4-6738-46A4-AC17-D8A26414D5F7}"/>
+    <dgm:cxn modelId="{CBE38C60-2AAF-4767-AECB-3298EFA7C80C}" type="presOf" srcId="{15A2342C-342E-4AF1-ABFE-6D641BAF41A1}" destId="{049C38D1-B597-49E9-8B00-78FB12FB25CF}" srcOrd="0" destOrd="0" presId="urn:microsoft.com/office/officeart/2005/8/layout/chevron2"/>
     <dgm:cxn modelId="{890C6129-FED3-4F32-A1CE-803923CC13FB}" srcId="{B56C8652-49D2-40A6-9CA3-CE8DCF0946F5}" destId="{A21E80E9-3E30-4727-979B-CC3F1A7A22C5}" srcOrd="1" destOrd="0" parTransId="{5C40DCA5-A5ED-48F4-971B-7B525589E1B6}" sibTransId="{2E128CC8-58D8-49C7-B524-7F998825E08C}"/>
-    <dgm:cxn modelId="{C16B3C40-8104-4248-9B16-0226FC236EFD}" type="presOf" srcId="{AE734D0A-6694-40AA-8661-A4F047D5E4D9}" destId="{5FDFAD45-BE3A-42C7-96F9-147D175477B9}" srcOrd="0" destOrd="5" presId="urn:microsoft.com/office/officeart/2005/8/layout/chevron2"/>
-    <dgm:cxn modelId="{3A1E4C5D-DEA7-4C78-9A3C-14BBD0CB60A8}" type="presOf" srcId="{159996C0-C186-47AC-929E-A443A05B8EE2}" destId="{5FDFAD45-BE3A-42C7-96F9-147D175477B9}" srcOrd="0" destOrd="2" presId="urn:microsoft.com/office/officeart/2005/8/layout/chevron2"/>
-    <dgm:cxn modelId="{28F4B55F-1626-4A11-B2A3-6C5FBCF466EE}" type="presOf" srcId="{CBA4680F-B921-4539-96E8-73E248B26438}" destId="{5FDFAD45-BE3A-42C7-96F9-147D175477B9}" srcOrd="0" destOrd="0" presId="urn:microsoft.com/office/officeart/2005/8/layout/chevron2"/>
-    <dgm:cxn modelId="{CBE38C60-2AAF-4767-AECB-3298EFA7C80C}" type="presOf" srcId="{15A2342C-342E-4AF1-ABFE-6D641BAF41A1}" destId="{049C38D1-B597-49E9-8B00-78FB12FB25CF}" srcOrd="0" destOrd="0" presId="urn:microsoft.com/office/officeart/2005/8/layout/chevron2"/>
-    <dgm:cxn modelId="{98E93161-C30E-43AA-AF6B-299C6C6168AE}" srcId="{A21E80E9-3E30-4727-979B-CC3F1A7A22C5}" destId="{7251001A-0584-4766-A6D7-0E44BBBBDC12}" srcOrd="0" destOrd="0" parTransId="{FE219C25-7519-49A1-80FC-88DBD277BE7B}" sibTransId="{3A3E3377-B627-44C2-A026-04B55D885A13}"/>
-    <dgm:cxn modelId="{0AA7C964-F08A-434D-849D-CB60E50F510C}" type="presOf" srcId="{FDFD6E2B-DBAB-4056-BC28-C138724F0441}" destId="{0837024A-932D-4B89-A5B5-1646702B04D6}" srcOrd="0" destOrd="0" presId="urn:microsoft.com/office/officeart/2005/8/layout/chevron2"/>
-    <dgm:cxn modelId="{771EF266-2DA7-4E41-A3AB-05E2E82547C1}" srcId="{15A2342C-342E-4AF1-ABFE-6D641BAF41A1}" destId="{1B400580-387B-477D-B6CD-F03B562FFDEB}" srcOrd="4" destOrd="0" parTransId="{5002C619-6CC7-4A97-88F7-753FD20E0C39}" sibTransId="{1F350EBD-C646-4C85-AAB7-6D20FDA364C5}"/>
-    <dgm:cxn modelId="{331E5267-3B46-40FC-807B-5869C9435943}" srcId="{B56C8652-49D2-40A6-9CA3-CE8DCF0946F5}" destId="{FDFD6E2B-DBAB-4056-BC28-C138724F0441}" srcOrd="2" destOrd="0" parTransId="{A185C7BD-8F3D-48FC-AACD-370FC7051347}" sibTransId="{2EAE1DED-33EB-4BB9-B279-4AEA7E7C396D}"/>
-    <dgm:cxn modelId="{91728458-F258-4C8F-99ED-30D1F4445A8A}" srcId="{15A2342C-342E-4AF1-ABFE-6D641BAF41A1}" destId="{E5914A3E-2FF2-4103-BB73-210968ACD4FF}" srcOrd="1" destOrd="0" parTransId="{3B473786-671B-4428-9483-DB6860F2E8A7}" sibTransId="{6594EE38-4CAC-4566-8527-BB2F0A086459}"/>
     <dgm:cxn modelId="{FD15FF7D-7615-413A-936D-840A88CEEF81}" type="presOf" srcId="{7251001A-0584-4766-A6D7-0E44BBBBDC12}" destId="{3EE3D444-F1E2-4D81-B343-EEB78C9B7BC2}" srcOrd="0" destOrd="0" presId="urn:microsoft.com/office/officeart/2005/8/layout/chevron2"/>
-    <dgm:cxn modelId="{568B338E-C01A-4183-B358-64ABEC2FA744}" srcId="{15A2342C-342E-4AF1-ABFE-6D641BAF41A1}" destId="{159996C0-C186-47AC-929E-A443A05B8EE2}" srcOrd="2" destOrd="0" parTransId="{9F097138-0FA0-4BE1-A055-212832A7FBA8}" sibTransId="{595A0788-22C0-4703-BEB9-875D76F2EC36}"/>
+    <dgm:cxn modelId="{B6519FAA-D129-4204-90AF-C489A014883B}" type="presOf" srcId="{ED2CBCA3-C118-4300-8B50-F8AB498C3DE3}" destId="{8FBC2C5D-9E47-4B2D-8CC0-0827ADC6EE57}" srcOrd="0" destOrd="1" presId="urn:microsoft.com/office/officeart/2005/8/layout/chevron2"/>
     <dgm:cxn modelId="{2A878A9C-A599-4E25-8F35-179342BC54EF}" srcId="{B56C8652-49D2-40A6-9CA3-CE8DCF0946F5}" destId="{15A2342C-342E-4AF1-ABFE-6D641BAF41A1}" srcOrd="0" destOrd="0" parTransId="{3113E09E-2B5D-47FE-89F9-BC4D9A8CB38B}" sibTransId="{3091C5B6-412E-4FA9-921C-1CCBB20FB078}"/>
     <dgm:cxn modelId="{26A054A0-1AB4-43B6-8F58-0FC6C712A2A4}" srcId="{15A2342C-342E-4AF1-ABFE-6D641BAF41A1}" destId="{CBA4680F-B921-4539-96E8-73E248B26438}" srcOrd="0" destOrd="0" parTransId="{CFA20A3C-0F95-4996-A60F-CD8C5D7EA0C8}" sibTransId="{66C95EC4-2BD0-44E1-98AF-5AEB75A287A4}"/>
-    <dgm:cxn modelId="{B6519FAA-D129-4204-90AF-C489A014883B}" type="presOf" srcId="{ED2CBCA3-C118-4300-8B50-F8AB498C3DE3}" destId="{8FBC2C5D-9E47-4B2D-8CC0-0827ADC6EE57}" srcOrd="0" destOrd="1" presId="urn:microsoft.com/office/officeart/2005/8/layout/chevron2"/>
-    <dgm:cxn modelId="{86D5B1B6-FC3B-40C9-B662-895EFF0C484F}" type="presOf" srcId="{1693A56B-51EB-4EEE-B5A0-2587A76BB504}" destId="{8FBC2C5D-9E47-4B2D-8CC0-0827ADC6EE57}" srcOrd="0" destOrd="0" presId="urn:microsoft.com/office/officeart/2005/8/layout/chevron2"/>
-    <dgm:cxn modelId="{864443B7-827D-40CA-9151-FBD8FCDA144A}" srcId="{15A2342C-342E-4AF1-ABFE-6D641BAF41A1}" destId="{AE734D0A-6694-40AA-8661-A4F047D5E4D9}" srcOrd="5" destOrd="0" parTransId="{CCB97636-127D-4739-A837-C723B7836880}" sibTransId="{158A9BB4-6738-46A4-AC17-D8A26414D5F7}"/>
-    <dgm:cxn modelId="{B9F397F0-7A59-4437-81F7-0BEB182623E3}" srcId="{FDFD6E2B-DBAB-4056-BC28-C138724F0441}" destId="{1693A56B-51EB-4EEE-B5A0-2587A76BB504}" srcOrd="0" destOrd="0" parTransId="{71605052-445C-4B49-9A4B-2DCF504AD115}" sibTransId="{84E281FA-B092-4FA8-A2AE-CFCEA05B4214}"/>
-    <dgm:cxn modelId="{82F94CF7-E0DE-440A-B1D1-883572629C8B}" type="presOf" srcId="{A21E80E9-3E30-4727-979B-CC3F1A7A22C5}" destId="{8EB604FD-2448-4F33-9F96-EAFE912047E9}" srcOrd="0" destOrd="0" presId="urn:microsoft.com/office/officeart/2005/8/layout/chevron2"/>
+    <dgm:cxn modelId="{28F4B55F-1626-4A11-B2A3-6C5FBCF466EE}" type="presOf" srcId="{CBA4680F-B921-4539-96E8-73E248B26438}" destId="{5FDFAD45-BE3A-42C7-96F9-147D175477B9}" srcOrd="0" destOrd="0" presId="urn:microsoft.com/office/officeart/2005/8/layout/chevron2"/>
+    <dgm:cxn modelId="{54E23B04-EBDA-49FD-A57B-ED784953900B}" type="presOf" srcId="{1B400580-387B-477D-B6CD-F03B562FFDEB}" destId="{5FDFAD45-BE3A-42C7-96F9-147D175477B9}" srcOrd="0" destOrd="4" presId="urn:microsoft.com/office/officeart/2005/8/layout/chevron2"/>
+    <dgm:cxn modelId="{3A1E4C5D-DEA7-4C78-9A3C-14BBD0CB60A8}" type="presOf" srcId="{159996C0-C186-47AC-929E-A443A05B8EE2}" destId="{5FDFAD45-BE3A-42C7-96F9-147D175477B9}" srcOrd="0" destOrd="2" presId="urn:microsoft.com/office/officeart/2005/8/layout/chevron2"/>
     <dgm:cxn modelId="{13250355-16DD-4CD2-9C12-90DB9DA37F12}" type="presParOf" srcId="{142F673A-C255-456D-9E41-60A8F8DECB23}" destId="{4D46CCB9-E0D7-49E4-8700-7CE19FB27C88}" srcOrd="0" destOrd="0" presId="urn:microsoft.com/office/officeart/2005/8/layout/chevron2"/>
     <dgm:cxn modelId="{817BC056-467A-4A41-A953-E66324C2905D}" type="presParOf" srcId="{4D46CCB9-E0D7-49E4-8700-7CE19FB27C88}" destId="{049C38D1-B597-49E9-8B00-78FB12FB25CF}" srcOrd="0" destOrd="0" presId="urn:microsoft.com/office/officeart/2005/8/layout/chevron2"/>
     <dgm:cxn modelId="{9630092D-D071-4A9D-86C1-D2F2FD525441}" type="presParOf" srcId="{4D46CCB9-E0D7-49E4-8700-7CE19FB27C88}" destId="{5FDFAD45-BE3A-42C7-96F9-147D175477B9}" srcOrd="1" destOrd="0" presId="urn:microsoft.com/office/officeart/2005/8/layout/chevron2"/>
@@ -6794,6 +6892,13 @@
         </dgm:presLayoutVars>
       </dgm:prSet>
       <dgm:spPr/>
+      <dgm:t>
+        <a:bodyPr/>
+        <a:lstStyle/>
+        <a:p>
+          <a:endParaRPr lang="en-US"/>
+        </a:p>
+      </dgm:t>
     </dgm:pt>
     <dgm:pt modelId="{4D46CCB9-E0D7-49E4-8700-7CE19FB27C88}" type="pres">
       <dgm:prSet presAssocID="{15A2342C-342E-4AF1-ABFE-6D641BAF41A1}" presName="composite" presStyleCnt="0"/>
@@ -6807,6 +6912,13 @@
         </dgm:presLayoutVars>
       </dgm:prSet>
       <dgm:spPr/>
+      <dgm:t>
+        <a:bodyPr/>
+        <a:lstStyle/>
+        <a:p>
+          <a:endParaRPr lang="en-US"/>
+        </a:p>
+      </dgm:t>
     </dgm:pt>
     <dgm:pt modelId="{5FDFAD45-BE3A-42C7-96F9-147D175477B9}" type="pres">
       <dgm:prSet presAssocID="{15A2342C-342E-4AF1-ABFE-6D641BAF41A1}" presName="descendantText" presStyleLbl="alignAcc1" presStyleIdx="0" presStyleCnt="3" custScaleY="100000" custLinFactNeighborX="-170" custLinFactNeighborY="-2821">
@@ -6815,6 +6927,13 @@
         </dgm:presLayoutVars>
       </dgm:prSet>
       <dgm:spPr/>
+      <dgm:t>
+        <a:bodyPr/>
+        <a:lstStyle/>
+        <a:p>
+          <a:endParaRPr lang="en-US"/>
+        </a:p>
+      </dgm:t>
     </dgm:pt>
     <dgm:pt modelId="{0B93D529-6A78-4555-B1DB-9F922703E6C7}" type="pres">
       <dgm:prSet presAssocID="{3091C5B6-412E-4FA9-921C-1CCBB20FB078}" presName="sp" presStyleCnt="0"/>
@@ -6832,6 +6951,13 @@
         </dgm:presLayoutVars>
       </dgm:prSet>
       <dgm:spPr/>
+      <dgm:t>
+        <a:bodyPr/>
+        <a:lstStyle/>
+        <a:p>
+          <a:endParaRPr lang="en-US"/>
+        </a:p>
+      </dgm:t>
     </dgm:pt>
     <dgm:pt modelId="{3EE3D444-F1E2-4D81-B343-EEB78C9B7BC2}" type="pres">
       <dgm:prSet presAssocID="{A21E80E9-3E30-4727-979B-CC3F1A7A22C5}" presName="descendantText" presStyleLbl="alignAcc1" presStyleIdx="1" presStyleCnt="3" custScaleY="30919">
@@ -6840,6 +6966,13 @@
         </dgm:presLayoutVars>
       </dgm:prSet>
       <dgm:spPr/>
+      <dgm:t>
+        <a:bodyPr/>
+        <a:lstStyle/>
+        <a:p>
+          <a:endParaRPr lang="en-US"/>
+        </a:p>
+      </dgm:t>
     </dgm:pt>
     <dgm:pt modelId="{56499CC1-1A65-4B3A-8A68-E81F41293563}" type="pres">
       <dgm:prSet presAssocID="{2E128CC8-58D8-49C7-B524-7F998825E08C}" presName="sp" presStyleCnt="0"/>
@@ -6857,6 +6990,13 @@
         </dgm:presLayoutVars>
       </dgm:prSet>
       <dgm:spPr/>
+      <dgm:t>
+        <a:bodyPr/>
+        <a:lstStyle/>
+        <a:p>
+          <a:endParaRPr lang="en-US"/>
+        </a:p>
+      </dgm:t>
     </dgm:pt>
     <dgm:pt modelId="{8FBC2C5D-9E47-4B2D-8CC0-0827ADC6EE57}" type="pres">
       <dgm:prSet presAssocID="{FDFD6E2B-DBAB-4056-BC28-C138724F0441}" presName="descendantText" presStyleLbl="alignAcc1" presStyleIdx="2" presStyleCnt="3" custScaleY="235335">
@@ -6865,36 +7005,43 @@
         </dgm:presLayoutVars>
       </dgm:prSet>
       <dgm:spPr/>
+      <dgm:t>
+        <a:bodyPr/>
+        <a:lstStyle/>
+        <a:p>
+          <a:endParaRPr lang="en-US"/>
+        </a:p>
+      </dgm:t>
     </dgm:pt>
   </dgm:ptLst>
   <dgm:cxnLst>
+    <dgm:cxn modelId="{28F4B55F-1626-4A11-B2A3-6C5FBCF466EE}" type="presOf" srcId="{CBA4680F-B921-4539-96E8-73E248B26438}" destId="{5FDFAD45-BE3A-42C7-96F9-147D175477B9}" srcOrd="0" destOrd="0" presId="urn:microsoft.com/office/officeart/2005/8/layout/chevron2"/>
+    <dgm:cxn modelId="{A1DC73D2-C866-4AF8-8F66-31BBE9AE94F7}" type="presOf" srcId="{732042B1-94D3-42FA-A258-6BB06EBE3E3B}" destId="{8FBC2C5D-9E47-4B2D-8CC0-0827ADC6EE57}" srcOrd="0" destOrd="4" presId="urn:microsoft.com/office/officeart/2005/8/layout/chevron2"/>
+    <dgm:cxn modelId="{890C6129-FED3-4F32-A1CE-803923CC13FB}" srcId="{B56C8652-49D2-40A6-9CA3-CE8DCF0946F5}" destId="{A21E80E9-3E30-4727-979B-CC3F1A7A22C5}" srcOrd="1" destOrd="0" parTransId="{5C40DCA5-A5ED-48F4-971B-7B525589E1B6}" sibTransId="{2E128CC8-58D8-49C7-B524-7F998825E08C}"/>
+    <dgm:cxn modelId="{CBE38C60-2AAF-4767-AECB-3298EFA7C80C}" type="presOf" srcId="{15A2342C-342E-4AF1-ABFE-6D641BAF41A1}" destId="{049C38D1-B597-49E9-8B00-78FB12FB25CF}" srcOrd="0" destOrd="0" presId="urn:microsoft.com/office/officeart/2005/8/layout/chevron2"/>
+    <dgm:cxn modelId="{82F94CF7-E0DE-440A-B1D1-883572629C8B}" type="presOf" srcId="{A21E80E9-3E30-4727-979B-CC3F1A7A22C5}" destId="{8EB604FD-2448-4F33-9F96-EAFE912047E9}" srcOrd="0" destOrd="0" presId="urn:microsoft.com/office/officeart/2005/8/layout/chevron2"/>
+    <dgm:cxn modelId="{8F2FDC48-E40A-425B-870D-62187B5D42A9}" srcId="{FDFD6E2B-DBAB-4056-BC28-C138724F0441}" destId="{5FE0594D-1D7D-4AA8-819B-A2C743D5CEF2}" srcOrd="3" destOrd="0" parTransId="{1CA14089-09CF-4046-9D0C-3DFC6A05542D}" sibTransId="{F95BCFE4-CFE1-4C2D-8293-9326323C655E}"/>
+    <dgm:cxn modelId="{F5DA283E-18B8-4545-BA85-552B99631C05}" type="presOf" srcId="{5EEE87EF-CC69-46CA-991B-C6EF45468841}" destId="{8FBC2C5D-9E47-4B2D-8CC0-0827ADC6EE57}" srcOrd="0" destOrd="5" presId="urn:microsoft.com/office/officeart/2005/8/layout/chevron2"/>
+    <dgm:cxn modelId="{F72680C9-96BF-47B8-9EA1-790C7398DC53}" srcId="{FDFD6E2B-DBAB-4056-BC28-C138724F0441}" destId="{08DDB7E5-F95F-4C23-8B95-48DA1C9E93D2}" srcOrd="6" destOrd="0" parTransId="{17D3B376-5FA3-4529-8A20-009F64A5009F}" sibTransId="{2211239D-722D-4F53-AAEA-314BB74C3C5C}"/>
+    <dgm:cxn modelId="{DBC7E407-9897-43CC-9C3A-E44E5BA3D393}" srcId="{FDFD6E2B-DBAB-4056-BC28-C138724F0441}" destId="{5EEE87EF-CC69-46CA-991B-C6EF45468841}" srcOrd="5" destOrd="0" parTransId="{3991E14B-A14C-40AF-9607-91EE68B84F4F}" sibTransId="{B0172526-43A0-4BDC-8318-EC52C2D54827}"/>
+    <dgm:cxn modelId="{B51378A4-5D0E-4C4B-B23C-D4EAD7678B6D}" type="presOf" srcId="{5FE0594D-1D7D-4AA8-819B-A2C743D5CEF2}" destId="{8FBC2C5D-9E47-4B2D-8CC0-0827ADC6EE57}" srcOrd="0" destOrd="3" presId="urn:microsoft.com/office/officeart/2005/8/layout/chevron2"/>
+    <dgm:cxn modelId="{98E93161-C30E-43AA-AF6B-299C6C6168AE}" srcId="{A21E80E9-3E30-4727-979B-CC3F1A7A22C5}" destId="{7251001A-0584-4766-A6D7-0E44BBBBDC12}" srcOrd="0" destOrd="0" parTransId="{FE219C25-7519-49A1-80FC-88DBD277BE7B}" sibTransId="{3A3E3377-B627-44C2-A026-04B55D885A13}"/>
+    <dgm:cxn modelId="{864443B7-827D-40CA-9151-FBD8FCDA144A}" srcId="{15A2342C-342E-4AF1-ABFE-6D641BAF41A1}" destId="{AE734D0A-6694-40AA-8661-A4F047D5E4D9}" srcOrd="1" destOrd="0" parTransId="{CCB97636-127D-4739-A837-C723B7836880}" sibTransId="{158A9BB4-6738-46A4-AC17-D8A26414D5F7}"/>
+    <dgm:cxn modelId="{7F4D6DDB-3D42-4FF2-B68F-28BE1A3A21C0}" type="presOf" srcId="{08DDB7E5-F95F-4C23-8B95-48DA1C9E93D2}" destId="{8FBC2C5D-9E47-4B2D-8CC0-0827ADC6EE57}" srcOrd="0" destOrd="6" presId="urn:microsoft.com/office/officeart/2005/8/layout/chevron2"/>
+    <dgm:cxn modelId="{26A054A0-1AB4-43B6-8F58-0FC6C712A2A4}" srcId="{15A2342C-342E-4AF1-ABFE-6D641BAF41A1}" destId="{CBA4680F-B921-4539-96E8-73E248B26438}" srcOrd="0" destOrd="0" parTransId="{CFA20A3C-0F95-4996-A60F-CD8C5D7EA0C8}" sibTransId="{66C95EC4-2BD0-44E1-98AF-5AEB75A287A4}"/>
+    <dgm:cxn modelId="{0AA7C964-F08A-434D-849D-CB60E50F510C}" type="presOf" srcId="{FDFD6E2B-DBAB-4056-BC28-C138724F0441}" destId="{0837024A-932D-4B89-A5B5-1646702B04D6}" srcOrd="0" destOrd="0" presId="urn:microsoft.com/office/officeart/2005/8/layout/chevron2"/>
+    <dgm:cxn modelId="{3F563856-5C53-4991-879E-670B56271005}" srcId="{FDFD6E2B-DBAB-4056-BC28-C138724F0441}" destId="{45C4846E-AAF6-4414-A05E-6E85D7726DF6}" srcOrd="2" destOrd="0" parTransId="{83ABFF28-F69F-4FC1-AB0A-416CFB4266E6}" sibTransId="{671C2D96-D26C-4FB6-9BA5-31D234280E86}"/>
+    <dgm:cxn modelId="{0F1FCF35-87E1-46EF-BBCE-B90273773B0D}" type="presOf" srcId="{991745B4-1DA6-4357-834D-E175CBA5F7FF}" destId="{8FBC2C5D-9E47-4B2D-8CC0-0827ADC6EE57}" srcOrd="0" destOrd="1" presId="urn:microsoft.com/office/officeart/2005/8/layout/chevron2"/>
+    <dgm:cxn modelId="{AA9F0954-E312-4F59-A538-78CB15CA0648}" srcId="{FDFD6E2B-DBAB-4056-BC28-C138724F0441}" destId="{732042B1-94D3-42FA-A258-6BB06EBE3E3B}" srcOrd="4" destOrd="0" parTransId="{EAAEE230-65A9-4651-A41F-BB57449114C8}" sibTransId="{D2C603BD-ADB1-4E88-A685-49632CB1E3B4}"/>
+    <dgm:cxn modelId="{C16B3C40-8104-4248-9B16-0226FC236EFD}" type="presOf" srcId="{AE734D0A-6694-40AA-8661-A4F047D5E4D9}" destId="{5FDFAD45-BE3A-42C7-96F9-147D175477B9}" srcOrd="0" destOrd="1" presId="urn:microsoft.com/office/officeart/2005/8/layout/chevron2"/>
+    <dgm:cxn modelId="{B9F397F0-7A59-4437-81F7-0BEB182623E3}" srcId="{FDFD6E2B-DBAB-4056-BC28-C138724F0441}" destId="{1693A56B-51EB-4EEE-B5A0-2587A76BB504}" srcOrd="0" destOrd="0" parTransId="{71605052-445C-4B49-9A4B-2DCF504AD115}" sibTransId="{84E281FA-B092-4FA8-A2AE-CFCEA05B4214}"/>
+    <dgm:cxn modelId="{6A1FF4D6-2CF6-4582-BEEF-FA9D275C9BB3}" type="presOf" srcId="{45C4846E-AAF6-4414-A05E-6E85D7726DF6}" destId="{8FBC2C5D-9E47-4B2D-8CC0-0827ADC6EE57}" srcOrd="0" destOrd="2" presId="urn:microsoft.com/office/officeart/2005/8/layout/chevron2"/>
     <dgm:cxn modelId="{58890E05-AD91-4C6E-AFAF-1570690574EA}" type="presOf" srcId="{B56C8652-49D2-40A6-9CA3-CE8DCF0946F5}" destId="{142F673A-C255-456D-9E41-60A8F8DECB23}" srcOrd="0" destOrd="0" presId="urn:microsoft.com/office/officeart/2005/8/layout/chevron2"/>
-    <dgm:cxn modelId="{DBC7E407-9897-43CC-9C3A-E44E5BA3D393}" srcId="{FDFD6E2B-DBAB-4056-BC28-C138724F0441}" destId="{5EEE87EF-CC69-46CA-991B-C6EF45468841}" srcOrd="5" destOrd="0" parTransId="{3991E14B-A14C-40AF-9607-91EE68B84F4F}" sibTransId="{B0172526-43A0-4BDC-8318-EC52C2D54827}"/>
-    <dgm:cxn modelId="{890C6129-FED3-4F32-A1CE-803923CC13FB}" srcId="{B56C8652-49D2-40A6-9CA3-CE8DCF0946F5}" destId="{A21E80E9-3E30-4727-979B-CC3F1A7A22C5}" srcOrd="1" destOrd="0" parTransId="{5C40DCA5-A5ED-48F4-971B-7B525589E1B6}" sibTransId="{2E128CC8-58D8-49C7-B524-7F998825E08C}"/>
-    <dgm:cxn modelId="{0F1FCF35-87E1-46EF-BBCE-B90273773B0D}" type="presOf" srcId="{991745B4-1DA6-4357-834D-E175CBA5F7FF}" destId="{8FBC2C5D-9E47-4B2D-8CC0-0827ADC6EE57}" srcOrd="0" destOrd="1" presId="urn:microsoft.com/office/officeart/2005/8/layout/chevron2"/>
-    <dgm:cxn modelId="{F5DA283E-18B8-4545-BA85-552B99631C05}" type="presOf" srcId="{5EEE87EF-CC69-46CA-991B-C6EF45468841}" destId="{8FBC2C5D-9E47-4B2D-8CC0-0827ADC6EE57}" srcOrd="0" destOrd="5" presId="urn:microsoft.com/office/officeart/2005/8/layout/chevron2"/>
-    <dgm:cxn modelId="{C16B3C40-8104-4248-9B16-0226FC236EFD}" type="presOf" srcId="{AE734D0A-6694-40AA-8661-A4F047D5E4D9}" destId="{5FDFAD45-BE3A-42C7-96F9-147D175477B9}" srcOrd="0" destOrd="1" presId="urn:microsoft.com/office/officeart/2005/8/layout/chevron2"/>
-    <dgm:cxn modelId="{28F4B55F-1626-4A11-B2A3-6C5FBCF466EE}" type="presOf" srcId="{CBA4680F-B921-4539-96E8-73E248B26438}" destId="{5FDFAD45-BE3A-42C7-96F9-147D175477B9}" srcOrd="0" destOrd="0" presId="urn:microsoft.com/office/officeart/2005/8/layout/chevron2"/>
-    <dgm:cxn modelId="{CBE38C60-2AAF-4767-AECB-3298EFA7C80C}" type="presOf" srcId="{15A2342C-342E-4AF1-ABFE-6D641BAF41A1}" destId="{049C38D1-B597-49E9-8B00-78FB12FB25CF}" srcOrd="0" destOrd="0" presId="urn:microsoft.com/office/officeart/2005/8/layout/chevron2"/>
-    <dgm:cxn modelId="{98E93161-C30E-43AA-AF6B-299C6C6168AE}" srcId="{A21E80E9-3E30-4727-979B-CC3F1A7A22C5}" destId="{7251001A-0584-4766-A6D7-0E44BBBBDC12}" srcOrd="0" destOrd="0" parTransId="{FE219C25-7519-49A1-80FC-88DBD277BE7B}" sibTransId="{3A3E3377-B627-44C2-A026-04B55D885A13}"/>
-    <dgm:cxn modelId="{0AA7C964-F08A-434D-849D-CB60E50F510C}" type="presOf" srcId="{FDFD6E2B-DBAB-4056-BC28-C138724F0441}" destId="{0837024A-932D-4B89-A5B5-1646702B04D6}" srcOrd="0" destOrd="0" presId="urn:microsoft.com/office/officeart/2005/8/layout/chevron2"/>
     <dgm:cxn modelId="{331E5267-3B46-40FC-807B-5869C9435943}" srcId="{B56C8652-49D2-40A6-9CA3-CE8DCF0946F5}" destId="{FDFD6E2B-DBAB-4056-BC28-C138724F0441}" srcOrd="2" destOrd="0" parTransId="{A185C7BD-8F3D-48FC-AACD-370FC7051347}" sibTransId="{2EAE1DED-33EB-4BB9-B279-4AEA7E7C396D}"/>
-    <dgm:cxn modelId="{8F2FDC48-E40A-425B-870D-62187B5D42A9}" srcId="{FDFD6E2B-DBAB-4056-BC28-C138724F0441}" destId="{5FE0594D-1D7D-4AA8-819B-A2C743D5CEF2}" srcOrd="3" destOrd="0" parTransId="{1CA14089-09CF-4046-9D0C-3DFC6A05542D}" sibTransId="{F95BCFE4-CFE1-4C2D-8293-9326323C655E}"/>
+    <dgm:cxn modelId="{86D5B1B6-FC3B-40C9-B662-895EFF0C484F}" type="presOf" srcId="{1693A56B-51EB-4EEE-B5A0-2587A76BB504}" destId="{8FBC2C5D-9E47-4B2D-8CC0-0827ADC6EE57}" srcOrd="0" destOrd="0" presId="urn:microsoft.com/office/officeart/2005/8/layout/chevron2"/>
     <dgm:cxn modelId="{076CC86B-D690-4BFD-AA13-22E5FF304401}" srcId="{FDFD6E2B-DBAB-4056-BC28-C138724F0441}" destId="{991745B4-1DA6-4357-834D-E175CBA5F7FF}" srcOrd="1" destOrd="0" parTransId="{7F7C2FE2-A92E-4E57-852A-1760217EC7AA}" sibTransId="{80503291-0CA3-4264-9D8A-213B3DAD3BF7}"/>
-    <dgm:cxn modelId="{AA9F0954-E312-4F59-A538-78CB15CA0648}" srcId="{FDFD6E2B-DBAB-4056-BC28-C138724F0441}" destId="{732042B1-94D3-42FA-A258-6BB06EBE3E3B}" srcOrd="4" destOrd="0" parTransId="{EAAEE230-65A9-4651-A41F-BB57449114C8}" sibTransId="{D2C603BD-ADB1-4E88-A685-49632CB1E3B4}"/>
-    <dgm:cxn modelId="{3F563856-5C53-4991-879E-670B56271005}" srcId="{FDFD6E2B-DBAB-4056-BC28-C138724F0441}" destId="{45C4846E-AAF6-4414-A05E-6E85D7726DF6}" srcOrd="2" destOrd="0" parTransId="{83ABFF28-F69F-4FC1-AB0A-416CFB4266E6}" sibTransId="{671C2D96-D26C-4FB6-9BA5-31D234280E86}"/>
     <dgm:cxn modelId="{FD15FF7D-7615-413A-936D-840A88CEEF81}" type="presOf" srcId="{7251001A-0584-4766-A6D7-0E44BBBBDC12}" destId="{3EE3D444-F1E2-4D81-B343-EEB78C9B7BC2}" srcOrd="0" destOrd="0" presId="urn:microsoft.com/office/officeart/2005/8/layout/chevron2"/>
     <dgm:cxn modelId="{2A878A9C-A599-4E25-8F35-179342BC54EF}" srcId="{B56C8652-49D2-40A6-9CA3-CE8DCF0946F5}" destId="{15A2342C-342E-4AF1-ABFE-6D641BAF41A1}" srcOrd="0" destOrd="0" parTransId="{3113E09E-2B5D-47FE-89F9-BC4D9A8CB38B}" sibTransId="{3091C5B6-412E-4FA9-921C-1CCBB20FB078}"/>
-    <dgm:cxn modelId="{26A054A0-1AB4-43B6-8F58-0FC6C712A2A4}" srcId="{15A2342C-342E-4AF1-ABFE-6D641BAF41A1}" destId="{CBA4680F-B921-4539-96E8-73E248B26438}" srcOrd="0" destOrd="0" parTransId="{CFA20A3C-0F95-4996-A60F-CD8C5D7EA0C8}" sibTransId="{66C95EC4-2BD0-44E1-98AF-5AEB75A287A4}"/>
-    <dgm:cxn modelId="{B51378A4-5D0E-4C4B-B23C-D4EAD7678B6D}" type="presOf" srcId="{5FE0594D-1D7D-4AA8-819B-A2C743D5CEF2}" destId="{8FBC2C5D-9E47-4B2D-8CC0-0827ADC6EE57}" srcOrd="0" destOrd="3" presId="urn:microsoft.com/office/officeart/2005/8/layout/chevron2"/>
-    <dgm:cxn modelId="{86D5B1B6-FC3B-40C9-B662-895EFF0C484F}" type="presOf" srcId="{1693A56B-51EB-4EEE-B5A0-2587A76BB504}" destId="{8FBC2C5D-9E47-4B2D-8CC0-0827ADC6EE57}" srcOrd="0" destOrd="0" presId="urn:microsoft.com/office/officeart/2005/8/layout/chevron2"/>
-    <dgm:cxn modelId="{864443B7-827D-40CA-9151-FBD8FCDA144A}" srcId="{15A2342C-342E-4AF1-ABFE-6D641BAF41A1}" destId="{AE734D0A-6694-40AA-8661-A4F047D5E4D9}" srcOrd="1" destOrd="0" parTransId="{CCB97636-127D-4739-A837-C723B7836880}" sibTransId="{158A9BB4-6738-46A4-AC17-D8A26414D5F7}"/>
-    <dgm:cxn modelId="{F72680C9-96BF-47B8-9EA1-790C7398DC53}" srcId="{FDFD6E2B-DBAB-4056-BC28-C138724F0441}" destId="{08DDB7E5-F95F-4C23-8B95-48DA1C9E93D2}" srcOrd="6" destOrd="0" parTransId="{17D3B376-5FA3-4529-8A20-009F64A5009F}" sibTransId="{2211239D-722D-4F53-AAEA-314BB74C3C5C}"/>
-    <dgm:cxn modelId="{A1DC73D2-C866-4AF8-8F66-31BBE9AE94F7}" type="presOf" srcId="{732042B1-94D3-42FA-A258-6BB06EBE3E3B}" destId="{8FBC2C5D-9E47-4B2D-8CC0-0827ADC6EE57}" srcOrd="0" destOrd="4" presId="urn:microsoft.com/office/officeart/2005/8/layout/chevron2"/>
-    <dgm:cxn modelId="{6A1FF4D6-2CF6-4582-BEEF-FA9D275C9BB3}" type="presOf" srcId="{45C4846E-AAF6-4414-A05E-6E85D7726DF6}" destId="{8FBC2C5D-9E47-4B2D-8CC0-0827ADC6EE57}" srcOrd="0" destOrd="2" presId="urn:microsoft.com/office/officeart/2005/8/layout/chevron2"/>
-    <dgm:cxn modelId="{7F4D6DDB-3D42-4FF2-B68F-28BE1A3A21C0}" type="presOf" srcId="{08DDB7E5-F95F-4C23-8B95-48DA1C9E93D2}" destId="{8FBC2C5D-9E47-4B2D-8CC0-0827ADC6EE57}" srcOrd="0" destOrd="6" presId="urn:microsoft.com/office/officeart/2005/8/layout/chevron2"/>
-    <dgm:cxn modelId="{B9F397F0-7A59-4437-81F7-0BEB182623E3}" srcId="{FDFD6E2B-DBAB-4056-BC28-C138724F0441}" destId="{1693A56B-51EB-4EEE-B5A0-2587A76BB504}" srcOrd="0" destOrd="0" parTransId="{71605052-445C-4B49-9A4B-2DCF504AD115}" sibTransId="{84E281FA-B092-4FA8-A2AE-CFCEA05B4214}"/>
-    <dgm:cxn modelId="{82F94CF7-E0DE-440A-B1D1-883572629C8B}" type="presOf" srcId="{A21E80E9-3E30-4727-979B-CC3F1A7A22C5}" destId="{8EB604FD-2448-4F33-9F96-EAFE912047E9}" srcOrd="0" destOrd="0" presId="urn:microsoft.com/office/officeart/2005/8/layout/chevron2"/>
     <dgm:cxn modelId="{13250355-16DD-4CD2-9C12-90DB9DA37F12}" type="presParOf" srcId="{142F673A-C255-456D-9E41-60A8F8DECB23}" destId="{4D46CCB9-E0D7-49E4-8700-7CE19FB27C88}" srcOrd="0" destOrd="0" presId="urn:microsoft.com/office/officeart/2005/8/layout/chevron2"/>
     <dgm:cxn modelId="{817BC056-467A-4A41-A953-E66324C2905D}" type="presParOf" srcId="{4D46CCB9-E0D7-49E4-8700-7CE19FB27C88}" destId="{049C38D1-B597-49E9-8B00-78FB12FB25CF}" srcOrd="0" destOrd="0" presId="urn:microsoft.com/office/officeart/2005/8/layout/chevron2"/>
     <dgm:cxn modelId="{9630092D-D071-4A9D-86C1-D2F2FD525441}" type="presParOf" srcId="{4D46CCB9-E0D7-49E4-8700-7CE19FB27C88}" destId="{5FDFAD45-BE3A-42C7-96F9-147D175477B9}" srcOrd="1" destOrd="0" presId="urn:microsoft.com/office/officeart/2005/8/layout/chevron2"/>
@@ -6974,17 +7121,100 @@
         <a:bodyPr/>
         <a:lstStyle/>
         <a:p>
+          <a:pPr algn="l">
+            <a:buNone/>
+          </a:pPr>
+          <a:r>
+            <a:rPr lang="en-US" sz="1800" u="sng" dirty="0"/>
+            <a:t>~/data/processed/</a:t>
+          </a:r>
+        </a:p>
+      </dgm:t>
+    </dgm:pt>
+    <dgm:pt modelId="{CFA20A3C-0F95-4996-A60F-CD8C5D7EA0C8}" type="parTrans" cxnId="{26A054A0-1AB4-43B6-8F58-0FC6C712A2A4}">
+      <dgm:prSet/>
+      <dgm:spPr/>
+      <dgm:t>
+        <a:bodyPr/>
+        <a:lstStyle/>
+        <a:p>
+          <a:endParaRPr lang="en-US"/>
+        </a:p>
+      </dgm:t>
+    </dgm:pt>
+    <dgm:pt modelId="{66C95EC4-2BD0-44E1-98AF-5AEB75A287A4}" type="sibTrans" cxnId="{26A054A0-1AB4-43B6-8F58-0FC6C712A2A4}">
+      <dgm:prSet/>
+      <dgm:spPr/>
+      <dgm:t>
+        <a:bodyPr/>
+        <a:lstStyle/>
+        <a:p>
+          <a:endParaRPr lang="en-US"/>
+        </a:p>
+      </dgm:t>
+    </dgm:pt>
+    <dgm:pt modelId="{A21E80E9-3E30-4727-979B-CC3F1A7A22C5}">
+      <dgm:prSet phldrT="[Text]"/>
+      <dgm:spPr/>
+      <dgm:t>
+        <a:bodyPr/>
+        <a:lstStyle/>
+        <a:p>
+          <a:r>
+            <a:rPr lang="en-US" dirty="0"/>
+            <a:t>Script Program</a:t>
+          </a:r>
+        </a:p>
+      </dgm:t>
+    </dgm:pt>
+    <dgm:pt modelId="{5C40DCA5-A5ED-48F4-971B-7B525589E1B6}" type="parTrans" cxnId="{890C6129-FED3-4F32-A1CE-803923CC13FB}">
+      <dgm:prSet/>
+      <dgm:spPr/>
+      <dgm:t>
+        <a:bodyPr/>
+        <a:lstStyle/>
+        <a:p>
+          <a:endParaRPr lang="en-US"/>
+        </a:p>
+      </dgm:t>
+    </dgm:pt>
+    <dgm:pt modelId="{2E128CC8-58D8-49C7-B524-7F998825E08C}" type="sibTrans" cxnId="{890C6129-FED3-4F32-A1CE-803923CC13FB}">
+      <dgm:prSet/>
+      <dgm:spPr/>
+      <dgm:t>
+        <a:bodyPr/>
+        <a:lstStyle/>
+        <a:p>
+          <a:endParaRPr lang="en-US"/>
+        </a:p>
+      </dgm:t>
+    </dgm:pt>
+    <dgm:pt modelId="{7251001A-0584-4766-A6D7-0E44BBBBDC12}">
+      <dgm:prSet phldrT="[Text]" custT="1"/>
+      <dgm:spPr/>
+      <dgm:t>
+        <a:bodyPr/>
+        <a:lstStyle/>
+        <a:p>
           <a:pPr>
             <a:buNone/>
           </a:pPr>
           <a:r>
-            <a:rPr lang="en-US" sz="1400" u="sng" dirty="0"/>
-            <a:t>~/data/processed/</a:t>
+            <a:rPr lang="en-US" sz="2000" u="none" dirty="0"/>
+            <a:t>~/</a:t>
+          </a:r>
+          <a:r>
+            <a:rPr lang="en-US" sz="2000" dirty="0" err="1"/>
+            <a:t>analysis_scripts</a:t>
+          </a:r>
+          <a:r>
+            <a:rPr lang="en-US" sz="2000" dirty="0"/>
+            <a:t>/2A_optimization_data.R</a:t>
           </a:r>
         </a:p>
       </dgm:t>
     </dgm:pt>
-    <dgm:pt modelId="{CFA20A3C-0F95-4996-A60F-CD8C5D7EA0C8}" type="parTrans" cxnId="{26A054A0-1AB4-43B6-8F58-0FC6C712A2A4}">
+    <dgm:pt modelId="{FE219C25-7519-49A1-80FC-88DBD277BE7B}" type="parTrans" cxnId="{98E93161-C30E-43AA-AF6B-299C6C6168AE}">
       <dgm:prSet/>
       <dgm:spPr/>
       <dgm:t>
@@ -6995,7 +7225,7 @@
         </a:p>
       </dgm:t>
     </dgm:pt>
-    <dgm:pt modelId="{66C95EC4-2BD0-44E1-98AF-5AEB75A287A4}" type="sibTrans" cxnId="{26A054A0-1AB4-43B6-8F58-0FC6C712A2A4}">
+    <dgm:pt modelId="{3A3E3377-B627-44C2-A026-04B55D885A13}" type="sibTrans" cxnId="{98E93161-C30E-43AA-AF6B-299C6C6168AE}">
       <dgm:prSet/>
       <dgm:spPr/>
       <dgm:t>
@@ -7006,7 +7236,7 @@
         </a:p>
       </dgm:t>
     </dgm:pt>
-    <dgm:pt modelId="{A21E80E9-3E30-4727-979B-CC3F1A7A22C5}">
+    <dgm:pt modelId="{FDFD6E2B-DBAB-4056-BC28-C138724F0441}">
       <dgm:prSet phldrT="[Text]"/>
       <dgm:spPr/>
       <dgm:t>
@@ -7015,12 +7245,12 @@
         <a:p>
           <a:r>
             <a:rPr lang="en-US" dirty="0"/>
-            <a:t>Script Program</a:t>
+            <a:t>Output</a:t>
           </a:r>
         </a:p>
       </dgm:t>
     </dgm:pt>
-    <dgm:pt modelId="{5C40DCA5-A5ED-48F4-971B-7B525589E1B6}" type="parTrans" cxnId="{890C6129-FED3-4F32-A1CE-803923CC13FB}">
+    <dgm:pt modelId="{A185C7BD-8F3D-48FC-AACD-370FC7051347}" type="parTrans" cxnId="{331E5267-3B46-40FC-807B-5869C9435943}">
       <dgm:prSet/>
       <dgm:spPr/>
       <dgm:t>
@@ -7031,7 +7261,7 @@
         </a:p>
       </dgm:t>
     </dgm:pt>
-    <dgm:pt modelId="{2E128CC8-58D8-49C7-B524-7F998825E08C}" type="sibTrans" cxnId="{890C6129-FED3-4F32-A1CE-803923CC13FB}">
+    <dgm:pt modelId="{2EAE1DED-33EB-4BB9-B279-4AEA7E7C396D}" type="sibTrans" cxnId="{331E5267-3B46-40FC-807B-5869C9435943}">
       <dgm:prSet/>
       <dgm:spPr/>
       <dgm:t>
@@ -7042,7 +7272,7 @@
         </a:p>
       </dgm:t>
     </dgm:pt>
-    <dgm:pt modelId="{7251001A-0584-4766-A6D7-0E44BBBBDC12}">
+    <dgm:pt modelId="{1693A56B-51EB-4EEE-B5A0-2587A76BB504}">
       <dgm:prSet phldrT="[Text]" custT="1"/>
       <dgm:spPr/>
       <dgm:t>
@@ -7053,21 +7283,28 @@
             <a:buNone/>
           </a:pPr>
           <a:r>
-            <a:rPr lang="en-US" sz="2000" u="none" dirty="0"/>
+            <a:rPr lang="en-US" sz="1600" u="none" dirty="0"/>
             <a:t>~/</a:t>
           </a:r>
           <a:r>
-            <a:rPr lang="en-US" sz="2000" dirty="0" err="1"/>
-            <a:t>analysis_scripts</a:t>
-          </a:r>
-          <a:r>
-            <a:rPr lang="en-US" sz="2000" dirty="0"/>
-            <a:t>/2A_optimization_data.R</a:t>
-          </a:r>
+            <a:rPr lang="en-US" sz="1600" dirty="0"/>
+            <a:t>data/processed</a:t>
+          </a:r>
+          <a:r>
+            <a:rPr lang="en-US" sz="1600" dirty="0" smtClean="0"/>
+            <a:t>/</a:t>
+          </a:r>
+          <a:endParaRPr lang="en-US" sz="1600" dirty="0">
+            <a:solidFill>
+              <a:schemeClr val="bg1">
+                <a:lumMod val="50000"/>
+              </a:schemeClr>
+            </a:solidFill>
+          </a:endParaRPr>
         </a:p>
       </dgm:t>
     </dgm:pt>
-    <dgm:pt modelId="{FE219C25-7519-49A1-80FC-88DBD277BE7B}" type="parTrans" cxnId="{98E93161-C30E-43AA-AF6B-299C6C6168AE}">
+    <dgm:pt modelId="{71605052-445C-4B49-9A4B-2DCF504AD115}" type="parTrans" cxnId="{B9F397F0-7A59-4437-81F7-0BEB182623E3}">
       <dgm:prSet/>
       <dgm:spPr/>
       <dgm:t>
@@ -7078,7 +7315,7 @@
         </a:p>
       </dgm:t>
     </dgm:pt>
-    <dgm:pt modelId="{3A3E3377-B627-44C2-A026-04B55D885A13}" type="sibTrans" cxnId="{98E93161-C30E-43AA-AF6B-299C6C6168AE}">
+    <dgm:pt modelId="{84E281FA-B092-4FA8-A2AE-CFCEA05B4214}" type="sibTrans" cxnId="{B9F397F0-7A59-4437-81F7-0BEB182623E3}">
       <dgm:prSet/>
       <dgm:spPr/>
       <dgm:t>
@@ -7089,21 +7326,55 @@
         </a:p>
       </dgm:t>
     </dgm:pt>
-    <dgm:pt modelId="{FDFD6E2B-DBAB-4056-BC28-C138724F0441}">
-      <dgm:prSet phldrT="[Text]"/>
+    <dgm:pt modelId="{958DC5F8-13C6-4060-9DA7-572015EE948E}">
+      <dgm:prSet phldrT="[Text]" custT="1"/>
       <dgm:spPr/>
       <dgm:t>
         <a:bodyPr/>
         <a:lstStyle/>
         <a:p>
-          <a:r>
-            <a:rPr lang="en-US" dirty="0"/>
-            <a:t>Output</a:t>
-          </a:r>
+          <a:pPr algn="l">
+            <a:buNone/>
+          </a:pPr>
+          <a:r>
+            <a:rPr lang="en-US" sz="1800" u="none" dirty="0" err="1" smtClean="0"/>
+            <a:t>grid_goa.RData</a:t>
+          </a:r>
+          <a:r>
+            <a:rPr lang="en-US" sz="1800" u="none" dirty="0"/>
+            <a:t>: </a:t>
+          </a:r>
+          <a:r>
+            <a:rPr lang="en-US" sz="1800" i="0" u="none" dirty="0">
+              <a:solidFill>
+                <a:schemeClr val="bg1">
+                  <a:lumMod val="50000"/>
+                </a:schemeClr>
+              </a:solidFill>
+            </a:rPr>
+            <a:t>goa grid with </a:t>
+          </a:r>
+          <a:r>
+            <a:rPr lang="en-US" sz="1800" i="0" u="none" dirty="0" smtClean="0">
+              <a:solidFill>
+                <a:schemeClr val="bg1">
+                  <a:lumMod val="50000"/>
+                </a:schemeClr>
+              </a:solidFill>
+            </a:rPr>
+            <a:t>bathymetry</a:t>
+          </a:r>
+          <a:endParaRPr lang="en-US" sz="1800" i="0" u="none" dirty="0">
+            <a:solidFill>
+              <a:schemeClr val="bg1">
+                <a:lumMod val="50000"/>
+              </a:schemeClr>
+            </a:solidFill>
+          </a:endParaRPr>
         </a:p>
       </dgm:t>
     </dgm:pt>
-    <dgm:pt modelId="{A185C7BD-8F3D-48FC-AACD-370FC7051347}" type="parTrans" cxnId="{331E5267-3B46-40FC-807B-5869C9435943}">
+    <dgm:pt modelId="{92C2B2B2-DF39-4F92-9E36-6142C56C5522}" type="parTrans" cxnId="{0326A130-63ED-4980-A431-4DB3F63EF895}">
       <dgm:prSet/>
       <dgm:spPr/>
       <dgm:t>
@@ -7114,7 +7385,7 @@
         </a:p>
       </dgm:t>
     </dgm:pt>
-    <dgm:pt modelId="{2EAE1DED-33EB-4BB9-B279-4AEA7E7C396D}" type="sibTrans" cxnId="{331E5267-3B46-40FC-807B-5869C9435943}">
+    <dgm:pt modelId="{BDE7F979-986D-43E2-824A-8A00B1EF1534}" type="sibTrans" cxnId="{0326A130-63ED-4980-A431-4DB3F63EF895}">
       <dgm:prSet/>
       <dgm:spPr/>
       <dgm:t>
@@ -7125,7 +7396,79 @@
         </a:p>
       </dgm:t>
     </dgm:pt>
-    <dgm:pt modelId="{1693A56B-51EB-4EEE-B5A0-2587A76BB504}">
+    <dgm:pt modelId="{DD72F1AC-36A9-4FC9-B3DD-284B7304268B}">
+      <dgm:prSet phldrT="[Text]" custT="1"/>
+      <dgm:spPr/>
+      <dgm:t>
+        <a:bodyPr/>
+        <a:lstStyle/>
+        <a:p>
+          <a:pPr algn="l">
+            <a:buNone/>
+          </a:pPr>
+          <a:r>
+            <a:rPr lang="en-US" sz="1800" i="0" u="none" dirty="0" err="1" smtClean="0">
+              <a:solidFill>
+                <a:schemeClr val="tx1"/>
+              </a:solidFill>
+            </a:rPr>
+            <a:t>prednll_VAST_models.Rdata</a:t>
+          </a:r>
+          <a:r>
+            <a:rPr lang="en-US" sz="1800" i="0" u="none" dirty="0" smtClean="0">
+              <a:solidFill>
+                <a:schemeClr val="tx1"/>
+              </a:solidFill>
+            </a:rPr>
+            <a:t>: </a:t>
+          </a:r>
+          <a:r>
+            <a:rPr lang="en-US" sz="1800" i="0" u="none" dirty="0" err="1" smtClean="0">
+              <a:solidFill>
+                <a:schemeClr val="tx1"/>
+              </a:solidFill>
+            </a:rPr>
+            <a:t>dataframe</a:t>
+          </a:r>
+          <a:r>
+            <a:rPr lang="en-US" sz="1800" i="0" u="none" dirty="0" smtClean="0">
+              <a:solidFill>
+                <a:schemeClr val="tx1"/>
+              </a:solidFill>
+            </a:rPr>
+            <a:t> with VAST 10-fold cross-validation results for each species</a:t>
+          </a:r>
+          <a:endParaRPr lang="en-US" sz="1800" i="0" u="none" dirty="0">
+            <a:solidFill>
+              <a:schemeClr val="tx1"/>
+            </a:solidFill>
+          </a:endParaRPr>
+        </a:p>
+      </dgm:t>
+    </dgm:pt>
+    <dgm:pt modelId="{278A84E8-AB0B-498A-88F0-D7815C0E6EBE}" type="parTrans" cxnId="{8F292043-0AE3-4A7F-922F-280AA19022B7}">
+      <dgm:prSet/>
+      <dgm:spPr/>
+      <dgm:t>
+        <a:bodyPr/>
+        <a:lstStyle/>
+        <a:p>
+          <a:endParaRPr lang="en-US"/>
+        </a:p>
+      </dgm:t>
+    </dgm:pt>
+    <dgm:pt modelId="{52B77427-3B7D-4B9E-B3D0-BFAE29C78F62}" type="sibTrans" cxnId="{8F292043-0AE3-4A7F-922F-280AA19022B7}">
+      <dgm:prSet/>
+      <dgm:spPr/>
+      <dgm:t>
+        <a:bodyPr/>
+        <a:lstStyle/>
+        <a:p>
+          <a:endParaRPr lang="en-US"/>
+        </a:p>
+      </dgm:t>
+    </dgm:pt>
+    <dgm:pt modelId="{4891FD67-D496-43B1-AAAA-FB43CACB8134}">
       <dgm:prSet phldrT="[Text]" custT="1"/>
       <dgm:spPr/>
       <dgm:t>
@@ -7136,23 +7479,73 @@
             <a:buNone/>
           </a:pPr>
           <a:r>
-            <a:rPr lang="en-US" sz="1800" u="none" dirty="0"/>
-            <a:t>~/</a:t>
-          </a:r>
-          <a:r>
-            <a:rPr lang="en-US" sz="1800" dirty="0"/>
-            <a:t>data/processed/</a:t>
-          </a:r>
-          <a:r>
-            <a:rPr lang="en-US" sz="1800" dirty="0" err="1"/>
+            <a:rPr lang="en-US" sz="1600" dirty="0" err="1" smtClean="0">
+              <a:solidFill>
+                <a:schemeClr val="tx1"/>
+              </a:solidFill>
+            </a:rPr>
+            <a:t>dens_vals_measurement.RData</a:t>
+          </a:r>
+          <a:r>
+            <a:rPr lang="en-US" sz="1600" dirty="0" smtClean="0">
+              <a:solidFill>
+                <a:schemeClr val="tx1"/>
+              </a:solidFill>
+            </a:rPr>
+            <a:t>: predicted density based on the simulating measurement error conditioned on the fixed and random effects from VAST</a:t>
+          </a:r>
+          <a:endParaRPr lang="en-US" sz="1600" dirty="0">
+            <a:solidFill>
+              <a:schemeClr val="bg1">
+                <a:lumMod val="50000"/>
+              </a:schemeClr>
+            </a:solidFill>
+          </a:endParaRPr>
+        </a:p>
+      </dgm:t>
+    </dgm:pt>
+    <dgm:pt modelId="{521644B0-E40C-4932-B70C-C9278B62866E}" type="parTrans" cxnId="{2B3F665E-6C26-4C8C-8925-3FA18AD3448C}">
+      <dgm:prSet/>
+      <dgm:spPr/>
+      <dgm:t>
+        <a:bodyPr/>
+        <a:lstStyle/>
+        <a:p>
+          <a:endParaRPr lang="en-US"/>
+        </a:p>
+      </dgm:t>
+    </dgm:pt>
+    <dgm:pt modelId="{921942D5-F19D-4E5F-B814-4F4FA6126DFC}" type="sibTrans" cxnId="{2B3F665E-6C26-4C8C-8925-3FA18AD3448C}">
+      <dgm:prSet/>
+      <dgm:spPr/>
+      <dgm:t>
+        <a:bodyPr/>
+        <a:lstStyle/>
+        <a:p>
+          <a:endParaRPr lang="en-US"/>
+        </a:p>
+      </dgm:t>
+    </dgm:pt>
+    <dgm:pt modelId="{ABAAE8DB-E2CC-43CB-8D93-71DC9EFC3D10}">
+      <dgm:prSet phldrT="[Text]" custT="1"/>
+      <dgm:spPr/>
+      <dgm:t>
+        <a:bodyPr/>
+        <a:lstStyle/>
+        <a:p>
+          <a:pPr>
+            <a:buNone/>
+          </a:pPr>
+          <a:r>
+            <a:rPr lang="en-US" sz="1600" dirty="0" err="1" smtClean="0"/>
             <a:t>optimization_data.RData</a:t>
           </a:r>
           <a:r>
-            <a:rPr lang="en-US" sz="1800" dirty="0"/>
+            <a:rPr lang="en-US" sz="1600" dirty="0"/>
             <a:t>: </a:t>
           </a:r>
           <a:r>
-            <a:rPr lang="en-US" sz="1800" dirty="0">
+            <a:rPr lang="en-US" sz="1600" dirty="0">
               <a:solidFill>
                 <a:schemeClr val="bg1">
                   <a:lumMod val="50000"/>
@@ -7164,7 +7557,7 @@
         </a:p>
       </dgm:t>
     </dgm:pt>
-    <dgm:pt modelId="{71605052-445C-4B49-9A4B-2DCF504AD115}" type="parTrans" cxnId="{B9F397F0-7A59-4437-81F7-0BEB182623E3}">
+    <dgm:pt modelId="{8A59B9EC-BD07-4456-A8DF-54771CAB9EB4}" type="parTrans" cxnId="{CCF631FA-41A2-4046-B2DC-3AA7FEA2E47F}">
       <dgm:prSet/>
       <dgm:spPr/>
       <dgm:t>
@@ -7175,7 +7568,7 @@
         </a:p>
       </dgm:t>
     </dgm:pt>
-    <dgm:pt modelId="{84E281FA-B092-4FA8-A2AE-CFCEA05B4214}" type="sibTrans" cxnId="{B9F397F0-7A59-4437-81F7-0BEB182623E3}">
+    <dgm:pt modelId="{2FE575B9-B4B2-43A2-A60A-5BACBE0F9C57}" type="sibTrans" cxnId="{CCF631FA-41A2-4046-B2DC-3AA7FEA2E47F}">
       <dgm:prSet/>
       <dgm:spPr/>
       <dgm:t>
@@ -7186,7 +7579,7 @@
         </a:p>
       </dgm:t>
     </dgm:pt>
-    <dgm:pt modelId="{958DC5F8-13C6-4060-9DA7-572015EE948E}">
+    <dgm:pt modelId="{C7F13D55-EA84-4653-9F8F-927870A64E81}">
       <dgm:prSet phldrT="[Text]" custT="1"/>
       <dgm:spPr/>
       <dgm:t>
@@ -7197,157 +7590,88 @@
             <a:buNone/>
           </a:pPr>
           <a:r>
-            <a:rPr lang="en-US" sz="1400" u="none" dirty="0"/>
-            <a:t>- </a:t>
-          </a:r>
-          <a:r>
-            <a:rPr lang="en-US" sz="1400" u="none" dirty="0" err="1"/>
-            <a:t>grid_goa.RData</a:t>
-          </a:r>
-          <a:r>
-            <a:rPr lang="en-US" sz="1400" u="none" dirty="0"/>
-            <a:t>: </a:t>
-          </a:r>
-          <a:r>
-            <a:rPr lang="en-US" sz="1400" i="0" u="none" dirty="0">
-              <a:solidFill>
-                <a:schemeClr val="bg1">
-                  <a:lumMod val="50000"/>
-                </a:schemeClr>
-              </a:solidFill>
-            </a:rPr>
-            <a:t>goa grid with bathymetry</a:t>
-          </a:r>
-        </a:p>
-      </dgm:t>
-    </dgm:pt>
-    <dgm:pt modelId="{92C2B2B2-DF39-4F92-9E36-6142C56C5522}" type="parTrans" cxnId="{0326A130-63ED-4980-A431-4DB3F63EF895}">
-      <dgm:prSet/>
-      <dgm:spPr/>
-      <dgm:t>
-        <a:bodyPr/>
-        <a:lstStyle/>
-        <a:p>
-          <a:endParaRPr lang="en-US"/>
-        </a:p>
-      </dgm:t>
-    </dgm:pt>
-    <dgm:pt modelId="{BDE7F979-986D-43E2-824A-8A00B1EF1534}" type="sibTrans" cxnId="{0326A130-63ED-4980-A431-4DB3F63EF895}">
-      <dgm:prSet/>
-      <dgm:spPr/>
-      <dgm:t>
-        <a:bodyPr/>
-        <a:lstStyle/>
-        <a:p>
-          <a:endParaRPr lang="en-US"/>
-        </a:p>
-      </dgm:t>
-    </dgm:pt>
-    <dgm:pt modelId="{F13B17A0-86C6-45C8-A1A1-58051CE11C6F}">
-      <dgm:prSet phldrT="[Text]" custT="1"/>
-      <dgm:spPr/>
-      <dgm:t>
-        <a:bodyPr/>
-        <a:lstStyle/>
-        <a:p>
-          <a:pPr>
-            <a:buNone/>
-          </a:pPr>
-          <a:r>
-            <a:rPr lang="en-US" sz="1400" u="none" dirty="0"/>
-            <a:t>- </a:t>
-          </a:r>
-          <a:r>
-            <a:rPr lang="en-US" sz="1400" u="none" dirty="0" err="1"/>
-            <a:t>VAST_fit_D_gct.Rdata</a:t>
-          </a:r>
-          <a:r>
-            <a:rPr lang="en-US" sz="1400" u="none" dirty="0"/>
-            <a:t>: </a:t>
-          </a:r>
-          <a:r>
-            <a:rPr lang="en-US" sz="1400" u="none" dirty="0">
-              <a:solidFill>
-                <a:schemeClr val="bg1">
-                  <a:lumMod val="50000"/>
-                </a:schemeClr>
-              </a:solidFill>
-            </a:rPr>
-            <a:t>“best” single-species predicted density for each cell (g), species (c) and year (t) in one 3-D array</a:t>
-          </a:r>
-        </a:p>
-      </dgm:t>
-    </dgm:pt>
-    <dgm:pt modelId="{B2B47FC7-5958-4A44-A4CE-453C0A0BC836}" type="parTrans" cxnId="{473431EE-F39C-48EA-A045-B86C38621641}">
-      <dgm:prSet/>
-      <dgm:spPr/>
-      <dgm:t>
-        <a:bodyPr/>
-        <a:lstStyle/>
-        <a:p>
-          <a:endParaRPr lang="en-US"/>
-        </a:p>
-      </dgm:t>
-    </dgm:pt>
-    <dgm:pt modelId="{82F0F7A3-3707-4B24-8D7E-99D069D182AB}" type="sibTrans" cxnId="{473431EE-F39C-48EA-A045-B86C38621641}">
-      <dgm:prSet/>
-      <dgm:spPr/>
-      <dgm:t>
-        <a:bodyPr/>
-        <a:lstStyle/>
-        <a:p>
-          <a:endParaRPr lang="en-US"/>
-        </a:p>
-      </dgm:t>
-    </dgm:pt>
-    <dgm:pt modelId="{AAB741E9-0A62-4A1A-88D2-E166C54108A7}">
-      <dgm:prSet phldrT="[Text]" custT="1"/>
-      <dgm:spPr/>
-      <dgm:t>
-        <a:bodyPr/>
-        <a:lstStyle/>
-        <a:p>
-          <a:pPr>
-            <a:buNone/>
-          </a:pPr>
-          <a:r>
-            <a:rPr lang="en-US" sz="1400" u="none" dirty="0">
+            <a:rPr lang="en-US" sz="1600" dirty="0" err="1" smtClean="0">
               <a:solidFill>
                 <a:schemeClr val="tx1"/>
               </a:solidFill>
             </a:rPr>
-            <a:t>-</a:t>
-          </a:r>
-          <a:r>
-            <a:rPr lang="en-US" sz="1400" u="none" dirty="0" err="1">
+            <a:t>dens_vals_MLE.RData</a:t>
+          </a:r>
+          <a:r>
+            <a:rPr lang="en-US" sz="1600" dirty="0" smtClean="0">
               <a:solidFill>
                 <a:schemeClr val="tx1"/>
               </a:solidFill>
             </a:rPr>
-            <a:t>VAST_fit_I_gct.Rdata</a:t>
-          </a:r>
-          <a:r>
-            <a:rPr lang="en-US" sz="1400" u="none" dirty="0">
+            <a:t>: predicted density based on the maximum likelihood estimates of the fixed and random parameters from VAST</a:t>
+          </a:r>
+          <a:endParaRPr lang="en-US" sz="1600" dirty="0">
+            <a:solidFill>
+              <a:schemeClr val="tx1"/>
+            </a:solidFill>
+          </a:endParaRPr>
+        </a:p>
+      </dgm:t>
+    </dgm:pt>
+    <dgm:pt modelId="{DE372AD7-AE8A-4A5C-85EF-7BBFC4EAD400}" type="parTrans" cxnId="{0A6F4B5C-ED9F-4872-8178-50FFCE0A26DC}">
+      <dgm:prSet/>
+      <dgm:spPr/>
+      <dgm:t>
+        <a:bodyPr/>
+        <a:lstStyle/>
+        <a:p>
+          <a:endParaRPr lang="en-US"/>
+        </a:p>
+      </dgm:t>
+    </dgm:pt>
+    <dgm:pt modelId="{F7D59EE5-C62A-46EB-A804-C93760F2FF41}" type="sibTrans" cxnId="{0A6F4B5C-ED9F-4872-8178-50FFCE0A26DC}">
+      <dgm:prSet/>
+      <dgm:spPr/>
+      <dgm:t>
+        <a:bodyPr/>
+        <a:lstStyle/>
+        <a:p>
+          <a:endParaRPr lang="en-US"/>
+        </a:p>
+      </dgm:t>
+    </dgm:pt>
+    <dgm:pt modelId="{DC7F1DFF-09BB-4B4C-B671-9F3BA266632A}">
+      <dgm:prSet phldrT="[Text]" custT="1"/>
+      <dgm:spPr/>
+      <dgm:t>
+        <a:bodyPr/>
+        <a:lstStyle/>
+        <a:p>
+          <a:pPr>
+            <a:buNone/>
+          </a:pPr>
+          <a:r>
+            <a:rPr lang="en-US" sz="1600" dirty="0" err="1" smtClean="0">
               <a:solidFill>
                 <a:schemeClr val="tx1"/>
               </a:solidFill>
             </a:rPr>
-            <a:t>: </a:t>
-          </a:r>
-          <a:r>
-            <a:rPr lang="en-US" sz="1400" u="none" dirty="0">
+            <a:t>dens_vals_fixed_random.RData</a:t>
+          </a:r>
+          <a:r>
+            <a:rPr lang="en-US" sz="1600" dirty="0" smtClean="0">
               <a:solidFill>
-                <a:schemeClr val="bg1">
-                  <a:lumMod val="50000"/>
-                </a:schemeClr>
+                <a:schemeClr val="tx1"/>
               </a:solidFill>
             </a:rPr>
-            <a:t>“best” single-species predicted abundance for each cell (g), species (c) and year (t) in one 3-D array</a:t>
-          </a:r>
+            <a:t>: predicted density based on the simulating fixed and random effects from VAST</a:t>
+          </a:r>
+          <a:endParaRPr lang="en-US" sz="1600" dirty="0">
+            <a:solidFill>
+              <a:schemeClr val="bg1">
+                <a:lumMod val="50000"/>
+              </a:schemeClr>
+            </a:solidFill>
+          </a:endParaRPr>
         </a:p>
       </dgm:t>
     </dgm:pt>
-    <dgm:pt modelId="{F302E746-C63C-4CF2-BB91-51B229830F31}" type="parTrans" cxnId="{21BAFE6C-EC35-448A-B410-9FE4C9A64DC0}">
+    <dgm:pt modelId="{BBB28F1D-194C-4571-9A62-A6B6EA846AE0}" type="parTrans" cxnId="{B7053CA3-5B0E-459E-92A0-4BCA05754ED6}">
       <dgm:prSet/>
       <dgm:spPr/>
       <dgm:t>
@@ -7358,7 +7682,7 @@
         </a:p>
       </dgm:t>
     </dgm:pt>
-    <dgm:pt modelId="{1B53089C-3F7E-4E98-ADDE-EEC2D993585E}" type="sibTrans" cxnId="{21BAFE6C-EC35-448A-B410-9FE4C9A64DC0}">
+    <dgm:pt modelId="{2B60A694-34C4-4DCD-A380-60E51B32C261}" type="sibTrans" cxnId="{B7053CA3-5B0E-459E-92A0-4BCA05754ED6}">
       <dgm:prSet/>
       <dgm:spPr/>
       <dgm:t>
@@ -7378,6 +7702,13 @@
         </dgm:presLayoutVars>
       </dgm:prSet>
       <dgm:spPr/>
+      <dgm:t>
+        <a:bodyPr/>
+        <a:lstStyle/>
+        <a:p>
+          <a:endParaRPr lang="en-US"/>
+        </a:p>
+      </dgm:t>
     </dgm:pt>
     <dgm:pt modelId="{4D46CCB9-E0D7-49E4-8700-7CE19FB27C88}" type="pres">
       <dgm:prSet presAssocID="{15A2342C-342E-4AF1-ABFE-6D641BAF41A1}" presName="composite" presStyleCnt="0"/>
@@ -7391,14 +7722,28 @@
         </dgm:presLayoutVars>
       </dgm:prSet>
       <dgm:spPr/>
+      <dgm:t>
+        <a:bodyPr/>
+        <a:lstStyle/>
+        <a:p>
+          <a:endParaRPr lang="en-US"/>
+        </a:p>
+      </dgm:t>
     </dgm:pt>
     <dgm:pt modelId="{5FDFAD45-BE3A-42C7-96F9-147D175477B9}" type="pres">
-      <dgm:prSet presAssocID="{15A2342C-342E-4AF1-ABFE-6D641BAF41A1}" presName="descendantText" presStyleLbl="alignAcc1" presStyleIdx="0" presStyleCnt="3" custScaleY="144459">
+      <dgm:prSet presAssocID="{15A2342C-342E-4AF1-ABFE-6D641BAF41A1}" presName="descendantText" presStyleLbl="alignAcc1" presStyleIdx="0" presStyleCnt="3" custScaleY="152854">
         <dgm:presLayoutVars>
           <dgm:bulletEnabled val="1"/>
         </dgm:presLayoutVars>
       </dgm:prSet>
       <dgm:spPr/>
+      <dgm:t>
+        <a:bodyPr/>
+        <a:lstStyle/>
+        <a:p>
+          <a:endParaRPr lang="en-US"/>
+        </a:p>
+      </dgm:t>
     </dgm:pt>
     <dgm:pt modelId="{0B93D529-6A78-4555-B1DB-9F922703E6C7}" type="pres">
       <dgm:prSet presAssocID="{3091C5B6-412E-4FA9-921C-1CCBB20FB078}" presName="sp" presStyleCnt="0"/>
@@ -7416,6 +7761,13 @@
         </dgm:presLayoutVars>
       </dgm:prSet>
       <dgm:spPr/>
+      <dgm:t>
+        <a:bodyPr/>
+        <a:lstStyle/>
+        <a:p>
+          <a:endParaRPr lang="en-US"/>
+        </a:p>
+      </dgm:t>
     </dgm:pt>
     <dgm:pt modelId="{3EE3D444-F1E2-4D81-B343-EEB78C9B7BC2}" type="pres">
       <dgm:prSet presAssocID="{A21E80E9-3E30-4727-979B-CC3F1A7A22C5}" presName="descendantText" presStyleLbl="alignAcc1" presStyleIdx="1" presStyleCnt="3" custScaleY="35851">
@@ -7424,6 +7776,13 @@
         </dgm:presLayoutVars>
       </dgm:prSet>
       <dgm:spPr/>
+      <dgm:t>
+        <a:bodyPr/>
+        <a:lstStyle/>
+        <a:p>
+          <a:endParaRPr lang="en-US"/>
+        </a:p>
+      </dgm:t>
     </dgm:pt>
     <dgm:pt modelId="{56499CC1-1A65-4B3A-8A68-E81F41293563}" type="pres">
       <dgm:prSet presAssocID="{2E128CC8-58D8-49C7-B524-7F998825E08C}" presName="sp" presStyleCnt="0"/>
@@ -7441,36 +7800,56 @@
         </dgm:presLayoutVars>
       </dgm:prSet>
       <dgm:spPr/>
+      <dgm:t>
+        <a:bodyPr/>
+        <a:lstStyle/>
+        <a:p>
+          <a:endParaRPr lang="en-US"/>
+        </a:p>
+      </dgm:t>
     </dgm:pt>
     <dgm:pt modelId="{8FBC2C5D-9E47-4B2D-8CC0-0827ADC6EE57}" type="pres">
-      <dgm:prSet presAssocID="{FDFD6E2B-DBAB-4056-BC28-C138724F0441}" presName="descendantText" presStyleLbl="alignAcc1" presStyleIdx="2" presStyleCnt="3">
+      <dgm:prSet presAssocID="{FDFD6E2B-DBAB-4056-BC28-C138724F0441}" presName="descendantText" presStyleLbl="alignAcc1" presStyleIdx="2" presStyleCnt="3" custScaleY="284064">
         <dgm:presLayoutVars>
           <dgm:bulletEnabled val="1"/>
         </dgm:presLayoutVars>
       </dgm:prSet>
       <dgm:spPr/>
+      <dgm:t>
+        <a:bodyPr/>
+        <a:lstStyle/>
+        <a:p>
+          <a:endParaRPr lang="en-US"/>
+        </a:p>
+      </dgm:t>
     </dgm:pt>
   </dgm:ptLst>
   <dgm:cxnLst>
+    <dgm:cxn modelId="{28F4B55F-1626-4A11-B2A3-6C5FBCF466EE}" type="presOf" srcId="{CBA4680F-B921-4539-96E8-73E248B26438}" destId="{5FDFAD45-BE3A-42C7-96F9-147D175477B9}" srcOrd="0" destOrd="0" presId="urn:microsoft.com/office/officeart/2005/8/layout/chevron2"/>
+    <dgm:cxn modelId="{890C6129-FED3-4F32-A1CE-803923CC13FB}" srcId="{B56C8652-49D2-40A6-9CA3-CE8DCF0946F5}" destId="{A21E80E9-3E30-4727-979B-CC3F1A7A22C5}" srcOrd="1" destOrd="0" parTransId="{5C40DCA5-A5ED-48F4-971B-7B525589E1B6}" sibTransId="{2E128CC8-58D8-49C7-B524-7F998825E08C}"/>
+    <dgm:cxn modelId="{CBE38C60-2AAF-4767-AECB-3298EFA7C80C}" type="presOf" srcId="{15A2342C-342E-4AF1-ABFE-6D641BAF41A1}" destId="{049C38D1-B597-49E9-8B00-78FB12FB25CF}" srcOrd="0" destOrd="0" presId="urn:microsoft.com/office/officeart/2005/8/layout/chevron2"/>
+    <dgm:cxn modelId="{0A6F4B5C-ED9F-4872-8178-50FFCE0A26DC}" srcId="{1693A56B-51EB-4EEE-B5A0-2587A76BB504}" destId="{C7F13D55-EA84-4653-9F8F-927870A64E81}" srcOrd="1" destOrd="0" parTransId="{DE372AD7-AE8A-4A5C-85EF-7BBFC4EAD400}" sibTransId="{F7D59EE5-C62A-46EB-A804-C93760F2FF41}"/>
+    <dgm:cxn modelId="{82F94CF7-E0DE-440A-B1D1-883572629C8B}" type="presOf" srcId="{A21E80E9-3E30-4727-979B-CC3F1A7A22C5}" destId="{8EB604FD-2448-4F33-9F96-EAFE912047E9}" srcOrd="0" destOrd="0" presId="urn:microsoft.com/office/officeart/2005/8/layout/chevron2"/>
+    <dgm:cxn modelId="{8F292043-0AE3-4A7F-922F-280AA19022B7}" srcId="{CBA4680F-B921-4539-96E8-73E248B26438}" destId="{DD72F1AC-36A9-4FC9-B3DD-284B7304268B}" srcOrd="1" destOrd="0" parTransId="{278A84E8-AB0B-498A-88F0-D7815C0E6EBE}" sibTransId="{52B77427-3B7D-4B9E-B3D0-BFAE29C78F62}"/>
+    <dgm:cxn modelId="{2B3F665E-6C26-4C8C-8925-3FA18AD3448C}" srcId="{1693A56B-51EB-4EEE-B5A0-2587A76BB504}" destId="{4891FD67-D496-43B1-AAAA-FB43CACB8134}" srcOrd="2" destOrd="0" parTransId="{521644B0-E40C-4932-B70C-C9278B62866E}" sibTransId="{921942D5-F19D-4E5F-B814-4F4FA6126DFC}"/>
+    <dgm:cxn modelId="{98E93161-C30E-43AA-AF6B-299C6C6168AE}" srcId="{A21E80E9-3E30-4727-979B-CC3F1A7A22C5}" destId="{7251001A-0584-4766-A6D7-0E44BBBBDC12}" srcOrd="0" destOrd="0" parTransId="{FE219C25-7519-49A1-80FC-88DBD277BE7B}" sibTransId="{3A3E3377-B627-44C2-A026-04B55D885A13}"/>
+    <dgm:cxn modelId="{77CC48A9-7F58-4588-B078-1F5FB409FA61}" type="presOf" srcId="{ABAAE8DB-E2CC-43CB-8D93-71DC9EFC3D10}" destId="{8FBC2C5D-9E47-4B2D-8CC0-0827ADC6EE57}" srcOrd="0" destOrd="1" presId="urn:microsoft.com/office/officeart/2005/8/layout/chevron2"/>
+    <dgm:cxn modelId="{B7053CA3-5B0E-459E-92A0-4BCA05754ED6}" srcId="{1693A56B-51EB-4EEE-B5A0-2587A76BB504}" destId="{DC7F1DFF-09BB-4B4C-B671-9F3BA266632A}" srcOrd="3" destOrd="0" parTransId="{BBB28F1D-194C-4571-9A62-A6B6EA846AE0}" sibTransId="{2B60A694-34C4-4DCD-A380-60E51B32C261}"/>
+    <dgm:cxn modelId="{42A2C57A-441E-40C1-B0DD-ADED530A699C}" type="presOf" srcId="{958DC5F8-13C6-4060-9DA7-572015EE948E}" destId="{5FDFAD45-BE3A-42C7-96F9-147D175477B9}" srcOrd="0" destOrd="1" presId="urn:microsoft.com/office/officeart/2005/8/layout/chevron2"/>
+    <dgm:cxn modelId="{CCF631FA-41A2-4046-B2DC-3AA7FEA2E47F}" srcId="{1693A56B-51EB-4EEE-B5A0-2587A76BB504}" destId="{ABAAE8DB-E2CC-43CB-8D93-71DC9EFC3D10}" srcOrd="0" destOrd="0" parTransId="{8A59B9EC-BD07-4456-A8DF-54771CAB9EB4}" sibTransId="{2FE575B9-B4B2-43A2-A60A-5BACBE0F9C57}"/>
+    <dgm:cxn modelId="{0AA5C12A-35F9-4293-BE1B-E1E5AC07E9AF}" type="presOf" srcId="{DC7F1DFF-09BB-4B4C-B671-9F3BA266632A}" destId="{8FBC2C5D-9E47-4B2D-8CC0-0827ADC6EE57}" srcOrd="0" destOrd="4" presId="urn:microsoft.com/office/officeart/2005/8/layout/chevron2"/>
+    <dgm:cxn modelId="{FDE1C7A9-B83A-4B23-BD5B-352FE6846570}" type="presOf" srcId="{DD72F1AC-36A9-4FC9-B3DD-284B7304268B}" destId="{5FDFAD45-BE3A-42C7-96F9-147D175477B9}" srcOrd="0" destOrd="2" presId="urn:microsoft.com/office/officeart/2005/8/layout/chevron2"/>
+    <dgm:cxn modelId="{0326A130-63ED-4980-A431-4DB3F63EF895}" srcId="{CBA4680F-B921-4539-96E8-73E248B26438}" destId="{958DC5F8-13C6-4060-9DA7-572015EE948E}" srcOrd="0" destOrd="0" parTransId="{92C2B2B2-DF39-4F92-9E36-6142C56C5522}" sibTransId="{BDE7F979-986D-43E2-824A-8A00B1EF1534}"/>
+    <dgm:cxn modelId="{26A054A0-1AB4-43B6-8F58-0FC6C712A2A4}" srcId="{15A2342C-342E-4AF1-ABFE-6D641BAF41A1}" destId="{CBA4680F-B921-4539-96E8-73E248B26438}" srcOrd="0" destOrd="0" parTransId="{CFA20A3C-0F95-4996-A60F-CD8C5D7EA0C8}" sibTransId="{66C95EC4-2BD0-44E1-98AF-5AEB75A287A4}"/>
+    <dgm:cxn modelId="{66B94978-2CF8-4782-9F42-CE809C56F64F}" type="presOf" srcId="{4891FD67-D496-43B1-AAAA-FB43CACB8134}" destId="{8FBC2C5D-9E47-4B2D-8CC0-0827ADC6EE57}" srcOrd="0" destOrd="3" presId="urn:microsoft.com/office/officeart/2005/8/layout/chevron2"/>
+    <dgm:cxn modelId="{0AA7C964-F08A-434D-849D-CB60E50F510C}" type="presOf" srcId="{FDFD6E2B-DBAB-4056-BC28-C138724F0441}" destId="{0837024A-932D-4B89-A5B5-1646702B04D6}" srcOrd="0" destOrd="0" presId="urn:microsoft.com/office/officeart/2005/8/layout/chevron2"/>
+    <dgm:cxn modelId="{B9F397F0-7A59-4437-81F7-0BEB182623E3}" srcId="{FDFD6E2B-DBAB-4056-BC28-C138724F0441}" destId="{1693A56B-51EB-4EEE-B5A0-2587A76BB504}" srcOrd="0" destOrd="0" parTransId="{71605052-445C-4B49-9A4B-2DCF504AD115}" sibTransId="{84E281FA-B092-4FA8-A2AE-CFCEA05B4214}"/>
     <dgm:cxn modelId="{58890E05-AD91-4C6E-AFAF-1570690574EA}" type="presOf" srcId="{B56C8652-49D2-40A6-9CA3-CE8DCF0946F5}" destId="{142F673A-C255-456D-9E41-60A8F8DECB23}" srcOrd="0" destOrd="0" presId="urn:microsoft.com/office/officeart/2005/8/layout/chevron2"/>
-    <dgm:cxn modelId="{385FB91F-288F-4FC3-A6FF-5DDEB4CCCBFE}" type="presOf" srcId="{AAB741E9-0A62-4A1A-88D2-E166C54108A7}" destId="{5FDFAD45-BE3A-42C7-96F9-147D175477B9}" srcOrd="0" destOrd="3" presId="urn:microsoft.com/office/officeart/2005/8/layout/chevron2"/>
-    <dgm:cxn modelId="{890C6129-FED3-4F32-A1CE-803923CC13FB}" srcId="{B56C8652-49D2-40A6-9CA3-CE8DCF0946F5}" destId="{A21E80E9-3E30-4727-979B-CC3F1A7A22C5}" srcOrd="1" destOrd="0" parTransId="{5C40DCA5-A5ED-48F4-971B-7B525589E1B6}" sibTransId="{2E128CC8-58D8-49C7-B524-7F998825E08C}"/>
-    <dgm:cxn modelId="{0326A130-63ED-4980-A431-4DB3F63EF895}" srcId="{15A2342C-342E-4AF1-ABFE-6D641BAF41A1}" destId="{958DC5F8-13C6-4060-9DA7-572015EE948E}" srcOrd="1" destOrd="0" parTransId="{92C2B2B2-DF39-4F92-9E36-6142C56C5522}" sibTransId="{BDE7F979-986D-43E2-824A-8A00B1EF1534}"/>
-    <dgm:cxn modelId="{E914BB3B-B500-4A5E-9DB8-004BB6465C45}" type="presOf" srcId="{F13B17A0-86C6-45C8-A1A1-58051CE11C6F}" destId="{5FDFAD45-BE3A-42C7-96F9-147D175477B9}" srcOrd="0" destOrd="2" presId="urn:microsoft.com/office/officeart/2005/8/layout/chevron2"/>
-    <dgm:cxn modelId="{28F4B55F-1626-4A11-B2A3-6C5FBCF466EE}" type="presOf" srcId="{CBA4680F-B921-4539-96E8-73E248B26438}" destId="{5FDFAD45-BE3A-42C7-96F9-147D175477B9}" srcOrd="0" destOrd="0" presId="urn:microsoft.com/office/officeart/2005/8/layout/chevron2"/>
-    <dgm:cxn modelId="{CBE38C60-2AAF-4767-AECB-3298EFA7C80C}" type="presOf" srcId="{15A2342C-342E-4AF1-ABFE-6D641BAF41A1}" destId="{049C38D1-B597-49E9-8B00-78FB12FB25CF}" srcOrd="0" destOrd="0" presId="urn:microsoft.com/office/officeart/2005/8/layout/chevron2"/>
-    <dgm:cxn modelId="{98E93161-C30E-43AA-AF6B-299C6C6168AE}" srcId="{A21E80E9-3E30-4727-979B-CC3F1A7A22C5}" destId="{7251001A-0584-4766-A6D7-0E44BBBBDC12}" srcOrd="0" destOrd="0" parTransId="{FE219C25-7519-49A1-80FC-88DBD277BE7B}" sibTransId="{3A3E3377-B627-44C2-A026-04B55D885A13}"/>
-    <dgm:cxn modelId="{0AA7C964-F08A-434D-849D-CB60E50F510C}" type="presOf" srcId="{FDFD6E2B-DBAB-4056-BC28-C138724F0441}" destId="{0837024A-932D-4B89-A5B5-1646702B04D6}" srcOrd="0" destOrd="0" presId="urn:microsoft.com/office/officeart/2005/8/layout/chevron2"/>
     <dgm:cxn modelId="{331E5267-3B46-40FC-807B-5869C9435943}" srcId="{B56C8652-49D2-40A6-9CA3-CE8DCF0946F5}" destId="{FDFD6E2B-DBAB-4056-BC28-C138724F0441}" srcOrd="2" destOrd="0" parTransId="{A185C7BD-8F3D-48FC-AACD-370FC7051347}" sibTransId="{2EAE1DED-33EB-4BB9-B279-4AEA7E7C396D}"/>
-    <dgm:cxn modelId="{21BAFE6C-EC35-448A-B410-9FE4C9A64DC0}" srcId="{15A2342C-342E-4AF1-ABFE-6D641BAF41A1}" destId="{AAB741E9-0A62-4A1A-88D2-E166C54108A7}" srcOrd="3" destOrd="0" parTransId="{F302E746-C63C-4CF2-BB91-51B229830F31}" sibTransId="{1B53089C-3F7E-4E98-ADDE-EEC2D993585E}"/>
-    <dgm:cxn modelId="{42A2C57A-441E-40C1-B0DD-ADED530A699C}" type="presOf" srcId="{958DC5F8-13C6-4060-9DA7-572015EE948E}" destId="{5FDFAD45-BE3A-42C7-96F9-147D175477B9}" srcOrd="0" destOrd="1" presId="urn:microsoft.com/office/officeart/2005/8/layout/chevron2"/>
+    <dgm:cxn modelId="{86D5B1B6-FC3B-40C9-B662-895EFF0C484F}" type="presOf" srcId="{1693A56B-51EB-4EEE-B5A0-2587A76BB504}" destId="{8FBC2C5D-9E47-4B2D-8CC0-0827ADC6EE57}" srcOrd="0" destOrd="0" presId="urn:microsoft.com/office/officeart/2005/8/layout/chevron2"/>
+    <dgm:cxn modelId="{8EEC9CF2-D120-4C04-BC12-101E42BC9E21}" type="presOf" srcId="{C7F13D55-EA84-4653-9F8F-927870A64E81}" destId="{8FBC2C5D-9E47-4B2D-8CC0-0827ADC6EE57}" srcOrd="0" destOrd="2" presId="urn:microsoft.com/office/officeart/2005/8/layout/chevron2"/>
     <dgm:cxn modelId="{FD15FF7D-7615-413A-936D-840A88CEEF81}" type="presOf" srcId="{7251001A-0584-4766-A6D7-0E44BBBBDC12}" destId="{3EE3D444-F1E2-4D81-B343-EEB78C9B7BC2}" srcOrd="0" destOrd="0" presId="urn:microsoft.com/office/officeart/2005/8/layout/chevron2"/>
     <dgm:cxn modelId="{2A878A9C-A599-4E25-8F35-179342BC54EF}" srcId="{B56C8652-49D2-40A6-9CA3-CE8DCF0946F5}" destId="{15A2342C-342E-4AF1-ABFE-6D641BAF41A1}" srcOrd="0" destOrd="0" parTransId="{3113E09E-2B5D-47FE-89F9-BC4D9A8CB38B}" sibTransId="{3091C5B6-412E-4FA9-921C-1CCBB20FB078}"/>
-    <dgm:cxn modelId="{26A054A0-1AB4-43B6-8F58-0FC6C712A2A4}" srcId="{15A2342C-342E-4AF1-ABFE-6D641BAF41A1}" destId="{CBA4680F-B921-4539-96E8-73E248B26438}" srcOrd="0" destOrd="0" parTransId="{CFA20A3C-0F95-4996-A60F-CD8C5D7EA0C8}" sibTransId="{66C95EC4-2BD0-44E1-98AF-5AEB75A287A4}"/>
-    <dgm:cxn modelId="{86D5B1B6-FC3B-40C9-B662-895EFF0C484F}" type="presOf" srcId="{1693A56B-51EB-4EEE-B5A0-2587A76BB504}" destId="{8FBC2C5D-9E47-4B2D-8CC0-0827ADC6EE57}" srcOrd="0" destOrd="0" presId="urn:microsoft.com/office/officeart/2005/8/layout/chevron2"/>
-    <dgm:cxn modelId="{473431EE-F39C-48EA-A045-B86C38621641}" srcId="{15A2342C-342E-4AF1-ABFE-6D641BAF41A1}" destId="{F13B17A0-86C6-45C8-A1A1-58051CE11C6F}" srcOrd="2" destOrd="0" parTransId="{B2B47FC7-5958-4A44-A4CE-453C0A0BC836}" sibTransId="{82F0F7A3-3707-4B24-8D7E-99D069D182AB}"/>
-    <dgm:cxn modelId="{B9F397F0-7A59-4437-81F7-0BEB182623E3}" srcId="{FDFD6E2B-DBAB-4056-BC28-C138724F0441}" destId="{1693A56B-51EB-4EEE-B5A0-2587A76BB504}" srcOrd="0" destOrd="0" parTransId="{71605052-445C-4B49-9A4B-2DCF504AD115}" sibTransId="{84E281FA-B092-4FA8-A2AE-CFCEA05B4214}"/>
-    <dgm:cxn modelId="{82F94CF7-E0DE-440A-B1D1-883572629C8B}" type="presOf" srcId="{A21E80E9-3E30-4727-979B-CC3F1A7A22C5}" destId="{8EB604FD-2448-4F33-9F96-EAFE912047E9}" srcOrd="0" destOrd="0" presId="urn:microsoft.com/office/officeart/2005/8/layout/chevron2"/>
     <dgm:cxn modelId="{13250355-16DD-4CD2-9C12-90DB9DA37F12}" type="presParOf" srcId="{142F673A-C255-456D-9E41-60A8F8DECB23}" destId="{4D46CCB9-E0D7-49E4-8700-7CE19FB27C88}" srcOrd="0" destOrd="0" presId="urn:microsoft.com/office/officeart/2005/8/layout/chevron2"/>
     <dgm:cxn modelId="{817BC056-467A-4A41-A953-E66324C2905D}" type="presParOf" srcId="{4D46CCB9-E0D7-49E4-8700-7CE19FB27C88}" destId="{049C38D1-B597-49E9-8B00-78FB12FB25CF}" srcOrd="0" destOrd="0" presId="urn:microsoft.com/office/officeart/2005/8/layout/chevron2"/>
     <dgm:cxn modelId="{9630092D-D071-4A9D-86C1-D2F2FD525441}" type="presParOf" srcId="{4D46CCB9-E0D7-49E4-8700-7CE19FB27C88}" destId="{5FDFAD45-BE3A-42C7-96F9-147D175477B9}" srcOrd="1" destOrd="0" presId="urn:microsoft.com/office/officeart/2005/8/layout/chevron2"/>
@@ -8040,6 +8419,13 @@
         </dgm:presLayoutVars>
       </dgm:prSet>
       <dgm:spPr/>
+      <dgm:t>
+        <a:bodyPr/>
+        <a:lstStyle/>
+        <a:p>
+          <a:endParaRPr lang="en-US"/>
+        </a:p>
+      </dgm:t>
     </dgm:pt>
     <dgm:pt modelId="{4D46CCB9-E0D7-49E4-8700-7CE19FB27C88}" type="pres">
       <dgm:prSet presAssocID="{15A2342C-342E-4AF1-ABFE-6D641BAF41A1}" presName="composite" presStyleCnt="0"/>
@@ -8053,6 +8439,13 @@
         </dgm:presLayoutVars>
       </dgm:prSet>
       <dgm:spPr/>
+      <dgm:t>
+        <a:bodyPr/>
+        <a:lstStyle/>
+        <a:p>
+          <a:endParaRPr lang="en-US"/>
+        </a:p>
+      </dgm:t>
     </dgm:pt>
     <dgm:pt modelId="{5FDFAD45-BE3A-42C7-96F9-147D175477B9}" type="pres">
       <dgm:prSet presAssocID="{15A2342C-342E-4AF1-ABFE-6D641BAF41A1}" presName="descendantText" presStyleLbl="alignAcc1" presStyleIdx="0" presStyleCnt="3" custScaleY="100000">
@@ -8061,6 +8454,13 @@
         </dgm:presLayoutVars>
       </dgm:prSet>
       <dgm:spPr/>
+      <dgm:t>
+        <a:bodyPr/>
+        <a:lstStyle/>
+        <a:p>
+          <a:endParaRPr lang="en-US"/>
+        </a:p>
+      </dgm:t>
     </dgm:pt>
     <dgm:pt modelId="{0B93D529-6A78-4555-B1DB-9F922703E6C7}" type="pres">
       <dgm:prSet presAssocID="{3091C5B6-412E-4FA9-921C-1CCBB20FB078}" presName="sp" presStyleCnt="0"/>
@@ -8078,6 +8478,13 @@
         </dgm:presLayoutVars>
       </dgm:prSet>
       <dgm:spPr/>
+      <dgm:t>
+        <a:bodyPr/>
+        <a:lstStyle/>
+        <a:p>
+          <a:endParaRPr lang="en-US"/>
+        </a:p>
+      </dgm:t>
     </dgm:pt>
     <dgm:pt modelId="{3EE3D444-F1E2-4D81-B343-EEB78C9B7BC2}" type="pres">
       <dgm:prSet presAssocID="{A21E80E9-3E30-4727-979B-CC3F1A7A22C5}" presName="descendantText" presStyleLbl="alignAcc1" presStyleIdx="1" presStyleCnt="3" custScaleY="35851">
@@ -8086,6 +8493,13 @@
         </dgm:presLayoutVars>
       </dgm:prSet>
       <dgm:spPr/>
+      <dgm:t>
+        <a:bodyPr/>
+        <a:lstStyle/>
+        <a:p>
+          <a:endParaRPr lang="en-US"/>
+        </a:p>
+      </dgm:t>
     </dgm:pt>
     <dgm:pt modelId="{56499CC1-1A65-4B3A-8A68-E81F41293563}" type="pres">
       <dgm:prSet presAssocID="{2E128CC8-58D8-49C7-B524-7F998825E08C}" presName="sp" presStyleCnt="0"/>
@@ -8103,6 +8517,13 @@
         </dgm:presLayoutVars>
       </dgm:prSet>
       <dgm:spPr/>
+      <dgm:t>
+        <a:bodyPr/>
+        <a:lstStyle/>
+        <a:p>
+          <a:endParaRPr lang="en-US"/>
+        </a:p>
+      </dgm:t>
     </dgm:pt>
     <dgm:pt modelId="{8FBC2C5D-9E47-4B2D-8CC0-0827ADC6EE57}" type="pres">
       <dgm:prSet presAssocID="{FDFD6E2B-DBAB-4056-BC28-C138724F0441}" presName="descendantText" presStyleLbl="alignAcc1" presStyleIdx="2" presStyleCnt="3">
@@ -8111,30 +8532,37 @@
         </dgm:presLayoutVars>
       </dgm:prSet>
       <dgm:spPr/>
+      <dgm:t>
+        <a:bodyPr/>
+        <a:lstStyle/>
+        <a:p>
+          <a:endParaRPr lang="en-US"/>
+        </a:p>
+      </dgm:t>
     </dgm:pt>
   </dgm:ptLst>
   <dgm:cxnLst>
+    <dgm:cxn modelId="{28F4B55F-1626-4A11-B2A3-6C5FBCF466EE}" type="presOf" srcId="{CBA4680F-B921-4539-96E8-73E248B26438}" destId="{5FDFAD45-BE3A-42C7-96F9-147D175477B9}" srcOrd="0" destOrd="0" presId="urn:microsoft.com/office/officeart/2005/8/layout/chevron2"/>
+    <dgm:cxn modelId="{890C6129-FED3-4F32-A1CE-803923CC13FB}" srcId="{B56C8652-49D2-40A6-9CA3-CE8DCF0946F5}" destId="{A21E80E9-3E30-4727-979B-CC3F1A7A22C5}" srcOrd="1" destOrd="0" parTransId="{5C40DCA5-A5ED-48F4-971B-7B525589E1B6}" sibTransId="{2E128CC8-58D8-49C7-B524-7F998825E08C}"/>
+    <dgm:cxn modelId="{CBE38C60-2AAF-4767-AECB-3298EFA7C80C}" type="presOf" srcId="{15A2342C-342E-4AF1-ABFE-6D641BAF41A1}" destId="{049C38D1-B597-49E9-8B00-78FB12FB25CF}" srcOrd="0" destOrd="0" presId="urn:microsoft.com/office/officeart/2005/8/layout/chevron2"/>
+    <dgm:cxn modelId="{E914BB3B-B500-4A5E-9DB8-004BB6465C45}" type="presOf" srcId="{F13B17A0-86C6-45C8-A1A1-58051CE11C6F}" destId="{5FDFAD45-BE3A-42C7-96F9-147D175477B9}" srcOrd="0" destOrd="1" presId="urn:microsoft.com/office/officeart/2005/8/layout/chevron2"/>
+    <dgm:cxn modelId="{82F94CF7-E0DE-440A-B1D1-883572629C8B}" type="presOf" srcId="{A21E80E9-3E30-4727-979B-CC3F1A7A22C5}" destId="{8EB604FD-2448-4F33-9F96-EAFE912047E9}" srcOrd="0" destOrd="0" presId="urn:microsoft.com/office/officeart/2005/8/layout/chevron2"/>
+    <dgm:cxn modelId="{5A9ED1DB-6162-451D-A6D9-04B0C3753391}" type="presOf" srcId="{D2F9CDA6-554C-4AD5-966D-376750FE9990}" destId="{8FBC2C5D-9E47-4B2D-8CC0-0827ADC6EE57}" srcOrd="0" destOrd="3" presId="urn:microsoft.com/office/officeart/2005/8/layout/chevron2"/>
+    <dgm:cxn modelId="{98E93161-C30E-43AA-AF6B-299C6C6168AE}" srcId="{A21E80E9-3E30-4727-979B-CC3F1A7A22C5}" destId="{7251001A-0584-4766-A6D7-0E44BBBBDC12}" srcOrd="0" destOrd="0" parTransId="{FE219C25-7519-49A1-80FC-88DBD277BE7B}" sibTransId="{3A3E3377-B627-44C2-A026-04B55D885A13}"/>
+    <dgm:cxn modelId="{E588DDCA-B8F5-490F-9C79-2C1FDDC6873C}" srcId="{FDFD6E2B-DBAB-4056-BC28-C138724F0441}" destId="{46805B83-CCE2-49B4-94D7-34BF1805A1F1}" srcOrd="2" destOrd="0" parTransId="{E2B4C28A-E9E0-4C65-AC26-D901DDA7289A}" sibTransId="{DCDC50B2-6E66-4671-B741-82D8D8280796}"/>
+    <dgm:cxn modelId="{8AC5DF0C-260E-43E4-A62F-C504A94FD039}" srcId="{FDFD6E2B-DBAB-4056-BC28-C138724F0441}" destId="{D2F9CDA6-554C-4AD5-966D-376750FE9990}" srcOrd="3" destOrd="0" parTransId="{00A1B110-6DA3-420C-9E70-D9970CFF9FF0}" sibTransId="{1AD3BD3B-DE56-46C8-9696-50FAF0C96F7C}"/>
+    <dgm:cxn modelId="{3202A8C2-5279-4A81-941D-2141F021A171}" type="presOf" srcId="{B4460C5C-2EEC-4D27-88F3-8A3DBFE4D343}" destId="{8FBC2C5D-9E47-4B2D-8CC0-0827ADC6EE57}" srcOrd="0" destOrd="1" presId="urn:microsoft.com/office/officeart/2005/8/layout/chevron2"/>
+    <dgm:cxn modelId="{26A054A0-1AB4-43B6-8F58-0FC6C712A2A4}" srcId="{15A2342C-342E-4AF1-ABFE-6D641BAF41A1}" destId="{CBA4680F-B921-4539-96E8-73E248B26438}" srcOrd="0" destOrd="0" parTransId="{CFA20A3C-0F95-4996-A60F-CD8C5D7EA0C8}" sibTransId="{66C95EC4-2BD0-44E1-98AF-5AEB75A287A4}"/>
+    <dgm:cxn modelId="{0AA7C964-F08A-434D-849D-CB60E50F510C}" type="presOf" srcId="{FDFD6E2B-DBAB-4056-BC28-C138724F0441}" destId="{0837024A-932D-4B89-A5B5-1646702B04D6}" srcOrd="0" destOrd="0" presId="urn:microsoft.com/office/officeart/2005/8/layout/chevron2"/>
+    <dgm:cxn modelId="{A105D458-9A63-4941-8C72-3207DE7EFBAC}" type="presOf" srcId="{46805B83-CCE2-49B4-94D7-34BF1805A1F1}" destId="{8FBC2C5D-9E47-4B2D-8CC0-0827ADC6EE57}" srcOrd="0" destOrd="2" presId="urn:microsoft.com/office/officeart/2005/8/layout/chevron2"/>
+    <dgm:cxn modelId="{B9F397F0-7A59-4437-81F7-0BEB182623E3}" srcId="{FDFD6E2B-DBAB-4056-BC28-C138724F0441}" destId="{1693A56B-51EB-4EEE-B5A0-2587A76BB504}" srcOrd="0" destOrd="0" parTransId="{71605052-445C-4B49-9A4B-2DCF504AD115}" sibTransId="{84E281FA-B092-4FA8-A2AE-CFCEA05B4214}"/>
+    <dgm:cxn modelId="{1305294E-46C4-46DE-943F-47C066193AA4}" srcId="{FDFD6E2B-DBAB-4056-BC28-C138724F0441}" destId="{B4460C5C-2EEC-4D27-88F3-8A3DBFE4D343}" srcOrd="1" destOrd="0" parTransId="{8A8A54DB-6A96-4B36-BCD0-B837B772F2DB}" sibTransId="{72452706-6E93-4C8C-AD07-5D4795D82101}"/>
     <dgm:cxn modelId="{58890E05-AD91-4C6E-AFAF-1570690574EA}" type="presOf" srcId="{B56C8652-49D2-40A6-9CA3-CE8DCF0946F5}" destId="{142F673A-C255-456D-9E41-60A8F8DECB23}" srcOrd="0" destOrd="0" presId="urn:microsoft.com/office/officeart/2005/8/layout/chevron2"/>
-    <dgm:cxn modelId="{8AC5DF0C-260E-43E4-A62F-C504A94FD039}" srcId="{FDFD6E2B-DBAB-4056-BC28-C138724F0441}" destId="{D2F9CDA6-554C-4AD5-966D-376750FE9990}" srcOrd="3" destOrd="0" parTransId="{00A1B110-6DA3-420C-9E70-D9970CFF9FF0}" sibTransId="{1AD3BD3B-DE56-46C8-9696-50FAF0C96F7C}"/>
-    <dgm:cxn modelId="{890C6129-FED3-4F32-A1CE-803923CC13FB}" srcId="{B56C8652-49D2-40A6-9CA3-CE8DCF0946F5}" destId="{A21E80E9-3E30-4727-979B-CC3F1A7A22C5}" srcOrd="1" destOrd="0" parTransId="{5C40DCA5-A5ED-48F4-971B-7B525589E1B6}" sibTransId="{2E128CC8-58D8-49C7-B524-7F998825E08C}"/>
-    <dgm:cxn modelId="{E914BB3B-B500-4A5E-9DB8-004BB6465C45}" type="presOf" srcId="{F13B17A0-86C6-45C8-A1A1-58051CE11C6F}" destId="{5FDFAD45-BE3A-42C7-96F9-147D175477B9}" srcOrd="0" destOrd="1" presId="urn:microsoft.com/office/officeart/2005/8/layout/chevron2"/>
-    <dgm:cxn modelId="{28F4B55F-1626-4A11-B2A3-6C5FBCF466EE}" type="presOf" srcId="{CBA4680F-B921-4539-96E8-73E248B26438}" destId="{5FDFAD45-BE3A-42C7-96F9-147D175477B9}" srcOrd="0" destOrd="0" presId="urn:microsoft.com/office/officeart/2005/8/layout/chevron2"/>
-    <dgm:cxn modelId="{CBE38C60-2AAF-4767-AECB-3298EFA7C80C}" type="presOf" srcId="{15A2342C-342E-4AF1-ABFE-6D641BAF41A1}" destId="{049C38D1-B597-49E9-8B00-78FB12FB25CF}" srcOrd="0" destOrd="0" presId="urn:microsoft.com/office/officeart/2005/8/layout/chevron2"/>
-    <dgm:cxn modelId="{98E93161-C30E-43AA-AF6B-299C6C6168AE}" srcId="{A21E80E9-3E30-4727-979B-CC3F1A7A22C5}" destId="{7251001A-0584-4766-A6D7-0E44BBBBDC12}" srcOrd="0" destOrd="0" parTransId="{FE219C25-7519-49A1-80FC-88DBD277BE7B}" sibTransId="{3A3E3377-B627-44C2-A026-04B55D885A13}"/>
-    <dgm:cxn modelId="{0AA7C964-F08A-434D-849D-CB60E50F510C}" type="presOf" srcId="{FDFD6E2B-DBAB-4056-BC28-C138724F0441}" destId="{0837024A-932D-4B89-A5B5-1646702B04D6}" srcOrd="0" destOrd="0" presId="urn:microsoft.com/office/officeart/2005/8/layout/chevron2"/>
     <dgm:cxn modelId="{331E5267-3B46-40FC-807B-5869C9435943}" srcId="{B56C8652-49D2-40A6-9CA3-CE8DCF0946F5}" destId="{FDFD6E2B-DBAB-4056-BC28-C138724F0441}" srcOrd="2" destOrd="0" parTransId="{A185C7BD-8F3D-48FC-AACD-370FC7051347}" sibTransId="{2EAE1DED-33EB-4BB9-B279-4AEA7E7C396D}"/>
-    <dgm:cxn modelId="{1305294E-46C4-46DE-943F-47C066193AA4}" srcId="{FDFD6E2B-DBAB-4056-BC28-C138724F0441}" destId="{B4460C5C-2EEC-4D27-88F3-8A3DBFE4D343}" srcOrd="1" destOrd="0" parTransId="{8A8A54DB-6A96-4B36-BCD0-B837B772F2DB}" sibTransId="{72452706-6E93-4C8C-AD07-5D4795D82101}"/>
-    <dgm:cxn modelId="{A105D458-9A63-4941-8C72-3207DE7EFBAC}" type="presOf" srcId="{46805B83-CCE2-49B4-94D7-34BF1805A1F1}" destId="{8FBC2C5D-9E47-4B2D-8CC0-0827ADC6EE57}" srcOrd="0" destOrd="2" presId="urn:microsoft.com/office/officeart/2005/8/layout/chevron2"/>
+    <dgm:cxn modelId="{473431EE-F39C-48EA-A045-B86C38621641}" srcId="{15A2342C-342E-4AF1-ABFE-6D641BAF41A1}" destId="{F13B17A0-86C6-45C8-A1A1-58051CE11C6F}" srcOrd="1" destOrd="0" parTransId="{B2B47FC7-5958-4A44-A4CE-453C0A0BC836}" sibTransId="{82F0F7A3-3707-4B24-8D7E-99D069D182AB}"/>
+    <dgm:cxn modelId="{86D5B1B6-FC3B-40C9-B662-895EFF0C484F}" type="presOf" srcId="{1693A56B-51EB-4EEE-B5A0-2587A76BB504}" destId="{8FBC2C5D-9E47-4B2D-8CC0-0827ADC6EE57}" srcOrd="0" destOrd="0" presId="urn:microsoft.com/office/officeart/2005/8/layout/chevron2"/>
     <dgm:cxn modelId="{FD15FF7D-7615-413A-936D-840A88CEEF81}" type="presOf" srcId="{7251001A-0584-4766-A6D7-0E44BBBBDC12}" destId="{3EE3D444-F1E2-4D81-B343-EEB78C9B7BC2}" srcOrd="0" destOrd="0" presId="urn:microsoft.com/office/officeart/2005/8/layout/chevron2"/>
     <dgm:cxn modelId="{2A878A9C-A599-4E25-8F35-179342BC54EF}" srcId="{B56C8652-49D2-40A6-9CA3-CE8DCF0946F5}" destId="{15A2342C-342E-4AF1-ABFE-6D641BAF41A1}" srcOrd="0" destOrd="0" parTransId="{3113E09E-2B5D-47FE-89F9-BC4D9A8CB38B}" sibTransId="{3091C5B6-412E-4FA9-921C-1CCBB20FB078}"/>
-    <dgm:cxn modelId="{26A054A0-1AB4-43B6-8F58-0FC6C712A2A4}" srcId="{15A2342C-342E-4AF1-ABFE-6D641BAF41A1}" destId="{CBA4680F-B921-4539-96E8-73E248B26438}" srcOrd="0" destOrd="0" parTransId="{CFA20A3C-0F95-4996-A60F-CD8C5D7EA0C8}" sibTransId="{66C95EC4-2BD0-44E1-98AF-5AEB75A287A4}"/>
-    <dgm:cxn modelId="{86D5B1B6-FC3B-40C9-B662-895EFF0C484F}" type="presOf" srcId="{1693A56B-51EB-4EEE-B5A0-2587A76BB504}" destId="{8FBC2C5D-9E47-4B2D-8CC0-0827ADC6EE57}" srcOrd="0" destOrd="0" presId="urn:microsoft.com/office/officeart/2005/8/layout/chevron2"/>
-    <dgm:cxn modelId="{3202A8C2-5279-4A81-941D-2141F021A171}" type="presOf" srcId="{B4460C5C-2EEC-4D27-88F3-8A3DBFE4D343}" destId="{8FBC2C5D-9E47-4B2D-8CC0-0827ADC6EE57}" srcOrd="0" destOrd="1" presId="urn:microsoft.com/office/officeart/2005/8/layout/chevron2"/>
-    <dgm:cxn modelId="{E588DDCA-B8F5-490F-9C79-2C1FDDC6873C}" srcId="{FDFD6E2B-DBAB-4056-BC28-C138724F0441}" destId="{46805B83-CCE2-49B4-94D7-34BF1805A1F1}" srcOrd="2" destOrd="0" parTransId="{E2B4C28A-E9E0-4C65-AC26-D901DDA7289A}" sibTransId="{DCDC50B2-6E66-4671-B741-82D8D8280796}"/>
-    <dgm:cxn modelId="{5A9ED1DB-6162-451D-A6D9-04B0C3753391}" type="presOf" srcId="{D2F9CDA6-554C-4AD5-966D-376750FE9990}" destId="{8FBC2C5D-9E47-4B2D-8CC0-0827ADC6EE57}" srcOrd="0" destOrd="3" presId="urn:microsoft.com/office/officeart/2005/8/layout/chevron2"/>
-    <dgm:cxn modelId="{473431EE-F39C-48EA-A045-B86C38621641}" srcId="{15A2342C-342E-4AF1-ABFE-6D641BAF41A1}" destId="{F13B17A0-86C6-45C8-A1A1-58051CE11C6F}" srcOrd="1" destOrd="0" parTransId="{B2B47FC7-5958-4A44-A4CE-453C0A0BC836}" sibTransId="{82F0F7A3-3707-4B24-8D7E-99D069D182AB}"/>
-    <dgm:cxn modelId="{B9F397F0-7A59-4437-81F7-0BEB182623E3}" srcId="{FDFD6E2B-DBAB-4056-BC28-C138724F0441}" destId="{1693A56B-51EB-4EEE-B5A0-2587A76BB504}" srcOrd="0" destOrd="0" parTransId="{71605052-445C-4B49-9A4B-2DCF504AD115}" sibTransId="{84E281FA-B092-4FA8-A2AE-CFCEA05B4214}"/>
-    <dgm:cxn modelId="{82F94CF7-E0DE-440A-B1D1-883572629C8B}" type="presOf" srcId="{A21E80E9-3E30-4727-979B-CC3F1A7A22C5}" destId="{8EB604FD-2448-4F33-9F96-EAFE912047E9}" srcOrd="0" destOrd="0" presId="urn:microsoft.com/office/officeart/2005/8/layout/chevron2"/>
     <dgm:cxn modelId="{13250355-16DD-4CD2-9C12-90DB9DA37F12}" type="presParOf" srcId="{142F673A-C255-456D-9E41-60A8F8DECB23}" destId="{4D46CCB9-E0D7-49E4-8700-7CE19FB27C88}" srcOrd="0" destOrd="0" presId="urn:microsoft.com/office/officeart/2005/8/layout/chevron2"/>
     <dgm:cxn modelId="{817BC056-467A-4A41-A953-E66324C2905D}" type="presParOf" srcId="{4D46CCB9-E0D7-49E4-8700-7CE19FB27C88}" destId="{049C38D1-B597-49E9-8B00-78FB12FB25CF}" srcOrd="0" destOrd="0" presId="urn:microsoft.com/office/officeart/2005/8/layout/chevron2"/>
     <dgm:cxn modelId="{9630092D-D071-4A9D-86C1-D2F2FD525441}" type="presParOf" srcId="{4D46CCB9-E0D7-49E4-8700-7CE19FB27C88}" destId="{5FDFAD45-BE3A-42C7-96F9-147D175477B9}" srcOrd="1" destOrd="0" presId="urn:microsoft.com/office/officeart/2005/8/layout/chevron2"/>
@@ -8708,6 +9136,13 @@
         </dgm:presLayoutVars>
       </dgm:prSet>
       <dgm:spPr/>
+      <dgm:t>
+        <a:bodyPr/>
+        <a:lstStyle/>
+        <a:p>
+          <a:endParaRPr lang="en-US"/>
+        </a:p>
+      </dgm:t>
     </dgm:pt>
     <dgm:pt modelId="{4D46CCB9-E0D7-49E4-8700-7CE19FB27C88}" type="pres">
       <dgm:prSet presAssocID="{15A2342C-342E-4AF1-ABFE-6D641BAF41A1}" presName="composite" presStyleCnt="0"/>
@@ -8721,6 +9156,13 @@
         </dgm:presLayoutVars>
       </dgm:prSet>
       <dgm:spPr/>
+      <dgm:t>
+        <a:bodyPr/>
+        <a:lstStyle/>
+        <a:p>
+          <a:endParaRPr lang="en-US"/>
+        </a:p>
+      </dgm:t>
     </dgm:pt>
     <dgm:pt modelId="{5FDFAD45-BE3A-42C7-96F9-147D175477B9}" type="pres">
       <dgm:prSet presAssocID="{15A2342C-342E-4AF1-ABFE-6D641BAF41A1}" presName="descendantText" presStyleLbl="alignAcc1" presStyleIdx="0" presStyleCnt="3" custScaleY="100000">
@@ -8729,6 +9171,13 @@
         </dgm:presLayoutVars>
       </dgm:prSet>
       <dgm:spPr/>
+      <dgm:t>
+        <a:bodyPr/>
+        <a:lstStyle/>
+        <a:p>
+          <a:endParaRPr lang="en-US"/>
+        </a:p>
+      </dgm:t>
     </dgm:pt>
     <dgm:pt modelId="{0B93D529-6A78-4555-B1DB-9F922703E6C7}" type="pres">
       <dgm:prSet presAssocID="{3091C5B6-412E-4FA9-921C-1CCBB20FB078}" presName="sp" presStyleCnt="0"/>
@@ -8746,6 +9195,13 @@
         </dgm:presLayoutVars>
       </dgm:prSet>
       <dgm:spPr/>
+      <dgm:t>
+        <a:bodyPr/>
+        <a:lstStyle/>
+        <a:p>
+          <a:endParaRPr lang="en-US"/>
+        </a:p>
+      </dgm:t>
     </dgm:pt>
     <dgm:pt modelId="{3EE3D444-F1E2-4D81-B343-EEB78C9B7BC2}" type="pres">
       <dgm:prSet presAssocID="{A21E80E9-3E30-4727-979B-CC3F1A7A22C5}" presName="descendantText" presStyleLbl="alignAcc1" presStyleIdx="1" presStyleCnt="3" custScaleY="35851">
@@ -8754,6 +9210,13 @@
         </dgm:presLayoutVars>
       </dgm:prSet>
       <dgm:spPr/>
+      <dgm:t>
+        <a:bodyPr/>
+        <a:lstStyle/>
+        <a:p>
+          <a:endParaRPr lang="en-US"/>
+        </a:p>
+      </dgm:t>
     </dgm:pt>
     <dgm:pt modelId="{56499CC1-1A65-4B3A-8A68-E81F41293563}" type="pres">
       <dgm:prSet presAssocID="{2E128CC8-58D8-49C7-B524-7F998825E08C}" presName="sp" presStyleCnt="0"/>
@@ -8771,6 +9234,13 @@
         </dgm:presLayoutVars>
       </dgm:prSet>
       <dgm:spPr/>
+      <dgm:t>
+        <a:bodyPr/>
+        <a:lstStyle/>
+        <a:p>
+          <a:endParaRPr lang="en-US"/>
+        </a:p>
+      </dgm:t>
     </dgm:pt>
     <dgm:pt modelId="{8FBC2C5D-9E47-4B2D-8CC0-0827ADC6EE57}" type="pres">
       <dgm:prSet presAssocID="{FDFD6E2B-DBAB-4056-BC28-C138724F0441}" presName="descendantText" presStyleLbl="alignAcc1" presStyleIdx="2" presStyleCnt="3">
@@ -8779,30 +9249,37 @@
         </dgm:presLayoutVars>
       </dgm:prSet>
       <dgm:spPr/>
+      <dgm:t>
+        <a:bodyPr/>
+        <a:lstStyle/>
+        <a:p>
+          <a:endParaRPr lang="en-US"/>
+        </a:p>
+      </dgm:t>
     </dgm:pt>
   </dgm:ptLst>
   <dgm:cxnLst>
+    <dgm:cxn modelId="{28F4B55F-1626-4A11-B2A3-6C5FBCF466EE}" type="presOf" srcId="{CBA4680F-B921-4539-96E8-73E248B26438}" destId="{5FDFAD45-BE3A-42C7-96F9-147D175477B9}" srcOrd="0" destOrd="0" presId="urn:microsoft.com/office/officeart/2005/8/layout/chevron2"/>
+    <dgm:cxn modelId="{890C6129-FED3-4F32-A1CE-803923CC13FB}" srcId="{B56C8652-49D2-40A6-9CA3-CE8DCF0946F5}" destId="{A21E80E9-3E30-4727-979B-CC3F1A7A22C5}" srcOrd="1" destOrd="0" parTransId="{5C40DCA5-A5ED-48F4-971B-7B525589E1B6}" sibTransId="{2E128CC8-58D8-49C7-B524-7F998825E08C}"/>
+    <dgm:cxn modelId="{CBE38C60-2AAF-4767-AECB-3298EFA7C80C}" type="presOf" srcId="{15A2342C-342E-4AF1-ABFE-6D641BAF41A1}" destId="{049C38D1-B597-49E9-8B00-78FB12FB25CF}" srcOrd="0" destOrd="0" presId="urn:microsoft.com/office/officeart/2005/8/layout/chevron2"/>
+    <dgm:cxn modelId="{E914BB3B-B500-4A5E-9DB8-004BB6465C45}" type="presOf" srcId="{F13B17A0-86C6-45C8-A1A1-58051CE11C6F}" destId="{5FDFAD45-BE3A-42C7-96F9-147D175477B9}" srcOrd="0" destOrd="1" presId="urn:microsoft.com/office/officeart/2005/8/layout/chevron2"/>
+    <dgm:cxn modelId="{82F94CF7-E0DE-440A-B1D1-883572629C8B}" type="presOf" srcId="{A21E80E9-3E30-4727-979B-CC3F1A7A22C5}" destId="{8EB604FD-2448-4F33-9F96-EAFE912047E9}" srcOrd="0" destOrd="0" presId="urn:microsoft.com/office/officeart/2005/8/layout/chevron2"/>
+    <dgm:cxn modelId="{5A9ED1DB-6162-451D-A6D9-04B0C3753391}" type="presOf" srcId="{D2F9CDA6-554C-4AD5-966D-376750FE9990}" destId="{8FBC2C5D-9E47-4B2D-8CC0-0827ADC6EE57}" srcOrd="0" destOrd="3" presId="urn:microsoft.com/office/officeart/2005/8/layout/chevron2"/>
+    <dgm:cxn modelId="{98E93161-C30E-43AA-AF6B-299C6C6168AE}" srcId="{A21E80E9-3E30-4727-979B-CC3F1A7A22C5}" destId="{7251001A-0584-4766-A6D7-0E44BBBBDC12}" srcOrd="0" destOrd="0" parTransId="{FE219C25-7519-49A1-80FC-88DBD277BE7B}" sibTransId="{3A3E3377-B627-44C2-A026-04B55D885A13}"/>
+    <dgm:cxn modelId="{E588DDCA-B8F5-490F-9C79-2C1FDDC6873C}" srcId="{FDFD6E2B-DBAB-4056-BC28-C138724F0441}" destId="{46805B83-CCE2-49B4-94D7-34BF1805A1F1}" srcOrd="2" destOrd="0" parTransId="{E2B4C28A-E9E0-4C65-AC26-D901DDA7289A}" sibTransId="{DCDC50B2-6E66-4671-B741-82D8D8280796}"/>
+    <dgm:cxn modelId="{8AC5DF0C-260E-43E4-A62F-C504A94FD039}" srcId="{FDFD6E2B-DBAB-4056-BC28-C138724F0441}" destId="{D2F9CDA6-554C-4AD5-966D-376750FE9990}" srcOrd="3" destOrd="0" parTransId="{00A1B110-6DA3-420C-9E70-D9970CFF9FF0}" sibTransId="{1AD3BD3B-DE56-46C8-9696-50FAF0C96F7C}"/>
+    <dgm:cxn modelId="{3202A8C2-5279-4A81-941D-2141F021A171}" type="presOf" srcId="{B4460C5C-2EEC-4D27-88F3-8A3DBFE4D343}" destId="{8FBC2C5D-9E47-4B2D-8CC0-0827ADC6EE57}" srcOrd="0" destOrd="1" presId="urn:microsoft.com/office/officeart/2005/8/layout/chevron2"/>
+    <dgm:cxn modelId="{26A054A0-1AB4-43B6-8F58-0FC6C712A2A4}" srcId="{15A2342C-342E-4AF1-ABFE-6D641BAF41A1}" destId="{CBA4680F-B921-4539-96E8-73E248B26438}" srcOrd="0" destOrd="0" parTransId="{CFA20A3C-0F95-4996-A60F-CD8C5D7EA0C8}" sibTransId="{66C95EC4-2BD0-44E1-98AF-5AEB75A287A4}"/>
+    <dgm:cxn modelId="{0AA7C964-F08A-434D-849D-CB60E50F510C}" type="presOf" srcId="{FDFD6E2B-DBAB-4056-BC28-C138724F0441}" destId="{0837024A-932D-4B89-A5B5-1646702B04D6}" srcOrd="0" destOrd="0" presId="urn:microsoft.com/office/officeart/2005/8/layout/chevron2"/>
+    <dgm:cxn modelId="{A105D458-9A63-4941-8C72-3207DE7EFBAC}" type="presOf" srcId="{46805B83-CCE2-49B4-94D7-34BF1805A1F1}" destId="{8FBC2C5D-9E47-4B2D-8CC0-0827ADC6EE57}" srcOrd="0" destOrd="2" presId="urn:microsoft.com/office/officeart/2005/8/layout/chevron2"/>
+    <dgm:cxn modelId="{B9F397F0-7A59-4437-81F7-0BEB182623E3}" srcId="{FDFD6E2B-DBAB-4056-BC28-C138724F0441}" destId="{1693A56B-51EB-4EEE-B5A0-2587A76BB504}" srcOrd="0" destOrd="0" parTransId="{71605052-445C-4B49-9A4B-2DCF504AD115}" sibTransId="{84E281FA-B092-4FA8-A2AE-CFCEA05B4214}"/>
+    <dgm:cxn modelId="{1305294E-46C4-46DE-943F-47C066193AA4}" srcId="{FDFD6E2B-DBAB-4056-BC28-C138724F0441}" destId="{B4460C5C-2EEC-4D27-88F3-8A3DBFE4D343}" srcOrd="1" destOrd="0" parTransId="{8A8A54DB-6A96-4B36-BCD0-B837B772F2DB}" sibTransId="{72452706-6E93-4C8C-AD07-5D4795D82101}"/>
     <dgm:cxn modelId="{58890E05-AD91-4C6E-AFAF-1570690574EA}" type="presOf" srcId="{B56C8652-49D2-40A6-9CA3-CE8DCF0946F5}" destId="{142F673A-C255-456D-9E41-60A8F8DECB23}" srcOrd="0" destOrd="0" presId="urn:microsoft.com/office/officeart/2005/8/layout/chevron2"/>
-    <dgm:cxn modelId="{8AC5DF0C-260E-43E4-A62F-C504A94FD039}" srcId="{FDFD6E2B-DBAB-4056-BC28-C138724F0441}" destId="{D2F9CDA6-554C-4AD5-966D-376750FE9990}" srcOrd="3" destOrd="0" parTransId="{00A1B110-6DA3-420C-9E70-D9970CFF9FF0}" sibTransId="{1AD3BD3B-DE56-46C8-9696-50FAF0C96F7C}"/>
-    <dgm:cxn modelId="{890C6129-FED3-4F32-A1CE-803923CC13FB}" srcId="{B56C8652-49D2-40A6-9CA3-CE8DCF0946F5}" destId="{A21E80E9-3E30-4727-979B-CC3F1A7A22C5}" srcOrd="1" destOrd="0" parTransId="{5C40DCA5-A5ED-48F4-971B-7B525589E1B6}" sibTransId="{2E128CC8-58D8-49C7-B524-7F998825E08C}"/>
-    <dgm:cxn modelId="{E914BB3B-B500-4A5E-9DB8-004BB6465C45}" type="presOf" srcId="{F13B17A0-86C6-45C8-A1A1-58051CE11C6F}" destId="{5FDFAD45-BE3A-42C7-96F9-147D175477B9}" srcOrd="0" destOrd="1" presId="urn:microsoft.com/office/officeart/2005/8/layout/chevron2"/>
-    <dgm:cxn modelId="{28F4B55F-1626-4A11-B2A3-6C5FBCF466EE}" type="presOf" srcId="{CBA4680F-B921-4539-96E8-73E248B26438}" destId="{5FDFAD45-BE3A-42C7-96F9-147D175477B9}" srcOrd="0" destOrd="0" presId="urn:microsoft.com/office/officeart/2005/8/layout/chevron2"/>
-    <dgm:cxn modelId="{CBE38C60-2AAF-4767-AECB-3298EFA7C80C}" type="presOf" srcId="{15A2342C-342E-4AF1-ABFE-6D641BAF41A1}" destId="{049C38D1-B597-49E9-8B00-78FB12FB25CF}" srcOrd="0" destOrd="0" presId="urn:microsoft.com/office/officeart/2005/8/layout/chevron2"/>
-    <dgm:cxn modelId="{98E93161-C30E-43AA-AF6B-299C6C6168AE}" srcId="{A21E80E9-3E30-4727-979B-CC3F1A7A22C5}" destId="{7251001A-0584-4766-A6D7-0E44BBBBDC12}" srcOrd="0" destOrd="0" parTransId="{FE219C25-7519-49A1-80FC-88DBD277BE7B}" sibTransId="{3A3E3377-B627-44C2-A026-04B55D885A13}"/>
-    <dgm:cxn modelId="{0AA7C964-F08A-434D-849D-CB60E50F510C}" type="presOf" srcId="{FDFD6E2B-DBAB-4056-BC28-C138724F0441}" destId="{0837024A-932D-4B89-A5B5-1646702B04D6}" srcOrd="0" destOrd="0" presId="urn:microsoft.com/office/officeart/2005/8/layout/chevron2"/>
     <dgm:cxn modelId="{331E5267-3B46-40FC-807B-5869C9435943}" srcId="{B56C8652-49D2-40A6-9CA3-CE8DCF0946F5}" destId="{FDFD6E2B-DBAB-4056-BC28-C138724F0441}" srcOrd="2" destOrd="0" parTransId="{A185C7BD-8F3D-48FC-AACD-370FC7051347}" sibTransId="{2EAE1DED-33EB-4BB9-B279-4AEA7E7C396D}"/>
-    <dgm:cxn modelId="{1305294E-46C4-46DE-943F-47C066193AA4}" srcId="{FDFD6E2B-DBAB-4056-BC28-C138724F0441}" destId="{B4460C5C-2EEC-4D27-88F3-8A3DBFE4D343}" srcOrd="1" destOrd="0" parTransId="{8A8A54DB-6A96-4B36-BCD0-B837B772F2DB}" sibTransId="{72452706-6E93-4C8C-AD07-5D4795D82101}"/>
-    <dgm:cxn modelId="{A105D458-9A63-4941-8C72-3207DE7EFBAC}" type="presOf" srcId="{46805B83-CCE2-49B4-94D7-34BF1805A1F1}" destId="{8FBC2C5D-9E47-4B2D-8CC0-0827ADC6EE57}" srcOrd="0" destOrd="2" presId="urn:microsoft.com/office/officeart/2005/8/layout/chevron2"/>
+    <dgm:cxn modelId="{473431EE-F39C-48EA-A045-B86C38621641}" srcId="{15A2342C-342E-4AF1-ABFE-6D641BAF41A1}" destId="{F13B17A0-86C6-45C8-A1A1-58051CE11C6F}" srcOrd="1" destOrd="0" parTransId="{B2B47FC7-5958-4A44-A4CE-453C0A0BC836}" sibTransId="{82F0F7A3-3707-4B24-8D7E-99D069D182AB}"/>
+    <dgm:cxn modelId="{86D5B1B6-FC3B-40C9-B662-895EFF0C484F}" type="presOf" srcId="{1693A56B-51EB-4EEE-B5A0-2587A76BB504}" destId="{8FBC2C5D-9E47-4B2D-8CC0-0827ADC6EE57}" srcOrd="0" destOrd="0" presId="urn:microsoft.com/office/officeart/2005/8/layout/chevron2"/>
     <dgm:cxn modelId="{FD15FF7D-7615-413A-936D-840A88CEEF81}" type="presOf" srcId="{7251001A-0584-4766-A6D7-0E44BBBBDC12}" destId="{3EE3D444-F1E2-4D81-B343-EEB78C9B7BC2}" srcOrd="0" destOrd="0" presId="urn:microsoft.com/office/officeart/2005/8/layout/chevron2"/>
     <dgm:cxn modelId="{2A878A9C-A599-4E25-8F35-179342BC54EF}" srcId="{B56C8652-49D2-40A6-9CA3-CE8DCF0946F5}" destId="{15A2342C-342E-4AF1-ABFE-6D641BAF41A1}" srcOrd="0" destOrd="0" parTransId="{3113E09E-2B5D-47FE-89F9-BC4D9A8CB38B}" sibTransId="{3091C5B6-412E-4FA9-921C-1CCBB20FB078}"/>
-    <dgm:cxn modelId="{26A054A0-1AB4-43B6-8F58-0FC6C712A2A4}" srcId="{15A2342C-342E-4AF1-ABFE-6D641BAF41A1}" destId="{CBA4680F-B921-4539-96E8-73E248B26438}" srcOrd="0" destOrd="0" parTransId="{CFA20A3C-0F95-4996-A60F-CD8C5D7EA0C8}" sibTransId="{66C95EC4-2BD0-44E1-98AF-5AEB75A287A4}"/>
-    <dgm:cxn modelId="{86D5B1B6-FC3B-40C9-B662-895EFF0C484F}" type="presOf" srcId="{1693A56B-51EB-4EEE-B5A0-2587A76BB504}" destId="{8FBC2C5D-9E47-4B2D-8CC0-0827ADC6EE57}" srcOrd="0" destOrd="0" presId="urn:microsoft.com/office/officeart/2005/8/layout/chevron2"/>
-    <dgm:cxn modelId="{3202A8C2-5279-4A81-941D-2141F021A171}" type="presOf" srcId="{B4460C5C-2EEC-4D27-88F3-8A3DBFE4D343}" destId="{8FBC2C5D-9E47-4B2D-8CC0-0827ADC6EE57}" srcOrd="0" destOrd="1" presId="urn:microsoft.com/office/officeart/2005/8/layout/chevron2"/>
-    <dgm:cxn modelId="{E588DDCA-B8F5-490F-9C79-2C1FDDC6873C}" srcId="{FDFD6E2B-DBAB-4056-BC28-C138724F0441}" destId="{46805B83-CCE2-49B4-94D7-34BF1805A1F1}" srcOrd="2" destOrd="0" parTransId="{E2B4C28A-E9E0-4C65-AC26-D901DDA7289A}" sibTransId="{DCDC50B2-6E66-4671-B741-82D8D8280796}"/>
-    <dgm:cxn modelId="{5A9ED1DB-6162-451D-A6D9-04B0C3753391}" type="presOf" srcId="{D2F9CDA6-554C-4AD5-966D-376750FE9990}" destId="{8FBC2C5D-9E47-4B2D-8CC0-0827ADC6EE57}" srcOrd="0" destOrd="3" presId="urn:microsoft.com/office/officeart/2005/8/layout/chevron2"/>
-    <dgm:cxn modelId="{473431EE-F39C-48EA-A045-B86C38621641}" srcId="{15A2342C-342E-4AF1-ABFE-6D641BAF41A1}" destId="{F13B17A0-86C6-45C8-A1A1-58051CE11C6F}" srcOrd="1" destOrd="0" parTransId="{B2B47FC7-5958-4A44-A4CE-453C0A0BC836}" sibTransId="{82F0F7A3-3707-4B24-8D7E-99D069D182AB}"/>
-    <dgm:cxn modelId="{B9F397F0-7A59-4437-81F7-0BEB182623E3}" srcId="{FDFD6E2B-DBAB-4056-BC28-C138724F0441}" destId="{1693A56B-51EB-4EEE-B5A0-2587A76BB504}" srcOrd="0" destOrd="0" parTransId="{71605052-445C-4B49-9A4B-2DCF504AD115}" sibTransId="{84E281FA-B092-4FA8-A2AE-CFCEA05B4214}"/>
-    <dgm:cxn modelId="{82F94CF7-E0DE-440A-B1D1-883572629C8B}" type="presOf" srcId="{A21E80E9-3E30-4727-979B-CC3F1A7A22C5}" destId="{8EB604FD-2448-4F33-9F96-EAFE912047E9}" srcOrd="0" destOrd="0" presId="urn:microsoft.com/office/officeart/2005/8/layout/chevron2"/>
     <dgm:cxn modelId="{13250355-16DD-4CD2-9C12-90DB9DA37F12}" type="presParOf" srcId="{142F673A-C255-456D-9E41-60A8F8DECB23}" destId="{4D46CCB9-E0D7-49E4-8700-7CE19FB27C88}" srcOrd="0" destOrd="0" presId="urn:microsoft.com/office/officeart/2005/8/layout/chevron2"/>
     <dgm:cxn modelId="{817BC056-467A-4A41-A953-E66324C2905D}" type="presParOf" srcId="{4D46CCB9-E0D7-49E4-8700-7CE19FB27C88}" destId="{049C38D1-B597-49E9-8B00-78FB12FB25CF}" srcOrd="0" destOrd="0" presId="urn:microsoft.com/office/officeart/2005/8/layout/chevron2"/>
     <dgm:cxn modelId="{9630092D-D071-4A9D-86C1-D2F2FD525441}" type="presParOf" srcId="{4D46CCB9-E0D7-49E4-8700-7CE19FB27C88}" destId="{5FDFAD45-BE3A-42C7-96F9-147D175477B9}" srcOrd="1" destOrd="0" presId="urn:microsoft.com/office/officeart/2005/8/layout/chevron2"/>
@@ -8888,7 +9365,7 @@
         </a:bodyPr>
         <a:lstStyle/>
         <a:p>
-          <a:pPr marL="0" lvl="0" indent="0" algn="ctr" defTabSz="844550">
+          <a:pPr lvl="0" algn="ctr" defTabSz="844550">
             <a:lnSpc>
               <a:spcPct val="90000"/>
             </a:lnSpc>
@@ -8898,7 +9375,6 @@
             <a:spcAft>
               <a:spcPct val="35000"/>
             </a:spcAft>
-            <a:buNone/>
           </a:pPr>
           <a:r>
             <a:rPr lang="en-US" sz="1900" kern="1200" dirty="0"/>
@@ -8975,7 +9451,7 @@
             <a:spcAft>
               <a:spcPct val="15000"/>
             </a:spcAft>
-            <a:buNone/>
+            <a:buChar char="••"/>
           </a:pPr>
           <a:r>
             <a:rPr lang="en-US" sz="1400" u="sng" kern="1200" dirty="0"/>
@@ -9001,7 +9477,7 @@
             <a:spcAft>
               <a:spcPct val="15000"/>
             </a:spcAft>
-            <a:buNone/>
+            <a:buChar char="••"/>
           </a:pPr>
           <a:r>
             <a:rPr lang="en-US" sz="1400" u="none" kern="1200" dirty="0"/>
@@ -9029,7 +9505,7 @@
             <a:spcAft>
               <a:spcPct val="15000"/>
             </a:spcAft>
-            <a:buNone/>
+            <a:buChar char="••"/>
           </a:pPr>
           <a:r>
             <a:rPr lang="en-US" sz="1400" u="none" kern="1200" dirty="0"/>
@@ -9057,7 +9533,7 @@
             <a:spcAft>
               <a:spcPct val="15000"/>
             </a:spcAft>
-            <a:buNone/>
+            <a:buChar char="••"/>
           </a:pPr>
           <a:r>
             <a:rPr lang="en-US" sz="1400" u="none" kern="1200" dirty="0"/>
@@ -9085,7 +9561,7 @@
             <a:spcAft>
               <a:spcPct val="15000"/>
             </a:spcAft>
-            <a:buNone/>
+            <a:buChar char="••"/>
           </a:pPr>
           <a:r>
             <a:rPr lang="en-US" sz="1400" u="none" kern="1200" dirty="0"/>
@@ -9188,7 +9664,7 @@
         </a:bodyPr>
         <a:lstStyle/>
         <a:p>
-          <a:pPr marL="0" lvl="0" indent="0" algn="ctr" defTabSz="844550">
+          <a:pPr lvl="0" algn="ctr" defTabSz="844550">
             <a:lnSpc>
               <a:spcPct val="90000"/>
             </a:lnSpc>
@@ -9198,7 +9674,6 @@
             <a:spcAft>
               <a:spcPct val="35000"/>
             </a:spcAft>
-            <a:buNone/>
           </a:pPr>
           <a:r>
             <a:rPr lang="en-US" sz="1900" kern="1200" dirty="0"/>
@@ -9275,7 +9750,7 @@
             <a:spcAft>
               <a:spcPct val="15000"/>
             </a:spcAft>
-            <a:buNone/>
+            <a:buChar char="••"/>
           </a:pPr>
           <a:r>
             <a:rPr lang="en-US" sz="2000" u="none" kern="1200" dirty="0"/>
@@ -9351,7 +9826,7 @@
         </a:bodyPr>
         <a:lstStyle/>
         <a:p>
-          <a:pPr marL="0" lvl="0" indent="0" algn="ctr" defTabSz="844550">
+          <a:pPr lvl="0" algn="ctr" defTabSz="844550">
             <a:lnSpc>
               <a:spcPct val="90000"/>
             </a:lnSpc>
@@ -9361,7 +9836,6 @@
             <a:spcAft>
               <a:spcPct val="35000"/>
             </a:spcAft>
-            <a:buNone/>
           </a:pPr>
           <a:r>
             <a:rPr lang="en-US" sz="1900" kern="1200" dirty="0"/>
@@ -9438,7 +9912,7 @@
             <a:spcAft>
               <a:spcPct val="15000"/>
             </a:spcAft>
-            <a:buNone/>
+            <a:buChar char="••"/>
           </a:pPr>
           <a:r>
             <a:rPr lang="en-US" sz="1800" u="none" kern="1200" dirty="0"/>
@@ -9532,7 +10006,7 @@
         </a:bodyPr>
         <a:lstStyle/>
         <a:p>
-          <a:pPr marL="0" lvl="0" indent="0" algn="ctr" defTabSz="800100">
+          <a:pPr lvl="0" algn="ctr" defTabSz="800100">
             <a:lnSpc>
               <a:spcPct val="90000"/>
             </a:lnSpc>
@@ -9542,7 +10016,6 @@
             <a:spcAft>
               <a:spcPct val="35000"/>
             </a:spcAft>
-            <a:buNone/>
           </a:pPr>
           <a:r>
             <a:rPr lang="en-US" sz="1800" kern="1200" dirty="0"/>
@@ -9619,7 +10092,7 @@
             <a:spcAft>
               <a:spcPct val="15000"/>
             </a:spcAft>
-            <a:buNone/>
+            <a:buChar char="••"/>
           </a:pPr>
           <a:r>
             <a:rPr lang="en-US" sz="1400" u="none" kern="1200" dirty="0"/>
@@ -9674,7 +10147,7 @@
             <a:spcAft>
               <a:spcPct val="15000"/>
             </a:spcAft>
-            <a:buNone/>
+            <a:buChar char="••"/>
           </a:pPr>
           <a:r>
             <a:rPr lang="en-US" sz="1400" u="none" kern="1200" dirty="0"/>
@@ -9710,7 +10183,7 @@
             <a:spcAft>
               <a:spcPct val="15000"/>
             </a:spcAft>
-            <a:buNone/>
+            <a:buChar char="••"/>
           </a:pPr>
           <a:r>
             <a:rPr lang="en-US" sz="1400" u="none" kern="1200" dirty="0"/>
@@ -9746,7 +10219,7 @@
             <a:spcAft>
               <a:spcPct val="15000"/>
             </a:spcAft>
-            <a:buNone/>
+            <a:buChar char="••"/>
           </a:pPr>
           <a:r>
             <a:rPr lang="en-US" sz="1400" u="none" kern="1200" dirty="0"/>
@@ -9802,7 +10275,7 @@
             <a:spcAft>
               <a:spcPct val="15000"/>
             </a:spcAft>
-            <a:buNone/>
+            <a:buChar char="••"/>
           </a:pPr>
           <a:r>
             <a:rPr lang="en-US" sz="1400" u="none" kern="1200" dirty="0">
@@ -9860,7 +10333,7 @@
             <a:spcAft>
               <a:spcPct val="15000"/>
             </a:spcAft>
-            <a:buNone/>
+            <a:buChar char="••"/>
           </a:pPr>
           <a:r>
             <a:rPr lang="en-US" sz="1400" u="none" kern="1200" dirty="0">
@@ -9942,7 +10415,7 @@
         </a:bodyPr>
         <a:lstStyle/>
         <a:p>
-          <a:pPr marL="0" lvl="0" indent="0" algn="ctr" defTabSz="800100">
+          <a:pPr lvl="0" algn="ctr" defTabSz="800100">
             <a:lnSpc>
               <a:spcPct val="90000"/>
             </a:lnSpc>
@@ -9952,7 +10425,6 @@
             <a:spcAft>
               <a:spcPct val="35000"/>
             </a:spcAft>
-            <a:buNone/>
           </a:pPr>
           <a:r>
             <a:rPr lang="en-US" sz="1800" kern="1200" dirty="0"/>
@@ -10029,7 +10501,7 @@
             <a:spcAft>
               <a:spcPct val="15000"/>
             </a:spcAft>
-            <a:buNone/>
+            <a:buChar char="••"/>
           </a:pPr>
           <a:r>
             <a:rPr lang="en-US" sz="2000" u="none" kern="1200" dirty="0"/>
@@ -10105,7 +10577,7 @@
         </a:bodyPr>
         <a:lstStyle/>
         <a:p>
-          <a:pPr marL="0" lvl="0" indent="0" algn="ctr" defTabSz="800100">
+          <a:pPr lvl="0" algn="ctr" defTabSz="800100">
             <a:lnSpc>
               <a:spcPct val="90000"/>
             </a:lnSpc>
@@ -10115,7 +10587,6 @@
             <a:spcAft>
               <a:spcPct val="35000"/>
             </a:spcAft>
-            <a:buNone/>
           </a:pPr>
           <a:r>
             <a:rPr lang="en-US" sz="1800" kern="1200" dirty="0"/>
@@ -10192,7 +10663,7 @@
             <a:spcAft>
               <a:spcPct val="15000"/>
             </a:spcAft>
-            <a:buNone/>
+            <a:buChar char="••"/>
           </a:pPr>
           <a:r>
             <a:rPr lang="en-US" sz="1800" u="none" kern="1200" dirty="0"/>
@@ -10242,7 +10713,7 @@
             <a:spcAft>
               <a:spcPct val="15000"/>
             </a:spcAft>
-            <a:buNone/>
+            <a:buChar char="••"/>
           </a:pPr>
           <a:r>
             <a:rPr lang="en-US" sz="1800" u="none" kern="1200" dirty="0"/>
@@ -10346,7 +10817,7 @@
         </a:bodyPr>
         <a:lstStyle/>
         <a:p>
-          <a:pPr marL="0" lvl="0" indent="0" algn="ctr" defTabSz="800100">
+          <a:pPr lvl="0" algn="ctr" defTabSz="800100">
             <a:lnSpc>
               <a:spcPct val="90000"/>
             </a:lnSpc>
@@ -10356,7 +10827,6 @@
             <a:spcAft>
               <a:spcPct val="35000"/>
             </a:spcAft>
-            <a:buNone/>
           </a:pPr>
           <a:r>
             <a:rPr lang="en-US" sz="1800" kern="1200" dirty="0"/>
@@ -10433,7 +10903,7 @@
             <a:spcAft>
               <a:spcPct val="15000"/>
             </a:spcAft>
-            <a:buNone/>
+            <a:buChar char="••"/>
           </a:pPr>
           <a:r>
             <a:rPr lang="en-US" sz="1800" u="none" kern="1200" dirty="0"/>
@@ -10484,7 +10954,7 @@
             <a:spcAft>
               <a:spcPct val="15000"/>
             </a:spcAft>
-            <a:buNone/>
+            <a:buChar char="••"/>
           </a:pPr>
           <a:r>
             <a:rPr lang="en-US" sz="1800" u="none" kern="1200" dirty="0">
@@ -10566,7 +11036,7 @@
         </a:bodyPr>
         <a:lstStyle/>
         <a:p>
-          <a:pPr marL="0" lvl="0" indent="0" algn="ctr" defTabSz="800100">
+          <a:pPr lvl="0" algn="ctr" defTabSz="800100">
             <a:lnSpc>
               <a:spcPct val="90000"/>
             </a:lnSpc>
@@ -10576,7 +11046,6 @@
             <a:spcAft>
               <a:spcPct val="35000"/>
             </a:spcAft>
-            <a:buNone/>
           </a:pPr>
           <a:r>
             <a:rPr lang="en-US" sz="1800" kern="1200" dirty="0"/>
@@ -10653,7 +11122,7 @@
             <a:spcAft>
               <a:spcPct val="15000"/>
             </a:spcAft>
-            <a:buNone/>
+            <a:buChar char="••"/>
           </a:pPr>
           <a:r>
             <a:rPr lang="en-US" sz="1800" u="none" kern="1200" dirty="0"/>
@@ -10729,7 +11198,7 @@
         </a:bodyPr>
         <a:lstStyle/>
         <a:p>
-          <a:pPr marL="0" lvl="0" indent="0" algn="ctr" defTabSz="800100">
+          <a:pPr lvl="0" algn="ctr" defTabSz="800100">
             <a:lnSpc>
               <a:spcPct val="90000"/>
             </a:lnSpc>
@@ -10739,7 +11208,6 @@
             <a:spcAft>
               <a:spcPct val="35000"/>
             </a:spcAft>
-            <a:buNone/>
           </a:pPr>
           <a:r>
             <a:rPr lang="en-US" sz="1800" kern="1200" dirty="0"/>
@@ -10816,7 +11284,7 @@
             <a:spcAft>
               <a:spcPct val="15000"/>
             </a:spcAft>
-            <a:buNone/>
+            <a:buChar char="••"/>
           </a:pPr>
           <a:r>
             <a:rPr lang="en-US" sz="1600" u="sng" kern="1200" dirty="0" err="1">
@@ -10878,7 +11346,7 @@
             <a:spcAft>
               <a:spcPct val="15000"/>
             </a:spcAft>
-            <a:buNone/>
+            <a:buChar char="••"/>
           </a:pPr>
           <a:r>
             <a:rPr lang="en-US" sz="1600" kern="1200" dirty="0" err="1">
@@ -10918,7 +11386,7 @@
             <a:spcAft>
               <a:spcPct val="15000"/>
             </a:spcAft>
-            <a:buNone/>
+            <a:buChar char="••"/>
           </a:pPr>
           <a:r>
             <a:rPr lang="en-US" sz="1600" kern="1200" dirty="0">
@@ -10966,7 +11434,7 @@
             <a:spcAft>
               <a:spcPct val="15000"/>
             </a:spcAft>
-            <a:buNone/>
+            <a:buChar char="••"/>
           </a:pPr>
           <a:r>
             <a:rPr lang="en-US" sz="1600" kern="1200" dirty="0">
@@ -10998,7 +11466,7 @@
             <a:spcAft>
               <a:spcPct val="15000"/>
             </a:spcAft>
-            <a:buNone/>
+            <a:buChar char="••"/>
           </a:pPr>
           <a:r>
             <a:rPr lang="en-US" sz="1600" kern="1200" dirty="0" err="1">
@@ -11038,7 +11506,7 @@
             <a:spcAft>
               <a:spcPct val="15000"/>
             </a:spcAft>
-            <a:buNone/>
+            <a:buChar char="••"/>
           </a:pPr>
           <a:r>
             <a:rPr lang="en-US" sz="1600" kern="1200" dirty="0">
@@ -11070,7 +11538,7 @@
             <a:spcAft>
               <a:spcPct val="15000"/>
             </a:spcAft>
-            <a:buNone/>
+            <a:buChar char="••"/>
           </a:pPr>
           <a:endParaRPr lang="en-US" sz="1600" kern="1200" dirty="0">
             <a:solidFill>
@@ -11103,8 +11571,8 @@
       </dsp:nvSpPr>
       <dsp:spPr>
         <a:xfrm rot="5400000">
-          <a:off x="-274369" y="552981"/>
-          <a:ext cx="1829128" cy="1280390"/>
+          <a:off x="-204191" y="547002"/>
+          <a:ext cx="1361273" cy="952891"/>
         </a:xfrm>
         <a:prstGeom prst="chevron">
           <a:avLst/>
@@ -11146,12 +11614,12 @@
         </a:fontRef>
       </dsp:style>
       <dsp:txBody>
-        <a:bodyPr spcFirstLastPara="0" vert="horz" wrap="square" lIns="11430" tIns="11430" rIns="11430" bIns="11430" numCol="1" spcCol="1270" anchor="ctr" anchorCtr="0">
+        <a:bodyPr spcFirstLastPara="0" vert="horz" wrap="square" lIns="8255" tIns="8255" rIns="8255" bIns="8255" numCol="1" spcCol="1270" anchor="ctr" anchorCtr="0">
           <a:noAutofit/>
         </a:bodyPr>
         <a:lstStyle/>
         <a:p>
-          <a:pPr marL="0" lvl="0" indent="0" algn="ctr" defTabSz="800100">
+          <a:pPr lvl="0" algn="ctr" defTabSz="577850">
             <a:lnSpc>
               <a:spcPct val="90000"/>
             </a:lnSpc>
@@ -11161,17 +11629,16 @@
             <a:spcAft>
               <a:spcPct val="35000"/>
             </a:spcAft>
-            <a:buNone/>
           </a:pPr>
           <a:r>
-            <a:rPr lang="en-US" sz="1800" kern="1200" dirty="0"/>
+            <a:rPr lang="en-US" sz="1300" kern="1200" dirty="0"/>
             <a:t>Input data</a:t>
           </a:r>
         </a:p>
       </dsp:txBody>
       <dsp:txXfrm rot="-5400000">
-        <a:off x="0" y="918807"/>
-        <a:ext cx="1280390" cy="548738"/>
+        <a:off x="1" y="819257"/>
+        <a:ext cx="952891" cy="408382"/>
       </dsp:txXfrm>
     </dsp:sp>
     <dsp:sp modelId="{5FDFAD45-BE3A-42C7-96F9-147D175477B9}">
@@ -11181,8 +11648,8 @@
       </dsp:nvSpPr>
       <dsp:spPr>
         <a:xfrm rot="5400000">
-          <a:off x="3845434" y="-2550726"/>
-          <a:ext cx="1717521" cy="6847609"/>
+          <a:off x="3864198" y="-2802329"/>
+          <a:ext cx="1352494" cy="7175108"/>
         </a:xfrm>
         <a:prstGeom prst="round2SameRect">
           <a:avLst/>
@@ -11223,12 +11690,12 @@
         <a:fontRef idx="minor"/>
       </dsp:style>
       <dsp:txBody>
-        <a:bodyPr spcFirstLastPara="0" vert="horz" wrap="square" lIns="99568" tIns="8890" rIns="8890" bIns="8890" numCol="1" spcCol="1270" anchor="ctr" anchorCtr="0">
+        <a:bodyPr spcFirstLastPara="0" vert="horz" wrap="square" lIns="128016" tIns="11430" rIns="11430" bIns="11430" numCol="1" spcCol="1270" anchor="ctr" anchorCtr="0">
           <a:noAutofit/>
         </a:bodyPr>
         <a:lstStyle/>
         <a:p>
-          <a:pPr marL="114300" lvl="1" indent="-114300" algn="l" defTabSz="622300">
+          <a:pPr marL="171450" lvl="1" indent="-171450" algn="l" defTabSz="800100">
             <a:lnSpc>
               <a:spcPct val="90000"/>
             </a:lnSpc>
@@ -11238,15 +11705,15 @@
             <a:spcAft>
               <a:spcPct val="15000"/>
             </a:spcAft>
-            <a:buNone/>
+            <a:buChar char="••"/>
           </a:pPr>
           <a:r>
-            <a:rPr lang="en-US" sz="1400" u="sng" kern="1200" dirty="0"/>
+            <a:rPr lang="en-US" sz="1800" u="sng" kern="1200" dirty="0"/>
             <a:t>~/data/processed/</a:t>
           </a:r>
         </a:p>
         <a:p>
-          <a:pPr marL="114300" lvl="1" indent="-114300" algn="l" defTabSz="622300">
+          <a:pPr marL="342900" lvl="2" indent="-171450" algn="l" defTabSz="800100">
             <a:lnSpc>
               <a:spcPct val="90000"/>
             </a:lnSpc>
@@ -11256,33 +11723,46 @@
             <a:spcAft>
               <a:spcPct val="15000"/>
             </a:spcAft>
-            <a:buNone/>
+            <a:buChar char="••"/>
           </a:pPr>
           <a:r>
-            <a:rPr lang="en-US" sz="1400" u="none" kern="1200" dirty="0"/>
-            <a:t>- </a:t>
-          </a:r>
-          <a:r>
-            <a:rPr lang="en-US" sz="1400" u="none" kern="1200" dirty="0" err="1"/>
+            <a:rPr lang="en-US" sz="1800" u="none" kern="1200" dirty="0" err="1" smtClean="0"/>
             <a:t>grid_goa.RData</a:t>
           </a:r>
           <a:r>
-            <a:rPr lang="en-US" sz="1400" u="none" kern="1200" dirty="0"/>
+            <a:rPr lang="en-US" sz="1800" u="none" kern="1200" dirty="0"/>
             <a:t>: </a:t>
           </a:r>
           <a:r>
-            <a:rPr lang="en-US" sz="1400" i="0" u="none" kern="1200" dirty="0">
+            <a:rPr lang="en-US" sz="1800" i="0" u="none" kern="1200" dirty="0">
               <a:solidFill>
                 <a:schemeClr val="bg1">
                   <a:lumMod val="50000"/>
                 </a:schemeClr>
               </a:solidFill>
             </a:rPr>
-            <a:t>goa grid with bathymetry</a:t>
-          </a:r>
-        </a:p>
-        <a:p>
-          <a:pPr marL="114300" lvl="1" indent="-114300" algn="l" defTabSz="622300">
+            <a:t>goa grid with </a:t>
+          </a:r>
+          <a:r>
+            <a:rPr lang="en-US" sz="1800" i="0" u="none" kern="1200" dirty="0" smtClean="0">
+              <a:solidFill>
+                <a:schemeClr val="bg1">
+                  <a:lumMod val="50000"/>
+                </a:schemeClr>
+              </a:solidFill>
+            </a:rPr>
+            <a:t>bathymetry</a:t>
+          </a:r>
+          <a:endParaRPr lang="en-US" sz="1800" i="0" u="none" kern="1200" dirty="0">
+            <a:solidFill>
+              <a:schemeClr val="bg1">
+                <a:lumMod val="50000"/>
+              </a:schemeClr>
+            </a:solidFill>
+          </a:endParaRPr>
+        </a:p>
+        <a:p>
+          <a:pPr marL="342900" lvl="2" indent="-171450" algn="l" defTabSz="800100">
             <a:lnSpc>
               <a:spcPct val="90000"/>
             </a:lnSpc>
@@ -11292,62 +11772,18 @@
             <a:spcAft>
               <a:spcPct val="15000"/>
             </a:spcAft>
-            <a:buNone/>
+            <a:buChar char="••"/>
           </a:pPr>
           <a:r>
-            <a:rPr lang="en-US" sz="1400" u="none" kern="1200" dirty="0"/>
-            <a:t>- </a:t>
-          </a:r>
-          <a:r>
-            <a:rPr lang="en-US" sz="1400" u="none" kern="1200" dirty="0" err="1"/>
-            <a:t>VAST_fit_D_gct.Rdata</a:t>
-          </a:r>
-          <a:r>
-            <a:rPr lang="en-US" sz="1400" u="none" kern="1200" dirty="0"/>
-            <a:t>: </a:t>
-          </a:r>
-          <a:r>
-            <a:rPr lang="en-US" sz="1400" u="none" kern="1200" dirty="0">
-              <a:solidFill>
-                <a:schemeClr val="bg1">
-                  <a:lumMod val="50000"/>
-                </a:schemeClr>
-              </a:solidFill>
-            </a:rPr>
-            <a:t>“best” single-species predicted density for each cell (g), species (c) and year (t) in one 3-D array</a:t>
-          </a:r>
-        </a:p>
-        <a:p>
-          <a:pPr marL="114300" lvl="1" indent="-114300" algn="l" defTabSz="622300">
-            <a:lnSpc>
-              <a:spcPct val="90000"/>
-            </a:lnSpc>
-            <a:spcBef>
-              <a:spcPct val="0"/>
-            </a:spcBef>
-            <a:spcAft>
-              <a:spcPct val="15000"/>
-            </a:spcAft>
-            <a:buNone/>
-          </a:pPr>
-          <a:r>
-            <a:rPr lang="en-US" sz="1400" u="none" kern="1200" dirty="0">
+            <a:rPr lang="en-US" sz="1800" i="0" u="none" kern="1200" dirty="0" err="1" smtClean="0">
               <a:solidFill>
                 <a:schemeClr val="tx1"/>
               </a:solidFill>
             </a:rPr>
-            <a:t>-</a:t>
-          </a:r>
-          <a:r>
-            <a:rPr lang="en-US" sz="1400" u="none" kern="1200" dirty="0" err="1">
-              <a:solidFill>
-                <a:schemeClr val="tx1"/>
-              </a:solidFill>
-            </a:rPr>
-            <a:t>VAST_fit_I_gct.Rdata</a:t>
-          </a:r>
-          <a:r>
-            <a:rPr lang="en-US" sz="1400" u="none" kern="1200" dirty="0">
+            <a:t>prednll_VAST_models.Rdata</a:t>
+          </a:r>
+          <a:r>
+            <a:rPr lang="en-US" sz="1800" i="0" u="none" kern="1200" dirty="0" smtClean="0">
               <a:solidFill>
                 <a:schemeClr val="tx1"/>
               </a:solidFill>
@@ -11355,20 +11791,31 @@
             <a:t>: </a:t>
           </a:r>
           <a:r>
-            <a:rPr lang="en-US" sz="1400" u="none" kern="1200" dirty="0">
+            <a:rPr lang="en-US" sz="1800" i="0" u="none" kern="1200" dirty="0" err="1" smtClean="0">
               <a:solidFill>
-                <a:schemeClr val="bg1">
-                  <a:lumMod val="50000"/>
-                </a:schemeClr>
+                <a:schemeClr val="tx1"/>
               </a:solidFill>
             </a:rPr>
-            <a:t>“best” single-species predicted abundance for each cell (g), species (c) and year (t) in one 3-D array</a:t>
-          </a:r>
+            <a:t>dataframe</a:t>
+          </a:r>
+          <a:r>
+            <a:rPr lang="en-US" sz="1800" i="0" u="none" kern="1200" dirty="0" smtClean="0">
+              <a:solidFill>
+                <a:schemeClr val="tx1"/>
+              </a:solidFill>
+            </a:rPr>
+            <a:t> with VAST 10-fold cross-validation results for each species</a:t>
+          </a:r>
+          <a:endParaRPr lang="en-US" sz="1800" i="0" u="none" kern="1200" dirty="0">
+            <a:solidFill>
+              <a:schemeClr val="tx1"/>
+            </a:solidFill>
+          </a:endParaRPr>
         </a:p>
       </dsp:txBody>
       <dsp:txXfrm rot="-5400000">
-        <a:off x="1280390" y="98160"/>
-        <a:ext cx="6763767" cy="1549837"/>
+        <a:off x="952892" y="175000"/>
+        <a:ext cx="7109085" cy="1220448"/>
       </dsp:txXfrm>
     </dsp:sp>
     <dsp:sp modelId="{8EB604FD-2448-4F33-9F96-EAFE912047E9}">
@@ -11378,8 +11825,8 @@
       </dsp:nvSpPr>
       <dsp:spPr>
         <a:xfrm rot="5400000">
-          <a:off x="-274369" y="2201285"/>
-          <a:ext cx="1829128" cy="1280390"/>
+          <a:off x="-204191" y="1773702"/>
+          <a:ext cx="1361273" cy="952891"/>
         </a:xfrm>
         <a:prstGeom prst="chevron">
           <a:avLst/>
@@ -11421,12 +11868,12 @@
         </a:fontRef>
       </dsp:style>
       <dsp:txBody>
-        <a:bodyPr spcFirstLastPara="0" vert="horz" wrap="square" lIns="11430" tIns="11430" rIns="11430" bIns="11430" numCol="1" spcCol="1270" anchor="ctr" anchorCtr="0">
+        <a:bodyPr spcFirstLastPara="0" vert="horz" wrap="square" lIns="8255" tIns="8255" rIns="8255" bIns="8255" numCol="1" spcCol="1270" anchor="ctr" anchorCtr="0">
           <a:noAutofit/>
         </a:bodyPr>
         <a:lstStyle/>
         <a:p>
-          <a:pPr marL="0" lvl="0" indent="0" algn="ctr" defTabSz="800100">
+          <a:pPr lvl="0" algn="ctr" defTabSz="577850">
             <a:lnSpc>
               <a:spcPct val="90000"/>
             </a:lnSpc>
@@ -11436,17 +11883,16 @@
             <a:spcAft>
               <a:spcPct val="35000"/>
             </a:spcAft>
-            <a:buNone/>
           </a:pPr>
           <a:r>
-            <a:rPr lang="en-US" sz="1800" kern="1200" dirty="0"/>
+            <a:rPr lang="en-US" sz="1300" kern="1200" dirty="0"/>
             <a:t>Script Program</a:t>
           </a:r>
         </a:p>
       </dsp:txBody>
       <dsp:txXfrm rot="-5400000">
-        <a:off x="0" y="2567111"/>
-        <a:ext cx="1280390" cy="548738"/>
+        <a:off x="1" y="2045957"/>
+        <a:ext cx="952891" cy="408382"/>
       </dsp:txXfrm>
     </dsp:sp>
     <dsp:sp modelId="{3EE3D444-F1E2-4D81-B343-EEB78C9B7BC2}">
@@ -11456,8 +11902,8 @@
       </dsp:nvSpPr>
       <dsp:spPr>
         <a:xfrm rot="5400000">
-          <a:off x="4491072" y="-902421"/>
-          <a:ext cx="426244" cy="6847609"/>
+          <a:off x="4381752" y="-1575396"/>
+          <a:ext cx="317386" cy="7175108"/>
         </a:xfrm>
         <a:prstGeom prst="round2SameRect">
           <a:avLst/>
@@ -11513,7 +11959,7 @@
             <a:spcAft>
               <a:spcPct val="15000"/>
             </a:spcAft>
-            <a:buNone/>
+            <a:buChar char="••"/>
           </a:pPr>
           <a:r>
             <a:rPr lang="en-US" sz="2000" u="none" kern="1200" dirty="0"/>
@@ -11530,8 +11976,8 @@
         </a:p>
       </dsp:txBody>
       <dsp:txXfrm rot="-5400000">
-        <a:off x="1280390" y="2329069"/>
-        <a:ext cx="6826801" cy="384628"/>
+        <a:off x="952891" y="1868959"/>
+        <a:ext cx="7159614" cy="286398"/>
       </dsp:txXfrm>
     </dsp:sp>
     <dsp:sp modelId="{0837024A-932D-4B89-A5B5-1646702B04D6}">
@@ -11541,8 +11987,8 @@
       </dsp:nvSpPr>
       <dsp:spPr>
         <a:xfrm rot="5400000">
-          <a:off x="-274369" y="3849589"/>
-          <a:ext cx="1829128" cy="1280390"/>
+          <a:off x="-204191" y="3814727"/>
+          <a:ext cx="1361273" cy="952891"/>
         </a:xfrm>
         <a:prstGeom prst="chevron">
           <a:avLst/>
@@ -11584,12 +12030,12 @@
         </a:fontRef>
       </dsp:style>
       <dsp:txBody>
-        <a:bodyPr spcFirstLastPara="0" vert="horz" wrap="square" lIns="11430" tIns="11430" rIns="11430" bIns="11430" numCol="1" spcCol="1270" anchor="ctr" anchorCtr="0">
+        <a:bodyPr spcFirstLastPara="0" vert="horz" wrap="square" lIns="8255" tIns="8255" rIns="8255" bIns="8255" numCol="1" spcCol="1270" anchor="ctr" anchorCtr="0">
           <a:noAutofit/>
         </a:bodyPr>
         <a:lstStyle/>
         <a:p>
-          <a:pPr marL="0" lvl="0" indent="0" algn="ctr" defTabSz="800100">
+          <a:pPr lvl="0" algn="ctr" defTabSz="577850">
             <a:lnSpc>
               <a:spcPct val="90000"/>
             </a:lnSpc>
@@ -11599,17 +12045,16 @@
             <a:spcAft>
               <a:spcPct val="35000"/>
             </a:spcAft>
-            <a:buNone/>
           </a:pPr>
           <a:r>
-            <a:rPr lang="en-US" sz="1800" kern="1200" dirty="0"/>
+            <a:rPr lang="en-US" sz="1300" kern="1200" dirty="0"/>
             <a:t>Output</a:t>
           </a:r>
         </a:p>
       </dsp:txBody>
       <dsp:txXfrm rot="-5400000">
-        <a:off x="0" y="4215415"/>
-        <a:ext cx="1280390" cy="548738"/>
+        <a:off x="1" y="4086982"/>
+        <a:ext cx="952891" cy="408382"/>
       </dsp:txXfrm>
     </dsp:sp>
     <dsp:sp modelId="{8FBC2C5D-9E47-4B2D-8CC0-0827ADC6EE57}">
@@ -11619,8 +12064,8 @@
       </dsp:nvSpPr>
       <dsp:spPr>
         <a:xfrm rot="5400000">
-          <a:off x="4109728" y="745882"/>
-          <a:ext cx="1188933" cy="6847609"/>
+          <a:off x="3283707" y="465396"/>
+          <a:ext cx="2513477" cy="7175108"/>
         </a:xfrm>
         <a:prstGeom prst="round2SameRect">
           <a:avLst/>
@@ -11661,12 +12106,12 @@
         <a:fontRef idx="minor"/>
       </dsp:style>
       <dsp:txBody>
-        <a:bodyPr spcFirstLastPara="0" vert="horz" wrap="square" lIns="128016" tIns="11430" rIns="11430" bIns="11430" numCol="1" spcCol="1270" anchor="ctr" anchorCtr="0">
+        <a:bodyPr spcFirstLastPara="0" vert="horz" wrap="square" lIns="113792" tIns="10160" rIns="10160" bIns="10160" numCol="1" spcCol="1270" anchor="ctr" anchorCtr="0">
           <a:noAutofit/>
         </a:bodyPr>
         <a:lstStyle/>
         <a:p>
-          <a:pPr marL="171450" lvl="1" indent="-171450" algn="l" defTabSz="800100">
+          <a:pPr marL="171450" lvl="1" indent="-171450" algn="l" defTabSz="711200">
             <a:lnSpc>
               <a:spcPct val="90000"/>
             </a:lnSpc>
@@ -11676,26 +12121,51 @@
             <a:spcAft>
               <a:spcPct val="15000"/>
             </a:spcAft>
-            <a:buNone/>
+            <a:buChar char="••"/>
           </a:pPr>
           <a:r>
-            <a:rPr lang="en-US" sz="1800" u="none" kern="1200" dirty="0"/>
+            <a:rPr lang="en-US" sz="1600" u="none" kern="1200" dirty="0"/>
             <a:t>~/</a:t>
           </a:r>
           <a:r>
-            <a:rPr lang="en-US" sz="1800" kern="1200" dirty="0"/>
-            <a:t>data/processed/</a:t>
-          </a:r>
-          <a:r>
-            <a:rPr lang="en-US" sz="1800" kern="1200" dirty="0" err="1"/>
+            <a:rPr lang="en-US" sz="1600" kern="1200" dirty="0"/>
+            <a:t>data/processed</a:t>
+          </a:r>
+          <a:r>
+            <a:rPr lang="en-US" sz="1600" kern="1200" dirty="0" smtClean="0"/>
+            <a:t>/</a:t>
+          </a:r>
+          <a:endParaRPr lang="en-US" sz="1600" kern="1200" dirty="0">
+            <a:solidFill>
+              <a:schemeClr val="bg1">
+                <a:lumMod val="50000"/>
+              </a:schemeClr>
+            </a:solidFill>
+          </a:endParaRPr>
+        </a:p>
+        <a:p>
+          <a:pPr marL="342900" lvl="2" indent="-171450" algn="l" defTabSz="711200">
+            <a:lnSpc>
+              <a:spcPct val="90000"/>
+            </a:lnSpc>
+            <a:spcBef>
+              <a:spcPct val="0"/>
+            </a:spcBef>
+            <a:spcAft>
+              <a:spcPct val="15000"/>
+            </a:spcAft>
+            <a:buChar char="••"/>
+          </a:pPr>
+          <a:r>
+            <a:rPr lang="en-US" sz="1600" kern="1200" dirty="0" err="1" smtClean="0"/>
             <a:t>optimization_data.RData</a:t>
           </a:r>
           <a:r>
-            <a:rPr lang="en-US" sz="1800" kern="1200" dirty="0"/>
+            <a:rPr lang="en-US" sz="1600" kern="1200" dirty="0"/>
             <a:t>: </a:t>
           </a:r>
           <a:r>
-            <a:rPr lang="en-US" sz="1800" kern="1200" dirty="0">
+            <a:rPr lang="en-US" sz="1600" kern="1200" dirty="0">
               <a:solidFill>
                 <a:schemeClr val="bg1">
                   <a:lumMod val="50000"/>
@@ -11705,10 +12175,119 @@
             <a:t>main survey optimization data input, constants used throughout the rest of the analysis and in figures</a:t>
           </a:r>
         </a:p>
+        <a:p>
+          <a:pPr marL="342900" lvl="2" indent="-171450" algn="l" defTabSz="711200">
+            <a:lnSpc>
+              <a:spcPct val="90000"/>
+            </a:lnSpc>
+            <a:spcBef>
+              <a:spcPct val="0"/>
+            </a:spcBef>
+            <a:spcAft>
+              <a:spcPct val="15000"/>
+            </a:spcAft>
+            <a:buChar char="••"/>
+          </a:pPr>
+          <a:r>
+            <a:rPr lang="en-US" sz="1600" kern="1200" dirty="0" err="1" smtClean="0">
+              <a:solidFill>
+                <a:schemeClr val="tx1"/>
+              </a:solidFill>
+            </a:rPr>
+            <a:t>dens_vals_MLE.RData</a:t>
+          </a:r>
+          <a:r>
+            <a:rPr lang="en-US" sz="1600" kern="1200" dirty="0" smtClean="0">
+              <a:solidFill>
+                <a:schemeClr val="tx1"/>
+              </a:solidFill>
+            </a:rPr>
+            <a:t>: predicted density based on the maximum likelihood estimates of the fixed and random parameters from VAST</a:t>
+          </a:r>
+          <a:endParaRPr lang="en-US" sz="1600" kern="1200" dirty="0">
+            <a:solidFill>
+              <a:schemeClr val="tx1"/>
+            </a:solidFill>
+          </a:endParaRPr>
+        </a:p>
+        <a:p>
+          <a:pPr marL="342900" lvl="2" indent="-171450" algn="l" defTabSz="711200">
+            <a:lnSpc>
+              <a:spcPct val="90000"/>
+            </a:lnSpc>
+            <a:spcBef>
+              <a:spcPct val="0"/>
+            </a:spcBef>
+            <a:spcAft>
+              <a:spcPct val="15000"/>
+            </a:spcAft>
+            <a:buChar char="••"/>
+          </a:pPr>
+          <a:r>
+            <a:rPr lang="en-US" sz="1600" kern="1200" dirty="0" err="1" smtClean="0">
+              <a:solidFill>
+                <a:schemeClr val="tx1"/>
+              </a:solidFill>
+            </a:rPr>
+            <a:t>dens_vals_measurement.RData</a:t>
+          </a:r>
+          <a:r>
+            <a:rPr lang="en-US" sz="1600" kern="1200" dirty="0" smtClean="0">
+              <a:solidFill>
+                <a:schemeClr val="tx1"/>
+              </a:solidFill>
+            </a:rPr>
+            <a:t>: predicted density based on the simulating measurement error conditioned on the fixed and random effects from VAST</a:t>
+          </a:r>
+          <a:endParaRPr lang="en-US" sz="1600" kern="1200" dirty="0">
+            <a:solidFill>
+              <a:schemeClr val="bg1">
+                <a:lumMod val="50000"/>
+              </a:schemeClr>
+            </a:solidFill>
+          </a:endParaRPr>
+        </a:p>
+        <a:p>
+          <a:pPr marL="342900" lvl="2" indent="-171450" algn="l" defTabSz="711200">
+            <a:lnSpc>
+              <a:spcPct val="90000"/>
+            </a:lnSpc>
+            <a:spcBef>
+              <a:spcPct val="0"/>
+            </a:spcBef>
+            <a:spcAft>
+              <a:spcPct val="15000"/>
+            </a:spcAft>
+            <a:buChar char="••"/>
+          </a:pPr>
+          <a:r>
+            <a:rPr lang="en-US" sz="1600" kern="1200" dirty="0" err="1" smtClean="0">
+              <a:solidFill>
+                <a:schemeClr val="tx1"/>
+              </a:solidFill>
+            </a:rPr>
+            <a:t>dens_vals_fixed_random.RData</a:t>
+          </a:r>
+          <a:r>
+            <a:rPr lang="en-US" sz="1600" kern="1200" dirty="0" smtClean="0">
+              <a:solidFill>
+                <a:schemeClr val="tx1"/>
+              </a:solidFill>
+            </a:rPr>
+            <a:t>: predicted density based on the simulating fixed and random effects from VAST</a:t>
+          </a:r>
+          <a:endParaRPr lang="en-US" sz="1600" kern="1200" dirty="0">
+            <a:solidFill>
+              <a:schemeClr val="bg1">
+                <a:lumMod val="50000"/>
+              </a:schemeClr>
+            </a:solidFill>
+          </a:endParaRPr>
+        </a:p>
       </dsp:txBody>
       <dsp:txXfrm rot="-5400000">
-        <a:off x="1280391" y="3633259"/>
-        <a:ext cx="6789570" cy="1072855"/>
+        <a:off x="952892" y="2918909"/>
+        <a:ext cx="7052410" cy="2268081"/>
       </dsp:txXfrm>
     </dsp:sp>
   </dsp:spTree>
@@ -11778,7 +12357,7 @@
         </a:bodyPr>
         <a:lstStyle/>
         <a:p>
-          <a:pPr marL="0" lvl="0" indent="0" algn="ctr" defTabSz="844550">
+          <a:pPr lvl="0" algn="ctr" defTabSz="844550">
             <a:lnSpc>
               <a:spcPct val="90000"/>
             </a:lnSpc>
@@ -11788,7 +12367,6 @@
             <a:spcAft>
               <a:spcPct val="35000"/>
             </a:spcAft>
-            <a:buNone/>
           </a:pPr>
           <a:r>
             <a:rPr lang="en-US" sz="1900" kern="1200" dirty="0"/>
@@ -11865,7 +12443,7 @@
             <a:spcAft>
               <a:spcPct val="15000"/>
             </a:spcAft>
-            <a:buNone/>
+            <a:buChar char="••"/>
           </a:pPr>
           <a:r>
             <a:rPr lang="en-US" sz="1800" u="none" kern="1200" dirty="0"/>
@@ -11902,7 +12480,7 @@
             <a:spcAft>
               <a:spcPct val="15000"/>
             </a:spcAft>
-            <a:buNone/>
+            <a:buChar char="••"/>
           </a:pPr>
           <a:r>
             <a:rPr lang="en-US" sz="1800" u="none" kern="1200" dirty="0"/>
@@ -11988,7 +12566,7 @@
         </a:bodyPr>
         <a:lstStyle/>
         <a:p>
-          <a:pPr marL="0" lvl="0" indent="0" algn="ctr" defTabSz="844550">
+          <a:pPr lvl="0" algn="ctr" defTabSz="844550">
             <a:lnSpc>
               <a:spcPct val="90000"/>
             </a:lnSpc>
@@ -11998,7 +12576,6 @@
             <a:spcAft>
               <a:spcPct val="35000"/>
             </a:spcAft>
-            <a:buNone/>
           </a:pPr>
           <a:r>
             <a:rPr lang="en-US" sz="1900" kern="1200" dirty="0"/>
@@ -12075,7 +12652,7 @@
             <a:spcAft>
               <a:spcPct val="15000"/>
             </a:spcAft>
-            <a:buNone/>
+            <a:buChar char="••"/>
           </a:pPr>
           <a:r>
             <a:rPr lang="en-US" sz="1800" u="none" kern="1200" dirty="0"/>
@@ -12156,7 +12733,7 @@
         </a:bodyPr>
         <a:lstStyle/>
         <a:p>
-          <a:pPr marL="0" lvl="0" indent="0" algn="ctr" defTabSz="844550">
+          <a:pPr lvl="0" algn="ctr" defTabSz="844550">
             <a:lnSpc>
               <a:spcPct val="90000"/>
             </a:lnSpc>
@@ -12166,7 +12743,6 @@
             <a:spcAft>
               <a:spcPct val="35000"/>
             </a:spcAft>
-            <a:buNone/>
           </a:pPr>
           <a:r>
             <a:rPr lang="en-US" sz="1900" kern="1200" dirty="0"/>
@@ -12243,7 +12819,7 @@
             <a:spcAft>
               <a:spcPct val="15000"/>
             </a:spcAft>
-            <a:buNone/>
+            <a:buChar char="••"/>
           </a:pPr>
           <a:r>
             <a:rPr lang="en-US" sz="1400" u="none" kern="1200" dirty="0"/>
@@ -12300,7 +12876,7 @@
             <a:spcAft>
               <a:spcPct val="15000"/>
             </a:spcAft>
-            <a:buNone/>
+            <a:buChar char="••"/>
           </a:pPr>
           <a:r>
             <a:rPr lang="en-US" sz="1400" kern="1200" dirty="0">
@@ -12344,7 +12920,7 @@
             <a:spcAft>
               <a:spcPct val="15000"/>
             </a:spcAft>
-            <a:buNone/>
+            <a:buChar char="••"/>
           </a:pPr>
           <a:r>
             <a:rPr lang="en-US" sz="1400" kern="1200" dirty="0">
@@ -12376,7 +12952,7 @@
             <a:spcAft>
               <a:spcPct val="15000"/>
             </a:spcAft>
-            <a:buNone/>
+            <a:buChar char="••"/>
           </a:pPr>
           <a:r>
             <a:rPr lang="en-US" sz="1400" kern="1200" dirty="0">
@@ -12470,7 +13046,7 @@
         </a:bodyPr>
         <a:lstStyle/>
         <a:p>
-          <a:pPr marL="0" lvl="0" indent="0" algn="ctr" defTabSz="844550">
+          <a:pPr lvl="0" algn="ctr" defTabSz="844550">
             <a:lnSpc>
               <a:spcPct val="90000"/>
             </a:lnSpc>
@@ -12480,7 +13056,6 @@
             <a:spcAft>
               <a:spcPct val="35000"/>
             </a:spcAft>
-            <a:buNone/>
           </a:pPr>
           <a:r>
             <a:rPr lang="en-US" sz="1900" kern="1200" dirty="0"/>
@@ -12557,7 +13132,7 @@
             <a:spcAft>
               <a:spcPct val="15000"/>
             </a:spcAft>
-            <a:buNone/>
+            <a:buChar char="••"/>
           </a:pPr>
           <a:r>
             <a:rPr lang="en-US" sz="1800" u="none" kern="1200" dirty="0"/>
@@ -12594,7 +13169,7 @@
             <a:spcAft>
               <a:spcPct val="15000"/>
             </a:spcAft>
-            <a:buNone/>
+            <a:buChar char="••"/>
           </a:pPr>
           <a:r>
             <a:rPr lang="en-US" sz="1800" u="none" kern="1200" dirty="0"/>
@@ -12680,7 +13255,7 @@
         </a:bodyPr>
         <a:lstStyle/>
         <a:p>
-          <a:pPr marL="0" lvl="0" indent="0" algn="ctr" defTabSz="844550">
+          <a:pPr lvl="0" algn="ctr" defTabSz="844550">
             <a:lnSpc>
               <a:spcPct val="90000"/>
             </a:lnSpc>
@@ -12690,7 +13265,6 @@
             <a:spcAft>
               <a:spcPct val="35000"/>
             </a:spcAft>
-            <a:buNone/>
           </a:pPr>
           <a:r>
             <a:rPr lang="en-US" sz="1900" kern="1200" dirty="0"/>
@@ -12767,7 +13341,7 @@
             <a:spcAft>
               <a:spcPct val="15000"/>
             </a:spcAft>
-            <a:buNone/>
+            <a:buChar char="••"/>
           </a:pPr>
           <a:r>
             <a:rPr lang="en-US" sz="1800" u="none" kern="1200" dirty="0"/>
@@ -12852,7 +13426,7 @@
         </a:bodyPr>
         <a:lstStyle/>
         <a:p>
-          <a:pPr marL="0" lvl="0" indent="0" algn="ctr" defTabSz="844550">
+          <a:pPr lvl="0" algn="ctr" defTabSz="844550">
             <a:lnSpc>
               <a:spcPct val="90000"/>
             </a:lnSpc>
@@ -12862,7 +13436,6 @@
             <a:spcAft>
               <a:spcPct val="35000"/>
             </a:spcAft>
-            <a:buNone/>
           </a:pPr>
           <a:r>
             <a:rPr lang="en-US" sz="1900" kern="1200" dirty="0"/>
@@ -12939,7 +13512,7 @@
             <a:spcAft>
               <a:spcPct val="15000"/>
             </a:spcAft>
-            <a:buNone/>
+            <a:buChar char="••"/>
           </a:pPr>
           <a:r>
             <a:rPr lang="en-US" sz="1400" u="none" kern="1200" dirty="0"/>
@@ -12996,7 +13569,7 @@
             <a:spcAft>
               <a:spcPct val="15000"/>
             </a:spcAft>
-            <a:buNone/>
+            <a:buChar char="••"/>
           </a:pPr>
           <a:r>
             <a:rPr lang="en-US" sz="1400" kern="1200" dirty="0">
@@ -13040,7 +13613,7 @@
             <a:spcAft>
               <a:spcPct val="15000"/>
             </a:spcAft>
-            <a:buNone/>
+            <a:buChar char="••"/>
           </a:pPr>
           <a:r>
             <a:rPr lang="en-US" sz="1400" kern="1200" dirty="0">
@@ -13072,7 +13645,7 @@
             <a:spcAft>
               <a:spcPct val="15000"/>
             </a:spcAft>
-            <a:buNone/>
+            <a:buChar char="••"/>
           </a:pPr>
           <a:r>
             <a:rPr lang="en-US" sz="1400" kern="1200" dirty="0">
@@ -20990,7 +21563,7 @@
           <a:p>
             <a:fld id="{4287AB04-1197-4202-8E42-EAEF50D51202}" type="datetimeFigureOut">
               <a:rPr lang="en-US" smtClean="0"/>
-              <a:t>6/18/2021</a:t>
+              <a:t>10/17/2021</a:t>
             </a:fld>
             <a:endParaRPr lang="en-US"/>
           </a:p>
@@ -21188,7 +21761,7 @@
           <a:p>
             <a:fld id="{4287AB04-1197-4202-8E42-EAEF50D51202}" type="datetimeFigureOut">
               <a:rPr lang="en-US" smtClean="0"/>
-              <a:t>6/18/2021</a:t>
+              <a:t>10/17/2021</a:t>
             </a:fld>
             <a:endParaRPr lang="en-US"/>
           </a:p>
@@ -21396,7 +21969,7 @@
           <a:p>
             <a:fld id="{4287AB04-1197-4202-8E42-EAEF50D51202}" type="datetimeFigureOut">
               <a:rPr lang="en-US" smtClean="0"/>
-              <a:t>6/18/2021</a:t>
+              <a:t>10/17/2021</a:t>
             </a:fld>
             <a:endParaRPr lang="en-US"/>
           </a:p>
@@ -21594,7 +22167,7 @@
           <a:p>
             <a:fld id="{4287AB04-1197-4202-8E42-EAEF50D51202}" type="datetimeFigureOut">
               <a:rPr lang="en-US" smtClean="0"/>
-              <a:t>6/18/2021</a:t>
+              <a:t>10/17/2021</a:t>
             </a:fld>
             <a:endParaRPr lang="en-US"/>
           </a:p>
@@ -21869,7 +22442,7 @@
           <a:p>
             <a:fld id="{4287AB04-1197-4202-8E42-EAEF50D51202}" type="datetimeFigureOut">
               <a:rPr lang="en-US" smtClean="0"/>
-              <a:t>6/18/2021</a:t>
+              <a:t>10/17/2021</a:t>
             </a:fld>
             <a:endParaRPr lang="en-US"/>
           </a:p>
@@ -22134,7 +22707,7 @@
           <a:p>
             <a:fld id="{4287AB04-1197-4202-8E42-EAEF50D51202}" type="datetimeFigureOut">
               <a:rPr lang="en-US" smtClean="0"/>
-              <a:t>6/18/2021</a:t>
+              <a:t>10/17/2021</a:t>
             </a:fld>
             <a:endParaRPr lang="en-US"/>
           </a:p>
@@ -22546,7 +23119,7 @@
           <a:p>
             <a:fld id="{4287AB04-1197-4202-8E42-EAEF50D51202}" type="datetimeFigureOut">
               <a:rPr lang="en-US" smtClean="0"/>
-              <a:t>6/18/2021</a:t>
+              <a:t>10/17/2021</a:t>
             </a:fld>
             <a:endParaRPr lang="en-US"/>
           </a:p>
@@ -22687,7 +23260,7 @@
           <a:p>
             <a:fld id="{4287AB04-1197-4202-8E42-EAEF50D51202}" type="datetimeFigureOut">
               <a:rPr lang="en-US" smtClean="0"/>
-              <a:t>6/18/2021</a:t>
+              <a:t>10/17/2021</a:t>
             </a:fld>
             <a:endParaRPr lang="en-US"/>
           </a:p>
@@ -22800,7 +23373,7 @@
           <a:p>
             <a:fld id="{4287AB04-1197-4202-8E42-EAEF50D51202}" type="datetimeFigureOut">
               <a:rPr lang="en-US" smtClean="0"/>
-              <a:t>6/18/2021</a:t>
+              <a:t>10/17/2021</a:t>
             </a:fld>
             <a:endParaRPr lang="en-US"/>
           </a:p>
@@ -23111,7 +23684,7 @@
           <a:p>
             <a:fld id="{4287AB04-1197-4202-8E42-EAEF50D51202}" type="datetimeFigureOut">
               <a:rPr lang="en-US" smtClean="0"/>
-              <a:t>6/18/2021</a:t>
+              <a:t>10/17/2021</a:t>
             </a:fld>
             <a:endParaRPr lang="en-US"/>
           </a:p>
@@ -23399,7 +23972,7 @@
           <a:p>
             <a:fld id="{4287AB04-1197-4202-8E42-EAEF50D51202}" type="datetimeFigureOut">
               <a:rPr lang="en-US" smtClean="0"/>
-              <a:t>6/18/2021</a:t>
+              <a:t>10/17/2021</a:t>
             </a:fld>
             <a:endParaRPr lang="en-US"/>
           </a:p>
@@ -23640,7 +24213,7 @@
           <a:p>
             <a:fld id="{4287AB04-1197-4202-8E42-EAEF50D51202}" type="datetimeFigureOut">
               <a:rPr lang="en-US" smtClean="0"/>
-              <a:t>6/18/2021</a:t>
+              <a:t>10/17/2021</a:t>
             </a:fld>
             <a:endParaRPr lang="en-US"/>
           </a:p>
@@ -24244,7 +24817,7 @@
           <p:nvPr>
             <p:extLst>
               <p:ext uri="{D42A27DB-BD31-4B8C-83A1-F6EECF244321}">
-                <p14:modId xmlns:p14="http://schemas.microsoft.com/office/powerpoint/2010/main" val="4142498060"/>
+                <p14:modId xmlns:p14="http://schemas.microsoft.com/office/powerpoint/2010/main" val="2321834933"/>
               </p:ext>
             </p:extLst>
           </p:nvPr>

</xml_diff>